<commit_message>
Update for figures 4 and 5
</commit_message>
<xml_diff>
--- a/Figures/Figure4/Figure4_RandomForest.pptx
+++ b/Figures/Figure4/Figure4_RandomForest.pptx
@@ -118,7 +118,7 @@
 <file path=ppt/revisionInfo.xml><?xml version="1.0" encoding="utf-8"?>
 <p1510:revInfo xmlns:a="http://schemas.openxmlformats.org/drawingml/2006/main" xmlns:r="http://schemas.openxmlformats.org/officeDocument/2006/relationships" xmlns:p1510="http://schemas.microsoft.com/office/powerpoint/2015/10/main">
   <p1510:revLst>
-    <p1510:client id="{687BCA28-0438-064A-AB62-8DEA4A6EB04D}" v="28" dt="2024-08-30T18:20:48.392"/>
+    <p1510:client id="{687BCA28-0438-064A-AB62-8DEA4A6EB04D}" v="44" dt="2024-09-10T20:18:28.772"/>
   </p1510:revLst>
 </p1510:revInfo>
 </file>
@@ -128,7 +128,7 @@
   <pc:docChgLst>
     <pc:chgData name="Jordan May Von Eggers" userId="2bcc5b33-6bd2-4559-ac12-5178b17ae4b3" providerId="ADAL" clId="{687BCA28-0438-064A-AB62-8DEA4A6EB04D}"/>
     <pc:docChg chg="undo custSel addSld delSld modSld sldOrd modMainMaster modNotesMaster">
-      <pc:chgData name="Jordan May Von Eggers" userId="2bcc5b33-6bd2-4559-ac12-5178b17ae4b3" providerId="ADAL" clId="{687BCA28-0438-064A-AB62-8DEA4A6EB04D}" dt="2024-08-30T18:21:15.193" v="307" actId="1035"/>
+      <pc:chgData name="Jordan May Von Eggers" userId="2bcc5b33-6bd2-4559-ac12-5178b17ae4b3" providerId="ADAL" clId="{687BCA28-0438-064A-AB62-8DEA4A6EB04D}" dt="2024-09-10T20:18:28.771" v="335" actId="14826"/>
       <pc:docMkLst>
         <pc:docMk/>
       </pc:docMkLst>
@@ -378,7 +378,7 @@
         </pc:cxnChg>
       </pc:sldChg>
       <pc:sldChg chg="addSp delSp modSp add mod ord modNotes">
-        <pc:chgData name="Jordan May Von Eggers" userId="2bcc5b33-6bd2-4559-ac12-5178b17ae4b3" providerId="ADAL" clId="{687BCA28-0438-064A-AB62-8DEA4A6EB04D}" dt="2024-08-30T18:21:15.193" v="307" actId="1035"/>
+        <pc:chgData name="Jordan May Von Eggers" userId="2bcc5b33-6bd2-4559-ac12-5178b17ae4b3" providerId="ADAL" clId="{687BCA28-0438-064A-AB62-8DEA4A6EB04D}" dt="2024-09-10T20:18:28.771" v="335" actId="14826"/>
         <pc:sldMkLst>
           <pc:docMk/>
           <pc:sldMk cId="1786437691" sldId="260"/>
@@ -400,7 +400,7 @@
           </ac:spMkLst>
         </pc:spChg>
         <pc:spChg chg="mod">
-          <ac:chgData name="Jordan May Von Eggers" userId="2bcc5b33-6bd2-4559-ac12-5178b17ae4b3" providerId="ADAL" clId="{687BCA28-0438-064A-AB62-8DEA4A6EB04D}" dt="2024-08-30T18:08:55.948" v="252" actId="1036"/>
+          <ac:chgData name="Jordan May Von Eggers" userId="2bcc5b33-6bd2-4559-ac12-5178b17ae4b3" providerId="ADAL" clId="{687BCA28-0438-064A-AB62-8DEA4A6EB04D}" dt="2024-09-10T20:13:27.335" v="309" actId="20577"/>
           <ac:spMkLst>
             <pc:docMk/>
             <pc:sldMk cId="1786437691" sldId="260"/>
@@ -416,7 +416,7 @@
           </ac:spMkLst>
         </pc:spChg>
         <pc:spChg chg="mod">
-          <ac:chgData name="Jordan May Von Eggers" userId="2bcc5b33-6bd2-4559-ac12-5178b17ae4b3" providerId="ADAL" clId="{687BCA28-0438-064A-AB62-8DEA4A6EB04D}" dt="2024-08-30T18:08:55.948" v="252" actId="1036"/>
+          <ac:chgData name="Jordan May Von Eggers" userId="2bcc5b33-6bd2-4559-ac12-5178b17ae4b3" providerId="ADAL" clId="{687BCA28-0438-064A-AB62-8DEA4A6EB04D}" dt="2024-09-10T20:16:44.621" v="323" actId="20577"/>
           <ac:spMkLst>
             <pc:docMk/>
             <pc:sldMk cId="1786437691" sldId="260"/>
@@ -424,7 +424,7 @@
           </ac:spMkLst>
         </pc:spChg>
         <pc:spChg chg="mod">
-          <ac:chgData name="Jordan May Von Eggers" userId="2bcc5b33-6bd2-4559-ac12-5178b17ae4b3" providerId="ADAL" clId="{687BCA28-0438-064A-AB62-8DEA4A6EB04D}" dt="2024-08-30T18:08:55.948" v="252" actId="1036"/>
+          <ac:chgData name="Jordan May Von Eggers" userId="2bcc5b33-6bd2-4559-ac12-5178b17ae4b3" providerId="ADAL" clId="{687BCA28-0438-064A-AB62-8DEA4A6EB04D}" dt="2024-09-10T20:16:13.634" v="315" actId="20577"/>
           <ac:spMkLst>
             <pc:docMk/>
             <pc:sldMk cId="1786437691" sldId="260"/>
@@ -432,7 +432,7 @@
           </ac:spMkLst>
         </pc:spChg>
         <pc:spChg chg="mod">
-          <ac:chgData name="Jordan May Von Eggers" userId="2bcc5b33-6bd2-4559-ac12-5178b17ae4b3" providerId="ADAL" clId="{687BCA28-0438-064A-AB62-8DEA4A6EB04D}" dt="2024-08-30T18:08:55.948" v="252" actId="1036"/>
+          <ac:chgData name="Jordan May Von Eggers" userId="2bcc5b33-6bd2-4559-ac12-5178b17ae4b3" providerId="ADAL" clId="{687BCA28-0438-064A-AB62-8DEA4A6EB04D}" dt="2024-09-10T20:16:38.924" v="319" actId="20577"/>
           <ac:spMkLst>
             <pc:docMk/>
             <pc:sldMk cId="1786437691" sldId="260"/>
@@ -480,7 +480,7 @@
           </ac:picMkLst>
         </pc:picChg>
         <pc:picChg chg="add mod">
-          <ac:chgData name="Jordan May Von Eggers" userId="2bcc5b33-6bd2-4559-ac12-5178b17ae4b3" providerId="ADAL" clId="{687BCA28-0438-064A-AB62-8DEA4A6EB04D}" dt="2024-08-30T18:08:55.948" v="252" actId="1036"/>
+          <ac:chgData name="Jordan May Von Eggers" userId="2bcc5b33-6bd2-4559-ac12-5178b17ae4b3" providerId="ADAL" clId="{687BCA28-0438-064A-AB62-8DEA4A6EB04D}" dt="2024-09-10T20:15:46.193" v="312" actId="14826"/>
           <ac:picMkLst>
             <pc:docMk/>
             <pc:sldMk cId="1786437691" sldId="260"/>
@@ -496,7 +496,7 @@
           </ac:picMkLst>
         </pc:picChg>
         <pc:picChg chg="add mod">
-          <ac:chgData name="Jordan May Von Eggers" userId="2bcc5b33-6bd2-4559-ac12-5178b17ae4b3" providerId="ADAL" clId="{687BCA28-0438-064A-AB62-8DEA4A6EB04D}" dt="2024-08-30T18:08:55.948" v="252" actId="1036"/>
+          <ac:chgData name="Jordan May Von Eggers" userId="2bcc5b33-6bd2-4559-ac12-5178b17ae4b3" providerId="ADAL" clId="{687BCA28-0438-064A-AB62-8DEA4A6EB04D}" dt="2024-09-10T20:15:56.913" v="313" actId="14826"/>
           <ac:picMkLst>
             <pc:docMk/>
             <pc:sldMk cId="1786437691" sldId="260"/>
@@ -504,7 +504,7 @@
           </ac:picMkLst>
         </pc:picChg>
         <pc:picChg chg="add mod">
-          <ac:chgData name="Jordan May Von Eggers" userId="2bcc5b33-6bd2-4559-ac12-5178b17ae4b3" providerId="ADAL" clId="{687BCA28-0438-064A-AB62-8DEA4A6EB04D}" dt="2024-08-30T18:20:48.392" v="261" actId="167"/>
+          <ac:chgData name="Jordan May Von Eggers" userId="2bcc5b33-6bd2-4559-ac12-5178b17ae4b3" providerId="ADAL" clId="{687BCA28-0438-064A-AB62-8DEA4A6EB04D}" dt="2024-09-10T20:18:28.771" v="335" actId="14826"/>
           <ac:picMkLst>
             <pc:docMk/>
             <pc:sldMk cId="1786437691" sldId="260"/>
@@ -512,7 +512,7 @@
           </ac:picMkLst>
         </pc:picChg>
         <pc:picChg chg="add mod">
-          <ac:chgData name="Jordan May Von Eggers" userId="2bcc5b33-6bd2-4559-ac12-5178b17ae4b3" providerId="ADAL" clId="{687BCA28-0438-064A-AB62-8DEA4A6EB04D}" dt="2024-08-30T18:21:05.739" v="266" actId="1037"/>
+          <ac:chgData name="Jordan May Von Eggers" userId="2bcc5b33-6bd2-4559-ac12-5178b17ae4b3" providerId="ADAL" clId="{687BCA28-0438-064A-AB62-8DEA4A6EB04D}" dt="2024-09-10T20:18:19.966" v="334" actId="14826"/>
           <ac:picMkLst>
             <pc:docMk/>
             <pc:sldMk cId="1786437691" sldId="260"/>
@@ -1477,7 +1477,7 @@
           <a:p>
             <a:fld id="{4AB11435-BC9C-C649-B93C-0243AFB6DB2E}" type="datetimeFigureOut">
               <a:rPr lang="en-US" smtClean="0"/>
-              <a:t>8/30/24</a:t>
+              <a:t>9/10/24</a:t>
             </a:fld>
             <a:endParaRPr lang="en-US"/>
           </a:p>
@@ -2002,7 +2002,7 @@
           <a:p>
             <a:fld id="{C128D3E9-2565-C645-BAD9-D02505D431F5}" type="datetimeFigureOut">
               <a:rPr lang="en-US" smtClean="0"/>
-              <a:t>8/30/24</a:t>
+              <a:t>9/10/24</a:t>
             </a:fld>
             <a:endParaRPr lang="en-US"/>
           </a:p>
@@ -2172,7 +2172,7 @@
           <a:p>
             <a:fld id="{C128D3E9-2565-C645-BAD9-D02505D431F5}" type="datetimeFigureOut">
               <a:rPr lang="en-US" smtClean="0"/>
-              <a:t>8/30/24</a:t>
+              <a:t>9/10/24</a:t>
             </a:fld>
             <a:endParaRPr lang="en-US"/>
           </a:p>
@@ -2352,7 +2352,7 @@
           <a:p>
             <a:fld id="{C128D3E9-2565-C645-BAD9-D02505D431F5}" type="datetimeFigureOut">
               <a:rPr lang="en-US" smtClean="0"/>
-              <a:t>8/30/24</a:t>
+              <a:t>9/10/24</a:t>
             </a:fld>
             <a:endParaRPr lang="en-US"/>
           </a:p>
@@ -2522,7 +2522,7 @@
           <a:p>
             <a:fld id="{C128D3E9-2565-C645-BAD9-D02505D431F5}" type="datetimeFigureOut">
               <a:rPr lang="en-US" smtClean="0"/>
-              <a:t>8/30/24</a:t>
+              <a:t>9/10/24</a:t>
             </a:fld>
             <a:endParaRPr lang="en-US"/>
           </a:p>
@@ -2768,7 +2768,7 @@
           <a:p>
             <a:fld id="{C128D3E9-2565-C645-BAD9-D02505D431F5}" type="datetimeFigureOut">
               <a:rPr lang="en-US" smtClean="0"/>
-              <a:t>8/30/24</a:t>
+              <a:t>9/10/24</a:t>
             </a:fld>
             <a:endParaRPr lang="en-US"/>
           </a:p>
@@ -3000,7 +3000,7 @@
           <a:p>
             <a:fld id="{C128D3E9-2565-C645-BAD9-D02505D431F5}" type="datetimeFigureOut">
               <a:rPr lang="en-US" smtClean="0"/>
-              <a:t>8/30/24</a:t>
+              <a:t>9/10/24</a:t>
             </a:fld>
             <a:endParaRPr lang="en-US"/>
           </a:p>
@@ -3367,7 +3367,7 @@
           <a:p>
             <a:fld id="{C128D3E9-2565-C645-BAD9-D02505D431F5}" type="datetimeFigureOut">
               <a:rPr lang="en-US" smtClean="0"/>
-              <a:t>8/30/24</a:t>
+              <a:t>9/10/24</a:t>
             </a:fld>
             <a:endParaRPr lang="en-US"/>
           </a:p>
@@ -3485,7 +3485,7 @@
           <a:p>
             <a:fld id="{C128D3E9-2565-C645-BAD9-D02505D431F5}" type="datetimeFigureOut">
               <a:rPr lang="en-US" smtClean="0"/>
-              <a:t>8/30/24</a:t>
+              <a:t>9/10/24</a:t>
             </a:fld>
             <a:endParaRPr lang="en-US"/>
           </a:p>
@@ -3580,7 +3580,7 @@
           <a:p>
             <a:fld id="{C128D3E9-2565-C645-BAD9-D02505D431F5}" type="datetimeFigureOut">
               <a:rPr lang="en-US" smtClean="0"/>
-              <a:t>8/30/24</a:t>
+              <a:t>9/10/24</a:t>
             </a:fld>
             <a:endParaRPr lang="en-US"/>
           </a:p>
@@ -3857,7 +3857,7 @@
           <a:p>
             <a:fld id="{C128D3E9-2565-C645-BAD9-D02505D431F5}" type="datetimeFigureOut">
               <a:rPr lang="en-US" smtClean="0"/>
-              <a:t>8/30/24</a:t>
+              <a:t>9/10/24</a:t>
             </a:fld>
             <a:endParaRPr lang="en-US"/>
           </a:p>
@@ -4114,7 +4114,7 @@
           <a:p>
             <a:fld id="{C128D3E9-2565-C645-BAD9-D02505D431F5}" type="datetimeFigureOut">
               <a:rPr lang="en-US" smtClean="0"/>
-              <a:t>8/30/24</a:t>
+              <a:t>9/10/24</a:t>
             </a:fld>
             <a:endParaRPr lang="en-US"/>
           </a:p>
@@ -4327,7 +4327,7 @@
           <a:p>
             <a:fld id="{C128D3E9-2565-C645-BAD9-D02505D431F5}" type="datetimeFigureOut">
               <a:rPr lang="en-US" smtClean="0"/>
-              <a:t>8/30/24</a:t>
+              <a:t>9/10/24</a:t>
             </a:fld>
             <a:endParaRPr lang="en-US"/>
           </a:p>
@@ -4740,7 +4740,7 @@
       </p:grpSpPr>
       <p:pic>
         <p:nvPicPr>
-          <p:cNvPr id="20" name="Picture 19" descr="A graph with numbers and text&#10;&#10;Description automatically generated with medium confidence">
+          <p:cNvPr id="20" name="Picture 19">
             <a:extLst>
               <a:ext uri="{FF2B5EF4-FFF2-40B4-BE49-F238E27FC236}">
                 <a16:creationId xmlns:a16="http://schemas.microsoft.com/office/drawing/2014/main" id="{AF0F9ECA-9609-867F-62EF-FF0BE58441EA}"/>
@@ -4754,9 +4754,8 @@
         </p:nvPicPr>
         <p:blipFill>
           <a:blip r:embed="rId3"/>
-          <a:stretch>
-            <a:fillRect/>
-          </a:stretch>
+          <a:srcRect/>
+          <a:stretch/>
         </p:blipFill>
         <p:spPr>
           <a:xfrm>
@@ -4770,7 +4769,7 @@
       </p:pic>
       <p:pic>
         <p:nvPicPr>
-          <p:cNvPr id="22" name="Picture 21" descr="A graph with text on it&#10;&#10;Description automatically generated">
+          <p:cNvPr id="22" name="Picture 21">
             <a:extLst>
               <a:ext uri="{FF2B5EF4-FFF2-40B4-BE49-F238E27FC236}">
                 <a16:creationId xmlns:a16="http://schemas.microsoft.com/office/drawing/2014/main" id="{F9C0CCB7-C382-EC81-9D43-7D5C749274B4}"/>
@@ -4784,9 +4783,8 @@
         </p:nvPicPr>
         <p:blipFill>
           <a:blip r:embed="rId4"/>
-          <a:stretch>
-            <a:fillRect/>
-          </a:stretch>
+          <a:srcRect/>
+          <a:stretch/>
         </p:blipFill>
         <p:spPr>
           <a:xfrm>
@@ -5059,7 +5057,7 @@
                 <a:latin typeface="Arial" panose="020B0604020202020204" pitchFamily="34" charset="0"/>
                 <a:cs typeface="Arial" panose="020B0604020202020204" pitchFamily="34" charset="0"/>
               </a:rPr>
-              <a:t>82.0%</a:t>
+              <a:t>82.1%</a:t>
             </a:r>
             <a:r>
               <a:rPr lang="en-US" sz="1600" dirty="0">
@@ -5435,7 +5433,7 @@
                 <a:latin typeface="Arial" panose="020B0604020202020204" pitchFamily="34" charset="0"/>
                 <a:cs typeface="Arial" panose="020B0604020202020204" pitchFamily="34" charset="0"/>
               </a:rPr>
-              <a:t>54.4%</a:t>
+              <a:t>55.6%</a:t>
             </a:r>
             <a:r>
               <a:rPr lang="en-US" sz="1600" dirty="0">
@@ -5590,7 +5588,7 @@
                 <a:latin typeface="Arial" panose="020B0604020202020204" pitchFamily="34" charset="0"/>
                 <a:cs typeface="Arial" panose="020B0604020202020204" pitchFamily="34" charset="0"/>
               </a:rPr>
-              <a:t>36.3%</a:t>
+              <a:t>36.4%</a:t>
             </a:r>
             <a:r>
               <a:rPr lang="en-US" sz="1600" dirty="0">
@@ -5712,7 +5710,7 @@
                 <a:latin typeface="Arial" panose="020B0604020202020204" pitchFamily="34" charset="0"/>
                 <a:cs typeface="Arial" panose="020B0604020202020204" pitchFamily="34" charset="0"/>
               </a:rPr>
-              <a:t>48.4%</a:t>
+              <a:t>47.7%</a:t>
             </a:r>
             <a:r>
               <a:rPr lang="en-US" sz="1600" dirty="0">
@@ -5758,7 +5756,7 @@
       </p:pic>
       <p:pic>
         <p:nvPicPr>
-          <p:cNvPr id="13" name="Picture 12" descr="A diagram of numbers and a number of objects&#10;&#10;Description automatically generated with medium confidence">
+          <p:cNvPr id="13" name="Picture 12">
             <a:extLst>
               <a:ext uri="{FF2B5EF4-FFF2-40B4-BE49-F238E27FC236}">
                 <a16:creationId xmlns:a16="http://schemas.microsoft.com/office/drawing/2014/main" id="{BB77A367-FA2C-299E-6AB9-622209D4A1CF}"/>
@@ -5772,14 +5770,13 @@
         </p:nvPicPr>
         <p:blipFill>
           <a:blip r:embed="rId6"/>
-          <a:stretch>
-            <a:fillRect/>
-          </a:stretch>
+          <a:srcRect/>
+          <a:stretch/>
         </p:blipFill>
         <p:spPr>
           <a:xfrm>
             <a:off x="159048" y="7182255"/>
-            <a:ext cx="4474002" cy="3027520"/>
+            <a:ext cx="4474001" cy="3027520"/>
           </a:xfrm>
           <a:prstGeom prst="rect">
             <a:avLst/>
@@ -5788,7 +5785,7 @@
       </p:pic>
       <p:pic>
         <p:nvPicPr>
-          <p:cNvPr id="18" name="Picture 17" descr="A graph of numbers and percentages&#10;&#10;Description automatically generated">
+          <p:cNvPr id="18" name="Picture 17">
             <a:extLst>
               <a:ext uri="{FF2B5EF4-FFF2-40B4-BE49-F238E27FC236}">
                 <a16:creationId xmlns:a16="http://schemas.microsoft.com/office/drawing/2014/main" id="{E22F9EF7-5A1F-2B8E-3F83-68A83EDE63E0}"/>
@@ -5802,9 +5799,8 @@
         </p:nvPicPr>
         <p:blipFill>
           <a:blip r:embed="rId7"/>
-          <a:stretch>
-            <a:fillRect/>
-          </a:stretch>
+          <a:srcRect/>
+          <a:stretch/>
         </p:blipFill>
         <p:spPr>
           <a:xfrm>

</xml_diff>

<commit_message>
Updating code and figures 4-6
</commit_message>
<xml_diff>
--- a/Figures/Figure4/Figure4_RandomForest.pptx
+++ b/Figures/Figure4/Figure4_RandomForest.pptx
@@ -118,7 +118,7 @@
 <file path=ppt/revisionInfo.xml><?xml version="1.0" encoding="utf-8"?>
 <p1510:revInfo xmlns:a="http://schemas.openxmlformats.org/drawingml/2006/main" xmlns:r="http://schemas.openxmlformats.org/officeDocument/2006/relationships" xmlns:p1510="http://schemas.microsoft.com/office/powerpoint/2015/10/main">
   <p1510:revLst>
-    <p1510:client id="{687BCA28-0438-064A-AB62-8DEA4A6EB04D}" v="44" dt="2024-09-10T20:18:28.772"/>
+    <p1510:client id="{687BCA28-0438-064A-AB62-8DEA4A6EB04D}" v="47" dt="2024-09-10T22:05:17.607"/>
   </p1510:revLst>
 </p1510:revInfo>
 </file>
@@ -128,7 +128,7 @@
   <pc:docChgLst>
     <pc:chgData name="Jordan May Von Eggers" userId="2bcc5b33-6bd2-4559-ac12-5178b17ae4b3" providerId="ADAL" clId="{687BCA28-0438-064A-AB62-8DEA4A6EB04D}"/>
     <pc:docChg chg="undo custSel addSld delSld modSld sldOrd modMainMaster modNotesMaster">
-      <pc:chgData name="Jordan May Von Eggers" userId="2bcc5b33-6bd2-4559-ac12-5178b17ae4b3" providerId="ADAL" clId="{687BCA28-0438-064A-AB62-8DEA4A6EB04D}" dt="2024-09-10T20:18:28.771" v="335" actId="14826"/>
+      <pc:chgData name="Jordan May Von Eggers" userId="2bcc5b33-6bd2-4559-ac12-5178b17ae4b3" providerId="ADAL" clId="{687BCA28-0438-064A-AB62-8DEA4A6EB04D}" dt="2024-09-10T22:05:29.315" v="377" actId="1037"/>
       <pc:docMkLst>
         <pc:docMk/>
       </pc:docMkLst>
@@ -378,7 +378,7 @@
         </pc:cxnChg>
       </pc:sldChg>
       <pc:sldChg chg="addSp delSp modSp add mod ord modNotes">
-        <pc:chgData name="Jordan May Von Eggers" userId="2bcc5b33-6bd2-4559-ac12-5178b17ae4b3" providerId="ADAL" clId="{687BCA28-0438-064A-AB62-8DEA4A6EB04D}" dt="2024-09-10T20:18:28.771" v="335" actId="14826"/>
+        <pc:chgData name="Jordan May Von Eggers" userId="2bcc5b33-6bd2-4559-ac12-5178b17ae4b3" providerId="ADAL" clId="{687BCA28-0438-064A-AB62-8DEA4A6EB04D}" dt="2024-09-10T22:05:29.315" v="377" actId="1037"/>
         <pc:sldMkLst>
           <pc:docMk/>
           <pc:sldMk cId="1786437691" sldId="260"/>
@@ -447,6 +447,14 @@
             <ac:picMk id="3" creationId="{EE5D159D-FCA1-38C7-E44F-EAA87A9D00D3}"/>
           </ac:picMkLst>
         </pc:picChg>
+        <pc:picChg chg="add mod">
+          <ac:chgData name="Jordan May Von Eggers" userId="2bcc5b33-6bd2-4559-ac12-5178b17ae4b3" providerId="ADAL" clId="{687BCA28-0438-064A-AB62-8DEA4A6EB04D}" dt="2024-09-10T22:05:29.315" v="377" actId="1037"/>
+          <ac:picMkLst>
+            <pc:docMk/>
+            <pc:sldMk cId="1786437691" sldId="260"/>
+            <ac:picMk id="3" creationId="{F5BBBAA3-62E9-AD63-F3F5-17DA5F3541C2}"/>
+          </ac:picMkLst>
+        </pc:picChg>
         <pc:picChg chg="add del mod">
           <ac:chgData name="Jordan May Von Eggers" userId="2bcc5b33-6bd2-4559-ac12-5178b17ae4b3" providerId="ADAL" clId="{687BCA28-0438-064A-AB62-8DEA4A6EB04D}" dt="2024-08-30T17:35:36.323" v="86" actId="478"/>
           <ac:picMkLst>
@@ -504,15 +512,15 @@
           </ac:picMkLst>
         </pc:picChg>
         <pc:picChg chg="add mod">
-          <ac:chgData name="Jordan May Von Eggers" userId="2bcc5b33-6bd2-4559-ac12-5178b17ae4b3" providerId="ADAL" clId="{687BCA28-0438-064A-AB62-8DEA4A6EB04D}" dt="2024-09-10T20:18:28.771" v="335" actId="14826"/>
+          <ac:chgData name="Jordan May Von Eggers" userId="2bcc5b33-6bd2-4559-ac12-5178b17ae4b3" providerId="ADAL" clId="{687BCA28-0438-064A-AB62-8DEA4A6EB04D}" dt="2024-09-10T22:05:26.824" v="373" actId="1037"/>
           <ac:picMkLst>
             <pc:docMk/>
             <pc:sldMk cId="1786437691" sldId="260"/>
             <ac:picMk id="20" creationId="{AF0F9ECA-9609-867F-62EF-FF0BE58441EA}"/>
           </ac:picMkLst>
         </pc:picChg>
-        <pc:picChg chg="add mod">
-          <ac:chgData name="Jordan May Von Eggers" userId="2bcc5b33-6bd2-4559-ac12-5178b17ae4b3" providerId="ADAL" clId="{687BCA28-0438-064A-AB62-8DEA4A6EB04D}" dt="2024-09-10T20:18:19.966" v="334" actId="14826"/>
+        <pc:picChg chg="add del mod">
+          <ac:chgData name="Jordan May Von Eggers" userId="2bcc5b33-6bd2-4559-ac12-5178b17ae4b3" providerId="ADAL" clId="{687BCA28-0438-064A-AB62-8DEA4A6EB04D}" dt="2024-09-10T22:05:09.012" v="343" actId="478"/>
           <ac:picMkLst>
             <pc:docMk/>
             <pc:sldMk cId="1786437691" sldId="260"/>
@@ -4740,10 +4748,10 @@
       </p:grpSpPr>
       <p:pic>
         <p:nvPicPr>
-          <p:cNvPr id="20" name="Picture 19">
+          <p:cNvPr id="3" name="Picture 2" descr="A graph with text on it&#10;&#10;Description automatically generated with medium confidence">
             <a:extLst>
               <a:ext uri="{FF2B5EF4-FFF2-40B4-BE49-F238E27FC236}">
-                <a16:creationId xmlns:a16="http://schemas.microsoft.com/office/drawing/2014/main" id="{AF0F9ECA-9609-867F-62EF-FF0BE58441EA}"/>
+                <a16:creationId xmlns:a16="http://schemas.microsoft.com/office/drawing/2014/main" id="{F5BBBAA3-62E9-AD63-F3F5-17DA5F3541C2}"/>
               </a:ext>
             </a:extLst>
           </p:cNvPr>
@@ -4754,13 +4762,14 @@
         </p:nvPicPr>
         <p:blipFill>
           <a:blip r:embed="rId3"/>
-          <a:srcRect/>
-          <a:stretch/>
+          <a:stretch>
+            <a:fillRect/>
+          </a:stretch>
         </p:blipFill>
         <p:spPr>
           <a:xfrm>
-            <a:off x="237958" y="3292475"/>
-            <a:ext cx="6121400" cy="3657600"/>
+            <a:off x="5990141" y="3292029"/>
+            <a:ext cx="6299200" cy="3657600"/>
           </a:xfrm>
           <a:prstGeom prst="rect">
             <a:avLst/>
@@ -4769,10 +4778,10 @@
       </p:pic>
       <p:pic>
         <p:nvPicPr>
-          <p:cNvPr id="22" name="Picture 21">
+          <p:cNvPr id="20" name="Picture 19">
             <a:extLst>
               <a:ext uri="{FF2B5EF4-FFF2-40B4-BE49-F238E27FC236}">
-                <a16:creationId xmlns:a16="http://schemas.microsoft.com/office/drawing/2014/main" id="{F9C0CCB7-C382-EC81-9D43-7D5C749274B4}"/>
+                <a16:creationId xmlns:a16="http://schemas.microsoft.com/office/drawing/2014/main" id="{AF0F9ECA-9609-867F-62EF-FF0BE58441EA}"/>
               </a:ext>
             </a:extLst>
           </p:cNvPr>
@@ -4788,7 +4797,7 @@
         </p:blipFill>
         <p:spPr>
           <a:xfrm>
-            <a:off x="6090117" y="3292475"/>
+            <a:off x="138208" y="3292475"/>
             <a:ext cx="6121400" cy="3657600"/>
           </a:xfrm>
           <a:prstGeom prst="rect">

</xml_diff>

<commit_message>
Update random forest analysis
</commit_message>
<xml_diff>
--- a/Figures/Figure4/Figure4_RandomForest.pptx
+++ b/Figures/Figure4/Figure4_RandomForest.pptx
@@ -5,11 +5,12 @@
     <p:sldMasterId id="2147483816" r:id="rId1"/>
   </p:sldMasterIdLst>
   <p:notesMasterIdLst>
-    <p:notesMasterId r:id="rId4"/>
+    <p:notesMasterId r:id="rId5"/>
   </p:notesMasterIdLst>
   <p:sldIdLst>
-    <p:sldId id="260" r:id="rId2"/>
-    <p:sldId id="261" r:id="rId3"/>
+    <p:sldId id="261" r:id="rId2"/>
+    <p:sldId id="262" r:id="rId3"/>
+    <p:sldId id="263" r:id="rId4"/>
   </p:sldIdLst>
   <p:sldSz cx="12344400" cy="8961438"/>
   <p:notesSz cx="6858000" cy="9144000"/>
@@ -119,8 +120,7 @@
 <file path=ppt/revisionInfo.xml><?xml version="1.0" encoding="utf-8"?>
 <p1510:revInfo xmlns:a="http://schemas.openxmlformats.org/drawingml/2006/main" xmlns:r="http://schemas.openxmlformats.org/officeDocument/2006/relationships" xmlns:p1510="http://schemas.microsoft.com/office/powerpoint/2015/10/main">
   <p1510:revLst>
-    <p1510:client id="{BE979C13-1878-7245-95A7-609AB8FEDF17}" v="18" dt="2024-11-11T21:46:34.888"/>
-    <p1510:client id="{E058BD1E-1C18-0B4B-86A0-6DE1E2E4609B}" v="16" dt="2024-11-12T16:45:54.378"/>
+    <p1510:client id="{E058BD1E-1C18-0B4B-86A0-6DE1E2E4609B}" v="40" dt="2024-11-26T19:48:00.238"/>
   </p1510:revLst>
 </p1510:revInfo>
 </file>
@@ -2271,13 +2271,13 @@
   </pc:docChgLst>
   <pc:docChgLst>
     <pc:chgData name="Jordan May Von Eggers" userId="2bcc5b33-6bd2-4559-ac12-5178b17ae4b3" providerId="ADAL" clId="{E058BD1E-1C18-0B4B-86A0-6DE1E2E4609B}"/>
-    <pc:docChg chg="undo custSel modSld modMainMaster modNotesMaster">
-      <pc:chgData name="Jordan May Von Eggers" userId="2bcc5b33-6bd2-4559-ac12-5178b17ae4b3" providerId="ADAL" clId="{E058BD1E-1C18-0B4B-86A0-6DE1E2E4609B}" dt="2024-11-12T16:45:54.378" v="111" actId="14826"/>
+    <pc:docChg chg="undo custSel addSld delSld modSld modMainMaster modNotesMaster">
+      <pc:chgData name="Jordan May Von Eggers" userId="2bcc5b33-6bd2-4559-ac12-5178b17ae4b3" providerId="ADAL" clId="{E058BD1E-1C18-0B4B-86A0-6DE1E2E4609B}" dt="2024-11-26T19:59:07.786" v="286" actId="20577"/>
       <pc:docMkLst>
         <pc:docMk/>
       </pc:docMkLst>
-      <pc:sldChg chg="modSp mod modNotes">
-        <pc:chgData name="Jordan May Von Eggers" userId="2bcc5b33-6bd2-4559-ac12-5178b17ae4b3" providerId="ADAL" clId="{E058BD1E-1C18-0B4B-86A0-6DE1E2E4609B}" dt="2024-11-12T16:39:35.163" v="52"/>
+      <pc:sldChg chg="modSp del mod modNotes">
+        <pc:chgData name="Jordan May Von Eggers" userId="2bcc5b33-6bd2-4559-ac12-5178b17ae4b3" providerId="ADAL" clId="{E058BD1E-1C18-0B4B-86A0-6DE1E2E4609B}" dt="2024-11-26T18:17:40.487" v="112" actId="2696"/>
         <pc:sldMkLst>
           <pc:docMk/>
           <pc:sldMk cId="1786437691" sldId="260"/>
@@ -2419,14 +2419,14 @@
           </ac:cxnSpMkLst>
         </pc:cxnChg>
       </pc:sldChg>
-      <pc:sldChg chg="addSp delSp modSp mod modNotes">
-        <pc:chgData name="Jordan May Von Eggers" userId="2bcc5b33-6bd2-4559-ac12-5178b17ae4b3" providerId="ADAL" clId="{E058BD1E-1C18-0B4B-86A0-6DE1E2E4609B}" dt="2024-11-12T16:45:54.378" v="111" actId="14826"/>
+      <pc:sldChg chg="addSp delSp modSp mod modNotes modNotesTx">
+        <pc:chgData name="Jordan May Von Eggers" userId="2bcc5b33-6bd2-4559-ac12-5178b17ae4b3" providerId="ADAL" clId="{E058BD1E-1C18-0B4B-86A0-6DE1E2E4609B}" dt="2024-11-26T19:38:58.245" v="178" actId="20577"/>
         <pc:sldMkLst>
           <pc:docMk/>
           <pc:sldMk cId="2068078990" sldId="261"/>
         </pc:sldMkLst>
         <pc:spChg chg="mod">
-          <ac:chgData name="Jordan May Von Eggers" userId="2bcc5b33-6bd2-4559-ac12-5178b17ae4b3" providerId="ADAL" clId="{E058BD1E-1C18-0B4B-86A0-6DE1E2E4609B}" dt="2024-11-12T16:39:45.669" v="63" actId="1035"/>
+          <ac:chgData name="Jordan May Von Eggers" userId="2bcc5b33-6bd2-4559-ac12-5178b17ae4b3" providerId="ADAL" clId="{E058BD1E-1C18-0B4B-86A0-6DE1E2E4609B}" dt="2024-11-26T18:17:58.583" v="120" actId="20577"/>
           <ac:spMkLst>
             <pc:docMk/>
             <pc:sldMk cId="2068078990" sldId="261"/>
@@ -2434,7 +2434,7 @@
           </ac:spMkLst>
         </pc:spChg>
         <pc:spChg chg="mod">
-          <ac:chgData name="Jordan May Von Eggers" userId="2bcc5b33-6bd2-4559-ac12-5178b17ae4b3" providerId="ADAL" clId="{E058BD1E-1C18-0B4B-86A0-6DE1E2E4609B}" dt="2024-11-12T16:39:45.669" v="63" actId="1035"/>
+          <ac:chgData name="Jordan May Von Eggers" userId="2bcc5b33-6bd2-4559-ac12-5178b17ae4b3" providerId="ADAL" clId="{E058BD1E-1C18-0B4B-86A0-6DE1E2E4609B}" dt="2024-11-26T19:38:09.902" v="148" actId="20577"/>
           <ac:spMkLst>
             <pc:docMk/>
             <pc:sldMk cId="2068078990" sldId="261"/>
@@ -2458,7 +2458,7 @@
           </ac:spMkLst>
         </pc:spChg>
         <pc:spChg chg="mod">
-          <ac:chgData name="Jordan May Von Eggers" userId="2bcc5b33-6bd2-4559-ac12-5178b17ae4b3" providerId="ADAL" clId="{E058BD1E-1C18-0B4B-86A0-6DE1E2E4609B}" dt="2024-11-12T16:41:01.923" v="104" actId="20577"/>
+          <ac:chgData name="Jordan May Von Eggers" userId="2bcc5b33-6bd2-4559-ac12-5178b17ae4b3" providerId="ADAL" clId="{E058BD1E-1C18-0B4B-86A0-6DE1E2E4609B}" dt="2024-11-26T19:38:40.554" v="152" actId="20577"/>
           <ac:spMkLst>
             <pc:docMk/>
             <pc:sldMk cId="2068078990" sldId="261"/>
@@ -2466,7 +2466,7 @@
           </ac:spMkLst>
         </pc:spChg>
         <pc:spChg chg="mod">
-          <ac:chgData name="Jordan May Von Eggers" userId="2bcc5b33-6bd2-4559-ac12-5178b17ae4b3" providerId="ADAL" clId="{E058BD1E-1C18-0B4B-86A0-6DE1E2E4609B}" dt="2024-11-12T16:40:46.788" v="90" actId="20577"/>
+          <ac:chgData name="Jordan May Von Eggers" userId="2bcc5b33-6bd2-4559-ac12-5178b17ae4b3" providerId="ADAL" clId="{E058BD1E-1C18-0B4B-86A0-6DE1E2E4609B}" dt="2024-11-26T19:38:49.601" v="160" actId="20577"/>
           <ac:spMkLst>
             <pc:docMk/>
             <pc:sldMk cId="2068078990" sldId="261"/>
@@ -2474,7 +2474,7 @@
           </ac:spMkLst>
         </pc:spChg>
         <pc:spChg chg="mod">
-          <ac:chgData name="Jordan May Von Eggers" userId="2bcc5b33-6bd2-4559-ac12-5178b17ae4b3" providerId="ADAL" clId="{E058BD1E-1C18-0B4B-86A0-6DE1E2E4609B}" dt="2024-11-12T16:40:56.041" v="98" actId="20577"/>
+          <ac:chgData name="Jordan May Von Eggers" userId="2bcc5b33-6bd2-4559-ac12-5178b17ae4b3" providerId="ADAL" clId="{E058BD1E-1C18-0B4B-86A0-6DE1E2E4609B}" dt="2024-11-26T19:38:58.245" v="178" actId="20577"/>
           <ac:spMkLst>
             <pc:docMk/>
             <pc:sldMk cId="2068078990" sldId="261"/>
@@ -2482,7 +2482,7 @@
           </ac:spMkLst>
         </pc:spChg>
         <pc:picChg chg="add mod">
-          <ac:chgData name="Jordan May Von Eggers" userId="2bcc5b33-6bd2-4559-ac12-5178b17ae4b3" providerId="ADAL" clId="{E058BD1E-1C18-0B4B-86A0-6DE1E2E4609B}" dt="2024-11-12T16:39:59.467" v="74" actId="1036"/>
+          <ac:chgData name="Jordan May Von Eggers" userId="2bcc5b33-6bd2-4559-ac12-5178b17ae4b3" providerId="ADAL" clId="{E058BD1E-1C18-0B4B-86A0-6DE1E2E4609B}" dt="2024-11-26T19:22:34.063" v="136" actId="14826"/>
           <ac:picMkLst>
             <pc:docMk/>
             <pc:sldMk cId="2068078990" sldId="261"/>
@@ -2498,7 +2498,7 @@
           </ac:picMkLst>
         </pc:picChg>
         <pc:picChg chg="add mod">
-          <ac:chgData name="Jordan May Von Eggers" userId="2bcc5b33-6bd2-4559-ac12-5178b17ae4b3" providerId="ADAL" clId="{E058BD1E-1C18-0B4B-86A0-6DE1E2E4609B}" dt="2024-11-12T16:45:54.378" v="111" actId="14826"/>
+          <ac:chgData name="Jordan May Von Eggers" userId="2bcc5b33-6bd2-4559-ac12-5178b17ae4b3" providerId="ADAL" clId="{E058BD1E-1C18-0B4B-86A0-6DE1E2E4609B}" dt="2024-11-26T19:35:25.443" v="141" actId="14826"/>
           <ac:picMkLst>
             <pc:docMk/>
             <pc:sldMk cId="2068078990" sldId="261"/>
@@ -2514,7 +2514,7 @@
           </ac:picMkLst>
         </pc:picChg>
         <pc:picChg chg="mod">
-          <ac:chgData name="Jordan May Von Eggers" userId="2bcc5b33-6bd2-4559-ac12-5178b17ae4b3" providerId="ADAL" clId="{E058BD1E-1C18-0B4B-86A0-6DE1E2E4609B}" dt="2024-11-12T16:41:41.115" v="110" actId="14826"/>
+          <ac:chgData name="Jordan May Von Eggers" userId="2bcc5b33-6bd2-4559-ac12-5178b17ae4b3" providerId="ADAL" clId="{E058BD1E-1C18-0B4B-86A0-6DE1E2E4609B}" dt="2024-11-26T19:22:49.387" v="137" actId="14826"/>
           <ac:picMkLst>
             <pc:docMk/>
             <pc:sldMk cId="2068078990" sldId="261"/>
@@ -2522,7 +2522,7 @@
           </ac:picMkLst>
         </pc:picChg>
         <pc:picChg chg="mod">
-          <ac:chgData name="Jordan May Von Eggers" userId="2bcc5b33-6bd2-4559-ac12-5178b17ae4b3" providerId="ADAL" clId="{E058BD1E-1C18-0B4B-86A0-6DE1E2E4609B}" dt="2024-11-12T16:41:30.066" v="107" actId="14826"/>
+          <ac:chgData name="Jordan May Von Eggers" userId="2bcc5b33-6bd2-4559-ac12-5178b17ae4b3" providerId="ADAL" clId="{E058BD1E-1C18-0B4B-86A0-6DE1E2E4609B}" dt="2024-11-26T19:36:06.646" v="142" actId="14826"/>
           <ac:picMkLst>
             <pc:docMk/>
             <pc:sldMk cId="2068078990" sldId="261"/>
@@ -2577,6 +2577,204 @@
             <ac:cxnSpMk id="35" creationId="{D81CEE5E-F204-4BA7-A0C1-7AE1765B2923}"/>
           </ac:cxnSpMkLst>
         </pc:cxnChg>
+      </pc:sldChg>
+      <pc:sldChg chg="addSp modSp add mod modNotesTx">
+        <pc:chgData name="Jordan May Von Eggers" userId="2bcc5b33-6bd2-4559-ac12-5178b17ae4b3" providerId="ADAL" clId="{E058BD1E-1C18-0B4B-86A0-6DE1E2E4609B}" dt="2024-11-26T19:45:35.288" v="243" actId="20577"/>
+        <pc:sldMkLst>
+          <pc:docMk/>
+          <pc:sldMk cId="2375331731" sldId="262"/>
+        </pc:sldMkLst>
+        <pc:spChg chg="mod">
+          <ac:chgData name="Jordan May Von Eggers" userId="2bcc5b33-6bd2-4559-ac12-5178b17ae4b3" providerId="ADAL" clId="{E058BD1E-1C18-0B4B-86A0-6DE1E2E4609B}" dt="2024-11-26T19:45:17.596" v="225" actId="20577"/>
+          <ac:spMkLst>
+            <pc:docMk/>
+            <pc:sldMk cId="2375331731" sldId="262"/>
+            <ac:spMk id="7" creationId="{0D20DA7B-A846-AB8B-08E7-E7AF9D66E197}"/>
+          </ac:spMkLst>
+        </pc:spChg>
+        <pc:spChg chg="mod">
+          <ac:chgData name="Jordan May Von Eggers" userId="2bcc5b33-6bd2-4559-ac12-5178b17ae4b3" providerId="ADAL" clId="{E058BD1E-1C18-0B4B-86A0-6DE1E2E4609B}" dt="2024-11-26T19:45:35.288" v="243" actId="20577"/>
+          <ac:spMkLst>
+            <pc:docMk/>
+            <pc:sldMk cId="2375331731" sldId="262"/>
+            <ac:spMk id="9" creationId="{204A079C-A8E4-8AC8-15BB-794D595400BF}"/>
+          </ac:spMkLst>
+        </pc:spChg>
+        <pc:spChg chg="mod">
+          <ac:chgData name="Jordan May Von Eggers" userId="2bcc5b33-6bd2-4559-ac12-5178b17ae4b3" providerId="ADAL" clId="{E058BD1E-1C18-0B4B-86A0-6DE1E2E4609B}" dt="2024-11-26T19:45:28.681" v="233" actId="20577"/>
+          <ac:spMkLst>
+            <pc:docMk/>
+            <pc:sldMk cId="2375331731" sldId="262"/>
+            <ac:spMk id="11" creationId="{C336CA75-6C0E-8054-81A9-7960F6FA2194}"/>
+          </ac:spMkLst>
+        </pc:spChg>
+        <pc:spChg chg="mod">
+          <ac:chgData name="Jordan May Von Eggers" userId="2bcc5b33-6bd2-4559-ac12-5178b17ae4b3" providerId="ADAL" clId="{E058BD1E-1C18-0B4B-86A0-6DE1E2E4609B}" dt="2024-11-26T19:43:25.559" v="200" actId="20577"/>
+          <ac:spMkLst>
+            <pc:docMk/>
+            <pc:sldMk cId="2375331731" sldId="262"/>
+            <ac:spMk id="27" creationId="{6BE0CB4D-DC73-6D43-0BFD-B039E4B4E095}"/>
+          </ac:spMkLst>
+        </pc:spChg>
+        <pc:spChg chg="mod">
+          <ac:chgData name="Jordan May Von Eggers" userId="2bcc5b33-6bd2-4559-ac12-5178b17ae4b3" providerId="ADAL" clId="{E058BD1E-1C18-0B4B-86A0-6DE1E2E4609B}" dt="2024-11-26T19:44:48.357" v="215" actId="20577"/>
+          <ac:spMkLst>
+            <pc:docMk/>
+            <pc:sldMk cId="2375331731" sldId="262"/>
+            <ac:spMk id="33" creationId="{19EA5EC0-A14A-4B0E-34A3-9EEE5C3B0800}"/>
+          </ac:spMkLst>
+        </pc:spChg>
+        <pc:spChg chg="mod">
+          <ac:chgData name="Jordan May Von Eggers" userId="2bcc5b33-6bd2-4559-ac12-5178b17ae4b3" providerId="ADAL" clId="{E058BD1E-1C18-0B4B-86A0-6DE1E2E4609B}" dt="2024-11-26T19:44:40.036" v="207" actId="20577"/>
+          <ac:spMkLst>
+            <pc:docMk/>
+            <pc:sldMk cId="2375331731" sldId="262"/>
+            <ac:spMk id="37" creationId="{ECD09860-2E26-A502-58F7-2BBA15D0CD40}"/>
+          </ac:spMkLst>
+        </pc:spChg>
+        <pc:spChg chg="mod">
+          <ac:chgData name="Jordan May Von Eggers" userId="2bcc5b33-6bd2-4559-ac12-5178b17ae4b3" providerId="ADAL" clId="{E058BD1E-1C18-0B4B-86A0-6DE1E2E4609B}" dt="2024-11-26T19:44:52.938" v="223" actId="20577"/>
+          <ac:spMkLst>
+            <pc:docMk/>
+            <pc:sldMk cId="2375331731" sldId="262"/>
+            <ac:spMk id="38" creationId="{F26B67FA-9377-8D14-3106-2FCFF91AD194}"/>
+          </ac:spMkLst>
+        </pc:spChg>
+        <pc:picChg chg="add mod">
+          <ac:chgData name="Jordan May Von Eggers" userId="2bcc5b33-6bd2-4559-ac12-5178b17ae4b3" providerId="ADAL" clId="{E058BD1E-1C18-0B4B-86A0-6DE1E2E4609B}" dt="2024-11-26T19:39:59.764" v="187" actId="571"/>
+          <ac:picMkLst>
+            <pc:docMk/>
+            <pc:sldMk cId="2375331731" sldId="262"/>
+            <ac:picMk id="2" creationId="{63B54FDE-B6F9-80E4-94EA-E21CC987FBD0}"/>
+          </ac:picMkLst>
+        </pc:picChg>
+        <pc:picChg chg="mod">
+          <ac:chgData name="Jordan May Von Eggers" userId="2bcc5b33-6bd2-4559-ac12-5178b17ae4b3" providerId="ADAL" clId="{E058BD1E-1C18-0B4B-86A0-6DE1E2E4609B}" dt="2024-11-26T19:44:05.504" v="201" actId="14826"/>
+          <ac:picMkLst>
+            <pc:docMk/>
+            <pc:sldMk cId="2375331731" sldId="262"/>
+            <ac:picMk id="3" creationId="{B56BD701-256A-B6B0-4B69-52519B8DE0B4}"/>
+          </ac:picMkLst>
+        </pc:picChg>
+        <pc:picChg chg="mod">
+          <ac:chgData name="Jordan May Von Eggers" userId="2bcc5b33-6bd2-4559-ac12-5178b17ae4b3" providerId="ADAL" clId="{E058BD1E-1C18-0B4B-86A0-6DE1E2E4609B}" dt="2024-11-26T19:43:09.806" v="190" actId="14826"/>
+          <ac:picMkLst>
+            <pc:docMk/>
+            <pc:sldMk cId="2375331731" sldId="262"/>
+            <ac:picMk id="6" creationId="{2AD3B3A7-68F8-0F96-2E61-80E2A12CA200}"/>
+          </ac:picMkLst>
+        </pc:picChg>
+        <pc:picChg chg="mod">
+          <ac:chgData name="Jordan May Von Eggers" userId="2bcc5b33-6bd2-4559-ac12-5178b17ae4b3" providerId="ADAL" clId="{E058BD1E-1C18-0B4B-86A0-6DE1E2E4609B}" dt="2024-11-26T19:44:14.083" v="202" actId="14826"/>
+          <ac:picMkLst>
+            <pc:docMk/>
+            <pc:sldMk cId="2375331731" sldId="262"/>
+            <ac:picMk id="13" creationId="{383878D6-1177-F081-6C24-F8C1641D5E8D}"/>
+          </ac:picMkLst>
+        </pc:picChg>
+        <pc:picChg chg="mod">
+          <ac:chgData name="Jordan May Von Eggers" userId="2bcc5b33-6bd2-4559-ac12-5178b17ae4b3" providerId="ADAL" clId="{E058BD1E-1C18-0B4B-86A0-6DE1E2E4609B}" dt="2024-11-26T19:44:21.965" v="203" actId="14826"/>
+          <ac:picMkLst>
+            <pc:docMk/>
+            <pc:sldMk cId="2375331731" sldId="262"/>
+            <ac:picMk id="18" creationId="{7E6FC67A-D3F2-B466-F29F-89987FF2F2DA}"/>
+          </ac:picMkLst>
+        </pc:picChg>
+      </pc:sldChg>
+      <pc:sldChg chg="modSp add mod">
+        <pc:chgData name="Jordan May Von Eggers" userId="2bcc5b33-6bd2-4559-ac12-5178b17ae4b3" providerId="ADAL" clId="{E058BD1E-1C18-0B4B-86A0-6DE1E2E4609B}" dt="2024-11-26T19:59:07.786" v="286" actId="20577"/>
+        <pc:sldMkLst>
+          <pc:docMk/>
+          <pc:sldMk cId="181068942" sldId="263"/>
+        </pc:sldMkLst>
+        <pc:spChg chg="mod">
+          <ac:chgData name="Jordan May Von Eggers" userId="2bcc5b33-6bd2-4559-ac12-5178b17ae4b3" providerId="ADAL" clId="{E058BD1E-1C18-0B4B-86A0-6DE1E2E4609B}" dt="2024-11-26T19:46:07.438" v="246" actId="20577"/>
+          <ac:spMkLst>
+            <pc:docMk/>
+            <pc:sldMk cId="181068942" sldId="263"/>
+            <ac:spMk id="7" creationId="{153DF881-BF27-3018-4AF9-9E5DB4D7E614}"/>
+          </ac:spMkLst>
+        </pc:spChg>
+        <pc:spChg chg="mod">
+          <ac:chgData name="Jordan May Von Eggers" userId="2bcc5b33-6bd2-4559-ac12-5178b17ae4b3" providerId="ADAL" clId="{E058BD1E-1C18-0B4B-86A0-6DE1E2E4609B}" dt="2024-11-26T19:46:21.478" v="254" actId="20577"/>
+          <ac:spMkLst>
+            <pc:docMk/>
+            <pc:sldMk cId="181068942" sldId="263"/>
+            <ac:spMk id="9" creationId="{FDA439D0-AFC5-6B99-A5BD-7A8262EE38F2}"/>
+          </ac:spMkLst>
+        </pc:spChg>
+        <pc:spChg chg="mod">
+          <ac:chgData name="Jordan May Von Eggers" userId="2bcc5b33-6bd2-4559-ac12-5178b17ae4b3" providerId="ADAL" clId="{E058BD1E-1C18-0B4B-86A0-6DE1E2E4609B}" dt="2024-11-26T19:59:07.786" v="286" actId="20577"/>
+          <ac:spMkLst>
+            <pc:docMk/>
+            <pc:sldMk cId="181068942" sldId="263"/>
+            <ac:spMk id="11" creationId="{0F903863-08D5-29EE-CFD2-564F5E7449D1}"/>
+          </ac:spMkLst>
+        </pc:spChg>
+        <pc:spChg chg="mod">
+          <ac:chgData name="Jordan May Von Eggers" userId="2bcc5b33-6bd2-4559-ac12-5178b17ae4b3" providerId="ADAL" clId="{E058BD1E-1C18-0B4B-86A0-6DE1E2E4609B}" dt="2024-11-26T19:47:26.021" v="258" actId="20577"/>
+          <ac:spMkLst>
+            <pc:docMk/>
+            <pc:sldMk cId="181068942" sldId="263"/>
+            <ac:spMk id="27" creationId="{E31D6988-FC2F-9E4F-FBCE-91D9E1ACCE35}"/>
+          </ac:spMkLst>
+        </pc:spChg>
+        <pc:spChg chg="mod">
+          <ac:chgData name="Jordan May Von Eggers" userId="2bcc5b33-6bd2-4559-ac12-5178b17ae4b3" providerId="ADAL" clId="{E058BD1E-1C18-0B4B-86A0-6DE1E2E4609B}" dt="2024-11-26T19:47:36.358" v="272" actId="20577"/>
+          <ac:spMkLst>
+            <pc:docMk/>
+            <pc:sldMk cId="181068942" sldId="263"/>
+            <ac:spMk id="33" creationId="{060E6BDB-3C5B-22FA-58BA-86F3DB4B243F}"/>
+          </ac:spMkLst>
+        </pc:spChg>
+        <pc:spChg chg="mod">
+          <ac:chgData name="Jordan May Von Eggers" userId="2bcc5b33-6bd2-4559-ac12-5178b17ae4b3" providerId="ADAL" clId="{E058BD1E-1C18-0B4B-86A0-6DE1E2E4609B}" dt="2024-11-26T19:47:31.137" v="262" actId="20577"/>
+          <ac:spMkLst>
+            <pc:docMk/>
+            <pc:sldMk cId="181068942" sldId="263"/>
+            <ac:spMk id="37" creationId="{6F8DB553-6284-1F6D-66C7-EF4809D63209}"/>
+          </ac:spMkLst>
+        </pc:spChg>
+        <pc:spChg chg="mod">
+          <ac:chgData name="Jordan May Von Eggers" userId="2bcc5b33-6bd2-4559-ac12-5178b17ae4b3" providerId="ADAL" clId="{E058BD1E-1C18-0B4B-86A0-6DE1E2E4609B}" dt="2024-11-26T19:47:42.762" v="280" actId="20577"/>
+          <ac:spMkLst>
+            <pc:docMk/>
+            <pc:sldMk cId="181068942" sldId="263"/>
+            <ac:spMk id="38" creationId="{1F8FE1C2-EC1E-D8E2-7527-E8A10C482607}"/>
+          </ac:spMkLst>
+        </pc:spChg>
+        <pc:picChg chg="mod">
+          <ac:chgData name="Jordan May Von Eggers" userId="2bcc5b33-6bd2-4559-ac12-5178b17ae4b3" providerId="ADAL" clId="{E058BD1E-1C18-0B4B-86A0-6DE1E2E4609B}" dt="2024-11-26T19:46:34.071" v="255" actId="14826"/>
+          <ac:picMkLst>
+            <pc:docMk/>
+            <pc:sldMk cId="181068942" sldId="263"/>
+            <ac:picMk id="3" creationId="{FEE8720A-F8A5-38FF-412C-E461D2DF4B23}"/>
+          </ac:picMkLst>
+        </pc:picChg>
+        <pc:picChg chg="mod">
+          <ac:chgData name="Jordan May Von Eggers" userId="2bcc5b33-6bd2-4559-ac12-5178b17ae4b3" providerId="ADAL" clId="{E058BD1E-1C18-0B4B-86A0-6DE1E2E4609B}" dt="2024-11-26T19:47:52.092" v="281" actId="14826"/>
+          <ac:picMkLst>
+            <pc:docMk/>
+            <pc:sldMk cId="181068942" sldId="263"/>
+            <ac:picMk id="6" creationId="{48D846B6-0538-C1F4-6BAF-11DA2B3E73C1}"/>
+          </ac:picMkLst>
+        </pc:picChg>
+        <pc:picChg chg="mod">
+          <ac:chgData name="Jordan May Von Eggers" userId="2bcc5b33-6bd2-4559-ac12-5178b17ae4b3" providerId="ADAL" clId="{E058BD1E-1C18-0B4B-86A0-6DE1E2E4609B}" dt="2024-11-26T19:46:41.680" v="256" actId="14826"/>
+          <ac:picMkLst>
+            <pc:docMk/>
+            <pc:sldMk cId="181068942" sldId="263"/>
+            <ac:picMk id="13" creationId="{427DB2B6-71E3-ADED-A37E-DFB486D1BCBF}"/>
+          </ac:picMkLst>
+        </pc:picChg>
+        <pc:picChg chg="mod">
+          <ac:chgData name="Jordan May Von Eggers" userId="2bcc5b33-6bd2-4559-ac12-5178b17ae4b3" providerId="ADAL" clId="{E058BD1E-1C18-0B4B-86A0-6DE1E2E4609B}" dt="2024-11-26T19:48:00.238" v="282" actId="14826"/>
+          <ac:picMkLst>
+            <pc:docMk/>
+            <pc:sldMk cId="181068942" sldId="263"/>
+            <ac:picMk id="18" creationId="{F1EEECF4-994B-C75E-EA18-EB89078D259B}"/>
+          </ac:picMkLst>
+        </pc:picChg>
       </pc:sldChg>
       <pc:sldMasterChg chg="modSp modSldLayout">
         <pc:chgData name="Jordan May Von Eggers" userId="2bcc5b33-6bd2-4559-ac12-5178b17ae4b3" providerId="ADAL" clId="{E058BD1E-1C18-0B4B-86A0-6DE1E2E4609B}" dt="2024-11-12T16:39:35.163" v="52"/>
@@ -2939,7 +3137,7 @@
           <a:p>
             <a:fld id="{4AB11435-BC9C-C649-B93C-0243AFB6DB2E}" type="datetimeFigureOut">
               <a:rPr lang="en-US" smtClean="0"/>
-              <a:t>11/12/24</a:t>
+              <a:t>11/26/24</a:t>
             </a:fld>
             <a:endParaRPr lang="en-US"/>
           </a:p>
@@ -3214,133 +3412,6 @@
         <p:cNvPr id="1" name="">
           <a:extLst>
             <a:ext uri="{FF2B5EF4-FFF2-40B4-BE49-F238E27FC236}">
-              <a16:creationId xmlns:a16="http://schemas.microsoft.com/office/drawing/2014/main" id="{20D6A0D6-F810-707F-BF41-E219CEC1A566}"/>
-            </a:ext>
-          </a:extLst>
-        </p:cNvPr>
-        <p:cNvGrpSpPr/>
-        <p:nvPr/>
-      </p:nvGrpSpPr>
-      <p:grpSpPr>
-        <a:xfrm>
-          <a:off x="0" y="0"/>
-          <a:ext cx="0" cy="0"/>
-          <a:chOff x="0" y="0"/>
-          <a:chExt cx="0" cy="0"/>
-        </a:xfrm>
-      </p:grpSpPr>
-      <p:sp>
-        <p:nvSpPr>
-          <p:cNvPr id="2" name="Slide Image Placeholder 1">
-            <a:extLst>
-              <a:ext uri="{FF2B5EF4-FFF2-40B4-BE49-F238E27FC236}">
-                <a16:creationId xmlns:a16="http://schemas.microsoft.com/office/drawing/2014/main" id="{DAE87B59-78DB-1546-13E9-427246984DD0}"/>
-              </a:ext>
-            </a:extLst>
-          </p:cNvPr>
-          <p:cNvSpPr>
-            <a:spLocks noGrp="1" noRot="1" noChangeAspect="1"/>
-          </p:cNvSpPr>
-          <p:nvPr>
-            <p:ph type="sldImg"/>
-          </p:nvPr>
-        </p:nvSpPr>
-        <p:spPr>
-          <a:xfrm>
-            <a:off x="1303338" y="1143000"/>
-            <a:ext cx="4251325" cy="3086100"/>
-          </a:xfrm>
-        </p:spPr>
-      </p:sp>
-      <p:sp>
-        <p:nvSpPr>
-          <p:cNvPr id="3" name="Notes Placeholder 2">
-            <a:extLst>
-              <a:ext uri="{FF2B5EF4-FFF2-40B4-BE49-F238E27FC236}">
-                <a16:creationId xmlns:a16="http://schemas.microsoft.com/office/drawing/2014/main" id="{748BE4EB-11F6-FE1C-49C2-3D91C1DBF9C6}"/>
-              </a:ext>
-            </a:extLst>
-          </p:cNvPr>
-          <p:cNvSpPr>
-            <a:spLocks noGrp="1"/>
-          </p:cNvSpPr>
-          <p:nvPr>
-            <p:ph type="body" idx="1"/>
-          </p:nvPr>
-        </p:nvSpPr>
-        <p:spPr/>
-        <p:txBody>
-          <a:bodyPr/>
-          <a:lstStyle/>
-          <a:p>
-            <a:r>
-              <a:rPr lang="en-US" dirty="0"/>
-              <a:t>cross </a:t>
-            </a:r>
-            <a:r>
-              <a:rPr lang="en-US" dirty="0" err="1"/>
-              <a:t>val</a:t>
-            </a:r>
-            <a:r>
-              <a:rPr lang="en-US" dirty="0"/>
-              <a:t> with training dataset</a:t>
-            </a:r>
-          </a:p>
-          <a:p>
-            <a:endParaRPr lang="en-US" dirty="0"/>
-          </a:p>
-        </p:txBody>
-      </p:sp>
-      <p:sp>
-        <p:nvSpPr>
-          <p:cNvPr id="4" name="Slide Number Placeholder 3">
-            <a:extLst>
-              <a:ext uri="{FF2B5EF4-FFF2-40B4-BE49-F238E27FC236}">
-                <a16:creationId xmlns:a16="http://schemas.microsoft.com/office/drawing/2014/main" id="{13EBE85D-D894-96A0-BB31-FC9EF06812CE}"/>
-              </a:ext>
-            </a:extLst>
-          </p:cNvPr>
-          <p:cNvSpPr>
-            <a:spLocks noGrp="1"/>
-          </p:cNvSpPr>
-          <p:nvPr>
-            <p:ph type="sldNum" sz="quarter" idx="5"/>
-          </p:nvPr>
-        </p:nvSpPr>
-        <p:spPr/>
-        <p:txBody>
-          <a:bodyPr/>
-          <a:lstStyle/>
-          <a:p>
-            <a:fld id="{62CADFC7-EF9B-2D4D-A055-5851C500C558}" type="slidenum">
-              <a:rPr lang="en-US" smtClean="0"/>
-              <a:t>1</a:t>
-            </a:fld>
-            <a:endParaRPr lang="en-US"/>
-          </a:p>
-        </p:txBody>
-      </p:sp>
-    </p:spTree>
-    <p:extLst>
-      <p:ext uri="{BB962C8B-B14F-4D97-AF65-F5344CB8AC3E}">
-        <p14:creationId xmlns:p14="http://schemas.microsoft.com/office/powerpoint/2010/main" val="24187815"/>
-      </p:ext>
-    </p:extLst>
-  </p:cSld>
-  <p:clrMapOvr>
-    <a:masterClrMapping/>
-  </p:clrMapOvr>
-</p:notes>
-</file>
-
-<file path=ppt/notesSlides/notesSlide2.xml><?xml version="1.0" encoding="utf-8"?>
-<p:notes xmlns:a="http://schemas.openxmlformats.org/drawingml/2006/main" xmlns:r="http://schemas.openxmlformats.org/officeDocument/2006/relationships" xmlns:p="http://schemas.openxmlformats.org/presentationml/2006/main">
-  <p:cSld>
-    <p:spTree>
-      <p:nvGrpSpPr>
-        <p:cNvPr id="1" name="">
-          <a:extLst>
-            <a:ext uri="{FF2B5EF4-FFF2-40B4-BE49-F238E27FC236}">
               <a16:creationId xmlns:a16="http://schemas.microsoft.com/office/drawing/2014/main" id="{91E49545-4AE9-6066-E58D-A796D8F0D039}"/>
             </a:ext>
           </a:extLst>
@@ -3402,19 +3473,8 @@
           <a:p>
             <a:r>
               <a:rPr lang="en-US" dirty="0"/>
-              <a:t>cross </a:t>
-            </a:r>
-            <a:r>
-              <a:rPr lang="en-US" dirty="0" err="1"/>
-              <a:t>val</a:t>
-            </a:r>
-            <a:r>
-              <a:rPr lang="en-US" dirty="0"/>
-              <a:t> with training dataset</a:t>
-            </a:r>
-          </a:p>
-          <a:p>
-            <a:endParaRPr lang="en-US" dirty="0"/>
+              <a:t>all lakes</a:t>
+            </a:r>
           </a:p>
         </p:txBody>
       </p:sp>
@@ -3441,7 +3501,7 @@
           <a:p>
             <a:fld id="{62CADFC7-EF9B-2D4D-A055-5851C500C558}" type="slidenum">
               <a:rPr lang="en-US" smtClean="0"/>
-              <a:t>2</a:t>
+              <a:t>1</a:t>
             </a:fld>
             <a:endParaRPr lang="en-US"/>
           </a:p>
@@ -3451,6 +3511,244 @@
     <p:extLst>
       <p:ext uri="{BB962C8B-B14F-4D97-AF65-F5344CB8AC3E}">
         <p14:creationId xmlns:p14="http://schemas.microsoft.com/office/powerpoint/2010/main" val="1839436915"/>
+      </p:ext>
+    </p:extLst>
+  </p:cSld>
+  <p:clrMapOvr>
+    <a:masterClrMapping/>
+  </p:clrMapOvr>
+</p:notes>
+</file>
+
+<file path=ppt/notesSlides/notesSlide2.xml><?xml version="1.0" encoding="utf-8"?>
+<p:notes xmlns:a="http://schemas.openxmlformats.org/drawingml/2006/main" xmlns:r="http://schemas.openxmlformats.org/officeDocument/2006/relationships" xmlns:p="http://schemas.openxmlformats.org/presentationml/2006/main">
+  <p:cSld>
+    <p:spTree>
+      <p:nvGrpSpPr>
+        <p:cNvPr id="1" name="">
+          <a:extLst>
+            <a:ext uri="{FF2B5EF4-FFF2-40B4-BE49-F238E27FC236}">
+              <a16:creationId xmlns:a16="http://schemas.microsoft.com/office/drawing/2014/main" id="{2FB7656C-D855-60E9-1614-19A9D739A6D7}"/>
+            </a:ext>
+          </a:extLst>
+        </p:cNvPr>
+        <p:cNvGrpSpPr/>
+        <p:nvPr/>
+      </p:nvGrpSpPr>
+      <p:grpSpPr>
+        <a:xfrm>
+          <a:off x="0" y="0"/>
+          <a:ext cx="0" cy="0"/>
+          <a:chOff x="0" y="0"/>
+          <a:chExt cx="0" cy="0"/>
+        </a:xfrm>
+      </p:grpSpPr>
+      <p:sp>
+        <p:nvSpPr>
+          <p:cNvPr id="2" name="Slide Image Placeholder 1">
+            <a:extLst>
+              <a:ext uri="{FF2B5EF4-FFF2-40B4-BE49-F238E27FC236}">
+                <a16:creationId xmlns:a16="http://schemas.microsoft.com/office/drawing/2014/main" id="{2F3AB990-349F-F81B-8EBC-B866B20512B4}"/>
+              </a:ext>
+            </a:extLst>
+          </p:cNvPr>
+          <p:cNvSpPr>
+            <a:spLocks noGrp="1" noRot="1" noChangeAspect="1"/>
+          </p:cNvSpPr>
+          <p:nvPr>
+            <p:ph type="sldImg"/>
+          </p:nvPr>
+        </p:nvSpPr>
+        <p:spPr>
+          <a:xfrm>
+            <a:off x="1303338" y="1143000"/>
+            <a:ext cx="4251325" cy="3086100"/>
+          </a:xfrm>
+        </p:spPr>
+      </p:sp>
+      <p:sp>
+        <p:nvSpPr>
+          <p:cNvPr id="3" name="Notes Placeholder 2">
+            <a:extLst>
+              <a:ext uri="{FF2B5EF4-FFF2-40B4-BE49-F238E27FC236}">
+                <a16:creationId xmlns:a16="http://schemas.microsoft.com/office/drawing/2014/main" id="{7E9AC5E6-9033-A2B7-CEF7-67534E7F4E5F}"/>
+              </a:ext>
+            </a:extLst>
+          </p:cNvPr>
+          <p:cNvSpPr>
+            <a:spLocks noGrp="1"/>
+          </p:cNvSpPr>
+          <p:nvPr>
+            <p:ph type="body" idx="1"/>
+          </p:nvPr>
+        </p:nvSpPr>
+        <p:spPr/>
+        <p:txBody>
+          <a:bodyPr/>
+          <a:lstStyle/>
+          <a:p>
+            <a:r>
+              <a:rPr lang="en-US" dirty="0"/>
+              <a:t>small</a:t>
+            </a:r>
+          </a:p>
+          <a:p>
+            <a:endParaRPr lang="en-US" dirty="0"/>
+          </a:p>
+        </p:txBody>
+      </p:sp>
+      <p:sp>
+        <p:nvSpPr>
+          <p:cNvPr id="4" name="Slide Number Placeholder 3">
+            <a:extLst>
+              <a:ext uri="{FF2B5EF4-FFF2-40B4-BE49-F238E27FC236}">
+                <a16:creationId xmlns:a16="http://schemas.microsoft.com/office/drawing/2014/main" id="{474677D0-B5CC-F0BD-AB10-7ECAE6AC7441}"/>
+              </a:ext>
+            </a:extLst>
+          </p:cNvPr>
+          <p:cNvSpPr>
+            <a:spLocks noGrp="1"/>
+          </p:cNvSpPr>
+          <p:nvPr>
+            <p:ph type="sldNum" sz="quarter" idx="5"/>
+          </p:nvPr>
+        </p:nvSpPr>
+        <p:spPr/>
+        <p:txBody>
+          <a:bodyPr/>
+          <a:lstStyle/>
+          <a:p>
+            <a:fld id="{62CADFC7-EF9B-2D4D-A055-5851C500C558}" type="slidenum">
+              <a:rPr lang="en-US" smtClean="0"/>
+              <a:t>2</a:t>
+            </a:fld>
+            <a:endParaRPr lang="en-US"/>
+          </a:p>
+        </p:txBody>
+      </p:sp>
+    </p:spTree>
+    <p:extLst>
+      <p:ext uri="{BB962C8B-B14F-4D97-AF65-F5344CB8AC3E}">
+        <p14:creationId xmlns:p14="http://schemas.microsoft.com/office/powerpoint/2010/main" val="3083938150"/>
+      </p:ext>
+    </p:extLst>
+  </p:cSld>
+  <p:clrMapOvr>
+    <a:masterClrMapping/>
+  </p:clrMapOvr>
+</p:notes>
+</file>
+
+<file path=ppt/notesSlides/notesSlide3.xml><?xml version="1.0" encoding="utf-8"?>
+<p:notes xmlns:a="http://schemas.openxmlformats.org/drawingml/2006/main" xmlns:r="http://schemas.openxmlformats.org/officeDocument/2006/relationships" xmlns:p="http://schemas.openxmlformats.org/presentationml/2006/main">
+  <p:cSld>
+    <p:spTree>
+      <p:nvGrpSpPr>
+        <p:cNvPr id="1" name="">
+          <a:extLst>
+            <a:ext uri="{FF2B5EF4-FFF2-40B4-BE49-F238E27FC236}">
+              <a16:creationId xmlns:a16="http://schemas.microsoft.com/office/drawing/2014/main" id="{0EFF0DC2-26A7-03D3-D752-7B3610DDB633}"/>
+            </a:ext>
+          </a:extLst>
+        </p:cNvPr>
+        <p:cNvGrpSpPr/>
+        <p:nvPr/>
+      </p:nvGrpSpPr>
+      <p:grpSpPr>
+        <a:xfrm>
+          <a:off x="0" y="0"/>
+          <a:ext cx="0" cy="0"/>
+          <a:chOff x="0" y="0"/>
+          <a:chExt cx="0" cy="0"/>
+        </a:xfrm>
+      </p:grpSpPr>
+      <p:sp>
+        <p:nvSpPr>
+          <p:cNvPr id="2" name="Slide Image Placeholder 1">
+            <a:extLst>
+              <a:ext uri="{FF2B5EF4-FFF2-40B4-BE49-F238E27FC236}">
+                <a16:creationId xmlns:a16="http://schemas.microsoft.com/office/drawing/2014/main" id="{39EED0AB-3E6F-D503-978B-50C948C97C32}"/>
+              </a:ext>
+            </a:extLst>
+          </p:cNvPr>
+          <p:cNvSpPr>
+            <a:spLocks noGrp="1" noRot="1" noChangeAspect="1"/>
+          </p:cNvSpPr>
+          <p:nvPr>
+            <p:ph type="sldImg"/>
+          </p:nvPr>
+        </p:nvSpPr>
+        <p:spPr>
+          <a:xfrm>
+            <a:off x="1303338" y="1143000"/>
+            <a:ext cx="4251325" cy="3086100"/>
+          </a:xfrm>
+        </p:spPr>
+      </p:sp>
+      <p:sp>
+        <p:nvSpPr>
+          <p:cNvPr id="3" name="Notes Placeholder 2">
+            <a:extLst>
+              <a:ext uri="{FF2B5EF4-FFF2-40B4-BE49-F238E27FC236}">
+                <a16:creationId xmlns:a16="http://schemas.microsoft.com/office/drawing/2014/main" id="{249F6BC1-7947-FF7D-80BF-A0EF0EF7026A}"/>
+              </a:ext>
+            </a:extLst>
+          </p:cNvPr>
+          <p:cNvSpPr>
+            <a:spLocks noGrp="1"/>
+          </p:cNvSpPr>
+          <p:nvPr>
+            <p:ph type="body" idx="1"/>
+          </p:nvPr>
+        </p:nvSpPr>
+        <p:spPr/>
+        <p:txBody>
+          <a:bodyPr/>
+          <a:lstStyle/>
+          <a:p>
+            <a:r>
+              <a:rPr lang="en-US" dirty="0"/>
+              <a:t>small</a:t>
+            </a:r>
+          </a:p>
+          <a:p>
+            <a:endParaRPr lang="en-US" dirty="0"/>
+          </a:p>
+        </p:txBody>
+      </p:sp>
+      <p:sp>
+        <p:nvSpPr>
+          <p:cNvPr id="4" name="Slide Number Placeholder 3">
+            <a:extLst>
+              <a:ext uri="{FF2B5EF4-FFF2-40B4-BE49-F238E27FC236}">
+                <a16:creationId xmlns:a16="http://schemas.microsoft.com/office/drawing/2014/main" id="{CB52D1EC-7F15-7F60-011A-DDD43E7047F3}"/>
+              </a:ext>
+            </a:extLst>
+          </p:cNvPr>
+          <p:cNvSpPr>
+            <a:spLocks noGrp="1"/>
+          </p:cNvSpPr>
+          <p:nvPr>
+            <p:ph type="sldNum" sz="quarter" idx="5"/>
+          </p:nvPr>
+        </p:nvSpPr>
+        <p:spPr/>
+        <p:txBody>
+          <a:bodyPr/>
+          <a:lstStyle/>
+          <a:p>
+            <a:fld id="{62CADFC7-EF9B-2D4D-A055-5851C500C558}" type="slidenum">
+              <a:rPr lang="en-US" smtClean="0"/>
+              <a:t>3</a:t>
+            </a:fld>
+            <a:endParaRPr lang="en-US"/>
+          </a:p>
+        </p:txBody>
+      </p:sp>
+    </p:spTree>
+    <p:extLst>
+      <p:ext uri="{BB962C8B-B14F-4D97-AF65-F5344CB8AC3E}">
+        <p14:creationId xmlns:p14="http://schemas.microsoft.com/office/powerpoint/2010/main" val="1755149698"/>
       </p:ext>
     </p:extLst>
   </p:cSld>
@@ -3591,7 +3889,7 @@
           <a:p>
             <a:fld id="{C128D3E9-2565-C645-BAD9-D02505D431F5}" type="datetimeFigureOut">
               <a:rPr lang="en-US" smtClean="0"/>
-              <a:t>11/12/24</a:t>
+              <a:t>11/26/24</a:t>
             </a:fld>
             <a:endParaRPr lang="en-US"/>
           </a:p>
@@ -3761,7 +4059,7 @@
           <a:p>
             <a:fld id="{C128D3E9-2565-C645-BAD9-D02505D431F5}" type="datetimeFigureOut">
               <a:rPr lang="en-US" smtClean="0"/>
-              <a:t>11/12/24</a:t>
+              <a:t>11/26/24</a:t>
             </a:fld>
             <a:endParaRPr lang="en-US"/>
           </a:p>
@@ -3941,7 +4239,7 @@
           <a:p>
             <a:fld id="{C128D3E9-2565-C645-BAD9-D02505D431F5}" type="datetimeFigureOut">
               <a:rPr lang="en-US" smtClean="0"/>
-              <a:t>11/12/24</a:t>
+              <a:t>11/26/24</a:t>
             </a:fld>
             <a:endParaRPr lang="en-US"/>
           </a:p>
@@ -4111,7 +4409,7 @@
           <a:p>
             <a:fld id="{C128D3E9-2565-C645-BAD9-D02505D431F5}" type="datetimeFigureOut">
               <a:rPr lang="en-US" smtClean="0"/>
-              <a:t>11/12/24</a:t>
+              <a:t>11/26/24</a:t>
             </a:fld>
             <a:endParaRPr lang="en-US"/>
           </a:p>
@@ -4357,7 +4655,7 @@
           <a:p>
             <a:fld id="{C128D3E9-2565-C645-BAD9-D02505D431F5}" type="datetimeFigureOut">
               <a:rPr lang="en-US" smtClean="0"/>
-              <a:t>11/12/24</a:t>
+              <a:t>11/26/24</a:t>
             </a:fld>
             <a:endParaRPr lang="en-US"/>
           </a:p>
@@ -4589,7 +4887,7 @@
           <a:p>
             <a:fld id="{C128D3E9-2565-C645-BAD9-D02505D431F5}" type="datetimeFigureOut">
               <a:rPr lang="en-US" smtClean="0"/>
-              <a:t>11/12/24</a:t>
+              <a:t>11/26/24</a:t>
             </a:fld>
             <a:endParaRPr lang="en-US"/>
           </a:p>
@@ -4956,7 +5254,7 @@
           <a:p>
             <a:fld id="{C128D3E9-2565-C645-BAD9-D02505D431F5}" type="datetimeFigureOut">
               <a:rPr lang="en-US" smtClean="0"/>
-              <a:t>11/12/24</a:t>
+              <a:t>11/26/24</a:t>
             </a:fld>
             <a:endParaRPr lang="en-US"/>
           </a:p>
@@ -5074,7 +5372,7 @@
           <a:p>
             <a:fld id="{C128D3E9-2565-C645-BAD9-D02505D431F5}" type="datetimeFigureOut">
               <a:rPr lang="en-US" smtClean="0"/>
-              <a:t>11/12/24</a:t>
+              <a:t>11/26/24</a:t>
             </a:fld>
             <a:endParaRPr lang="en-US"/>
           </a:p>
@@ -5169,7 +5467,7 @@
           <a:p>
             <a:fld id="{C128D3E9-2565-C645-BAD9-D02505D431F5}" type="datetimeFigureOut">
               <a:rPr lang="en-US" smtClean="0"/>
-              <a:t>11/12/24</a:t>
+              <a:t>11/26/24</a:t>
             </a:fld>
             <a:endParaRPr lang="en-US"/>
           </a:p>
@@ -5446,7 +5744,7 @@
           <a:p>
             <a:fld id="{C128D3E9-2565-C645-BAD9-D02505D431F5}" type="datetimeFigureOut">
               <a:rPr lang="en-US" smtClean="0"/>
-              <a:t>11/12/24</a:t>
+              <a:t>11/26/24</a:t>
             </a:fld>
             <a:endParaRPr lang="en-US"/>
           </a:p>
@@ -5703,7 +6001,7 @@
           <a:p>
             <a:fld id="{C128D3E9-2565-C645-BAD9-D02505D431F5}" type="datetimeFigureOut">
               <a:rPr lang="en-US" smtClean="0"/>
-              <a:t>11/12/24</a:t>
+              <a:t>11/26/24</a:t>
             </a:fld>
             <a:endParaRPr lang="en-US"/>
           </a:p>
@@ -5916,7 +6214,7 @@
           <a:p>
             <a:fld id="{C128D3E9-2565-C645-BAD9-D02505D431F5}" type="datetimeFigureOut">
               <a:rPr lang="en-US" smtClean="0"/>
-              <a:t>11/12/24</a:t>
+              <a:t>11/26/24</a:t>
             </a:fld>
             <a:endParaRPr lang="en-US"/>
           </a:p>
@@ -6312,1117 +6610,6 @@
         <p:cNvPr id="1" name="">
           <a:extLst>
             <a:ext uri="{FF2B5EF4-FFF2-40B4-BE49-F238E27FC236}">
-              <a16:creationId xmlns:a16="http://schemas.microsoft.com/office/drawing/2014/main" id="{AE22489C-976D-4E58-C900-1ED16B96D2E0}"/>
-            </a:ext>
-          </a:extLst>
-        </p:cNvPr>
-        <p:cNvGrpSpPr/>
-        <p:nvPr/>
-      </p:nvGrpSpPr>
-      <p:grpSpPr>
-        <a:xfrm>
-          <a:off x="0" y="0"/>
-          <a:ext cx="0" cy="0"/>
-          <a:chOff x="0" y="0"/>
-          <a:chExt cx="0" cy="0"/>
-        </a:xfrm>
-      </p:grpSpPr>
-      <p:pic>
-        <p:nvPicPr>
-          <p:cNvPr id="3" name="Picture 2" descr="A graph with text on it&#10;&#10;Description automatically generated with medium confidence">
-            <a:extLst>
-              <a:ext uri="{FF2B5EF4-FFF2-40B4-BE49-F238E27FC236}">
-                <a16:creationId xmlns:a16="http://schemas.microsoft.com/office/drawing/2014/main" id="{F5BBBAA3-62E9-AD63-F3F5-17DA5F3541C2}"/>
-              </a:ext>
-            </a:extLst>
-          </p:cNvPr>
-          <p:cNvPicPr>
-            <a:picLocks noChangeAspect="1"/>
-          </p:cNvPicPr>
-          <p:nvPr/>
-        </p:nvPicPr>
-        <p:blipFill>
-          <a:blip r:embed="rId3"/>
-          <a:stretch>
-            <a:fillRect/>
-          </a:stretch>
-        </p:blipFill>
-        <p:spPr>
-          <a:xfrm>
-            <a:off x="5990141" y="2651473"/>
-            <a:ext cx="6299200" cy="3657600"/>
-          </a:xfrm>
-          <a:prstGeom prst="rect">
-            <a:avLst/>
-          </a:prstGeom>
-        </p:spPr>
-      </p:pic>
-      <p:pic>
-        <p:nvPicPr>
-          <p:cNvPr id="20" name="Picture 19">
-            <a:extLst>
-              <a:ext uri="{FF2B5EF4-FFF2-40B4-BE49-F238E27FC236}">
-                <a16:creationId xmlns:a16="http://schemas.microsoft.com/office/drawing/2014/main" id="{AF0F9ECA-9609-867F-62EF-FF0BE58441EA}"/>
-              </a:ext>
-            </a:extLst>
-          </p:cNvPr>
-          <p:cNvPicPr>
-            <a:picLocks noChangeAspect="1"/>
-          </p:cNvPicPr>
-          <p:nvPr/>
-        </p:nvPicPr>
-        <p:blipFill>
-          <a:blip r:embed="rId4"/>
-          <a:srcRect/>
-          <a:stretch/>
-        </p:blipFill>
-        <p:spPr>
-          <a:xfrm>
-            <a:off x="138208" y="2651919"/>
-            <a:ext cx="6121400" cy="3657600"/>
-          </a:xfrm>
-          <a:prstGeom prst="rect">
-            <a:avLst/>
-          </a:prstGeom>
-        </p:spPr>
-      </p:pic>
-      <p:sp>
-        <p:nvSpPr>
-          <p:cNvPr id="7" name="Rounded Rectangle 6">
-            <a:extLst>
-              <a:ext uri="{FF2B5EF4-FFF2-40B4-BE49-F238E27FC236}">
-                <a16:creationId xmlns:a16="http://schemas.microsoft.com/office/drawing/2014/main" id="{75C5623E-3FFE-0E88-0656-712B135B5E76}"/>
-              </a:ext>
-            </a:extLst>
-          </p:cNvPr>
-          <p:cNvSpPr/>
-          <p:nvPr/>
-        </p:nvSpPr>
-        <p:spPr>
-          <a:xfrm>
-            <a:off x="1690436" y="-450873"/>
-            <a:ext cx="2117558" cy="673768"/>
-          </a:xfrm>
-          <a:prstGeom prst="roundRect">
-            <a:avLst/>
-          </a:prstGeom>
-          <a:solidFill>
-            <a:srgbClr val="000000"/>
-          </a:solidFill>
-          <a:ln w="28575">
-            <a:solidFill>
-              <a:schemeClr val="tx1"/>
-            </a:solidFill>
-          </a:ln>
-        </p:spPr>
-        <p:style>
-          <a:lnRef idx="2">
-            <a:schemeClr val="accent1">
-              <a:shade val="15000"/>
-            </a:schemeClr>
-          </a:lnRef>
-          <a:fillRef idx="1">
-            <a:schemeClr val="accent1"/>
-          </a:fillRef>
-          <a:effectRef idx="0">
-            <a:schemeClr val="accent1"/>
-          </a:effectRef>
-          <a:fontRef idx="minor">
-            <a:schemeClr val="lt1"/>
-          </a:fontRef>
-        </p:style>
-        <p:txBody>
-          <a:bodyPr rtlCol="0" anchor="ctr"/>
-          <a:lstStyle/>
-          <a:p>
-            <a:pPr algn="ctr"/>
-            <a:r>
-              <a:rPr lang="en-US" b="1" dirty="0">
-                <a:solidFill>
-                  <a:schemeClr val="bg1"/>
-                </a:solidFill>
-                <a:latin typeface="Arial" panose="020B0604020202020204" pitchFamily="34" charset="0"/>
-                <a:cs typeface="Arial" panose="020B0604020202020204" pitchFamily="34" charset="0"/>
-              </a:rPr>
-              <a:t>All lakes</a:t>
-            </a:r>
-          </a:p>
-          <a:p>
-            <a:pPr algn="ctr"/>
-            <a:r>
-              <a:rPr lang="en-US" dirty="0">
-                <a:solidFill>
-                  <a:schemeClr val="bg1"/>
-                </a:solidFill>
-                <a:latin typeface="Arial" panose="020B0604020202020204" pitchFamily="34" charset="0"/>
-                <a:cs typeface="Arial" panose="020B0604020202020204" pitchFamily="34" charset="0"/>
-              </a:rPr>
-              <a:t>n=81,773</a:t>
-            </a:r>
-          </a:p>
-        </p:txBody>
-      </p:sp>
-      <p:sp>
-        <p:nvSpPr>
-          <p:cNvPr id="9" name="Rounded Rectangle 8">
-            <a:extLst>
-              <a:ext uri="{FF2B5EF4-FFF2-40B4-BE49-F238E27FC236}">
-                <a16:creationId xmlns:a16="http://schemas.microsoft.com/office/drawing/2014/main" id="{4FA16A25-2C84-B153-65EE-72C4064CF129}"/>
-              </a:ext>
-            </a:extLst>
-          </p:cNvPr>
-          <p:cNvSpPr/>
-          <p:nvPr/>
-        </p:nvSpPr>
-        <p:spPr>
-          <a:xfrm>
-            <a:off x="3161177" y="940779"/>
-            <a:ext cx="1760623" cy="1472184"/>
-          </a:xfrm>
-          <a:prstGeom prst="roundRect">
-            <a:avLst/>
-          </a:prstGeom>
-          <a:solidFill>
-            <a:srgbClr val="93C47D"/>
-          </a:solidFill>
-          <a:ln w="28575">
-            <a:solidFill>
-              <a:schemeClr val="tx1"/>
-            </a:solidFill>
-          </a:ln>
-        </p:spPr>
-        <p:style>
-          <a:lnRef idx="2">
-            <a:schemeClr val="accent1">
-              <a:shade val="15000"/>
-            </a:schemeClr>
-          </a:lnRef>
-          <a:fillRef idx="1">
-            <a:schemeClr val="accent1"/>
-          </a:fillRef>
-          <a:effectRef idx="0">
-            <a:schemeClr val="accent1"/>
-          </a:effectRef>
-          <a:fontRef idx="minor">
-            <a:schemeClr val="lt1"/>
-          </a:fontRef>
-        </p:style>
-        <p:txBody>
-          <a:bodyPr rtlCol="0" anchor="ctr"/>
-          <a:lstStyle/>
-          <a:p>
-            <a:pPr algn="ctr"/>
-            <a:r>
-              <a:rPr lang="en-US" b="1" dirty="0">
-                <a:solidFill>
-                  <a:schemeClr val="tx1"/>
-                </a:solidFill>
-                <a:latin typeface="Arial" panose="020B0604020202020204" pitchFamily="34" charset="0"/>
-                <a:cs typeface="Arial" panose="020B0604020202020204" pitchFamily="34" charset="0"/>
-              </a:rPr>
-              <a:t>Green lakes </a:t>
-            </a:r>
-          </a:p>
-          <a:p>
-            <a:pPr algn="ctr"/>
-            <a:r>
-              <a:rPr lang="en-US" sz="1600" dirty="0">
-                <a:solidFill>
-                  <a:schemeClr val="tx1"/>
-                </a:solidFill>
-                <a:latin typeface="Arial" panose="020B0604020202020204" pitchFamily="34" charset="0"/>
-                <a:cs typeface="Arial" panose="020B0604020202020204" pitchFamily="34" charset="0"/>
-              </a:rPr>
-              <a:t>DWL &gt; 530</a:t>
-            </a:r>
-          </a:p>
-          <a:p>
-            <a:pPr algn="ctr"/>
-            <a:r>
-              <a:rPr lang="en-US" sz="1600" b="1" dirty="0">
-                <a:solidFill>
-                  <a:schemeClr val="tx1"/>
-                </a:solidFill>
-                <a:latin typeface="Arial" panose="020B0604020202020204" pitchFamily="34" charset="0"/>
-                <a:cs typeface="Arial" panose="020B0604020202020204" pitchFamily="34" charset="0"/>
-              </a:rPr>
-              <a:t>87.4% </a:t>
-            </a:r>
-            <a:r>
-              <a:rPr lang="en-US" sz="1600" dirty="0">
-                <a:solidFill>
-                  <a:schemeClr val="tx1"/>
-                </a:solidFill>
-                <a:latin typeface="Arial" panose="020B0604020202020204" pitchFamily="34" charset="0"/>
-                <a:cs typeface="Arial" panose="020B0604020202020204" pitchFamily="34" charset="0"/>
-              </a:rPr>
-              <a:t>correct classifications</a:t>
-            </a:r>
-          </a:p>
-        </p:txBody>
-      </p:sp>
-      <p:sp>
-        <p:nvSpPr>
-          <p:cNvPr id="11" name="Rounded Rectangle 10">
-            <a:extLst>
-              <a:ext uri="{FF2B5EF4-FFF2-40B4-BE49-F238E27FC236}">
-                <a16:creationId xmlns:a16="http://schemas.microsoft.com/office/drawing/2014/main" id="{AC74AD3B-840A-7FBA-B54A-1FC260F71406}"/>
-              </a:ext>
-            </a:extLst>
-          </p:cNvPr>
-          <p:cNvSpPr/>
-          <p:nvPr/>
-        </p:nvSpPr>
-        <p:spPr>
-          <a:xfrm>
-            <a:off x="670034" y="940781"/>
-            <a:ext cx="1764792" cy="1472184"/>
-          </a:xfrm>
-          <a:prstGeom prst="roundRect">
-            <a:avLst/>
-          </a:prstGeom>
-          <a:solidFill>
-            <a:srgbClr val="3D7DB0">
-              <a:alpha val="78824"/>
-            </a:srgbClr>
-          </a:solidFill>
-          <a:ln w="28575">
-            <a:solidFill>
-              <a:schemeClr val="tx1"/>
-            </a:solidFill>
-          </a:ln>
-        </p:spPr>
-        <p:style>
-          <a:lnRef idx="2">
-            <a:schemeClr val="accent1">
-              <a:shade val="15000"/>
-            </a:schemeClr>
-          </a:lnRef>
-          <a:fillRef idx="1">
-            <a:schemeClr val="accent1"/>
-          </a:fillRef>
-          <a:effectRef idx="0">
-            <a:schemeClr val="accent1"/>
-          </a:effectRef>
-          <a:fontRef idx="minor">
-            <a:schemeClr val="lt1"/>
-          </a:fontRef>
-        </p:style>
-        <p:txBody>
-          <a:bodyPr rtlCol="0" anchor="ctr"/>
-          <a:lstStyle/>
-          <a:p>
-            <a:pPr algn="ctr"/>
-            <a:r>
-              <a:rPr lang="en-US" b="1" dirty="0">
-                <a:solidFill>
-                  <a:schemeClr val="tx1"/>
-                </a:solidFill>
-                <a:latin typeface="Arial" panose="020B0604020202020204" pitchFamily="34" charset="0"/>
-                <a:cs typeface="Arial" panose="020B0604020202020204" pitchFamily="34" charset="0"/>
-              </a:rPr>
-              <a:t>Blue lakes </a:t>
-            </a:r>
-          </a:p>
-          <a:p>
-            <a:pPr algn="ctr"/>
-            <a:r>
-              <a:rPr lang="en-US" sz="1600" dirty="0">
-                <a:solidFill>
-                  <a:schemeClr val="tx1"/>
-                </a:solidFill>
-                <a:latin typeface="Arial" panose="020B0604020202020204" pitchFamily="34" charset="0"/>
-                <a:cs typeface="Arial" panose="020B0604020202020204" pitchFamily="34" charset="0"/>
-              </a:rPr>
-              <a:t>DWL &lt; 530</a:t>
-            </a:r>
-          </a:p>
-          <a:p>
-            <a:pPr algn="ctr"/>
-            <a:r>
-              <a:rPr lang="en-US" sz="1600" b="1" dirty="0">
-                <a:solidFill>
-                  <a:schemeClr val="tx1"/>
-                </a:solidFill>
-                <a:latin typeface="Arial" panose="020B0604020202020204" pitchFamily="34" charset="0"/>
-                <a:cs typeface="Arial" panose="020B0604020202020204" pitchFamily="34" charset="0"/>
-              </a:rPr>
-              <a:t>82.1%</a:t>
-            </a:r>
-            <a:r>
-              <a:rPr lang="en-US" sz="1600" dirty="0">
-                <a:solidFill>
-                  <a:schemeClr val="tx1"/>
-                </a:solidFill>
-                <a:latin typeface="Arial" panose="020B0604020202020204" pitchFamily="34" charset="0"/>
-                <a:cs typeface="Arial" panose="020B0604020202020204" pitchFamily="34" charset="0"/>
-              </a:rPr>
-              <a:t> correct classifications</a:t>
-            </a:r>
-          </a:p>
-        </p:txBody>
-      </p:sp>
-      <p:cxnSp>
-        <p:nvCxnSpPr>
-          <p:cNvPr id="14" name="Straight Arrow Connector 13">
-            <a:extLst>
-              <a:ext uri="{FF2B5EF4-FFF2-40B4-BE49-F238E27FC236}">
-                <a16:creationId xmlns:a16="http://schemas.microsoft.com/office/drawing/2014/main" id="{8E0E63E5-A446-3929-B91F-E8E9E77A804E}"/>
-              </a:ext>
-            </a:extLst>
-          </p:cNvPr>
-          <p:cNvCxnSpPr>
-            <a:cxnSpLocks/>
-          </p:cNvCxnSpPr>
-          <p:nvPr/>
-        </p:nvCxnSpPr>
-        <p:spPr>
-          <a:xfrm flipH="1">
-            <a:off x="1784700" y="327169"/>
-            <a:ext cx="425115" cy="512064"/>
-          </a:xfrm>
-          <a:prstGeom prst="straightConnector1">
-            <a:avLst/>
-          </a:prstGeom>
-          <a:ln w="76200">
-            <a:solidFill>
-              <a:schemeClr val="tx1"/>
-            </a:solidFill>
-            <a:tailEnd type="triangle"/>
-          </a:ln>
-        </p:spPr>
-        <p:style>
-          <a:lnRef idx="2">
-            <a:schemeClr val="accent1"/>
-          </a:lnRef>
-          <a:fillRef idx="0">
-            <a:schemeClr val="accent1"/>
-          </a:fillRef>
-          <a:effectRef idx="1">
-            <a:schemeClr val="accent1"/>
-          </a:effectRef>
-          <a:fontRef idx="minor">
-            <a:schemeClr val="tx1"/>
-          </a:fontRef>
-        </p:style>
-      </p:cxnSp>
-      <p:cxnSp>
-        <p:nvCxnSpPr>
-          <p:cNvPr id="16" name="Straight Arrow Connector 15">
-            <a:extLst>
-              <a:ext uri="{FF2B5EF4-FFF2-40B4-BE49-F238E27FC236}">
-                <a16:creationId xmlns:a16="http://schemas.microsoft.com/office/drawing/2014/main" id="{F48E12E9-2729-7587-8F66-0563817422F7}"/>
-              </a:ext>
-            </a:extLst>
-          </p:cNvPr>
-          <p:cNvCxnSpPr>
-            <a:cxnSpLocks/>
-          </p:cNvCxnSpPr>
-          <p:nvPr/>
-        </p:nvCxnSpPr>
-        <p:spPr>
-          <a:xfrm>
-            <a:off x="3298658" y="328937"/>
-            <a:ext cx="420624" cy="512064"/>
-          </a:xfrm>
-          <a:prstGeom prst="straightConnector1">
-            <a:avLst/>
-          </a:prstGeom>
-          <a:ln w="76200">
-            <a:solidFill>
-              <a:schemeClr val="tx1"/>
-            </a:solidFill>
-            <a:tailEnd type="triangle"/>
-          </a:ln>
-        </p:spPr>
-        <p:style>
-          <a:lnRef idx="2">
-            <a:schemeClr val="accent1"/>
-          </a:lnRef>
-          <a:fillRef idx="0">
-            <a:schemeClr val="accent1"/>
-          </a:fillRef>
-          <a:effectRef idx="1">
-            <a:schemeClr val="accent1"/>
-          </a:effectRef>
-          <a:fontRef idx="minor">
-            <a:schemeClr val="tx1"/>
-          </a:fontRef>
-        </p:style>
-      </p:cxnSp>
-      <p:sp>
-        <p:nvSpPr>
-          <p:cNvPr id="27" name="Rounded Rectangle 26">
-            <a:extLst>
-              <a:ext uri="{FF2B5EF4-FFF2-40B4-BE49-F238E27FC236}">
-                <a16:creationId xmlns:a16="http://schemas.microsoft.com/office/drawing/2014/main" id="{865CEDF5-63BF-3E4D-23C5-B7C809929838}"/>
-              </a:ext>
-            </a:extLst>
-          </p:cNvPr>
-          <p:cNvSpPr/>
-          <p:nvPr/>
-        </p:nvSpPr>
-        <p:spPr>
-          <a:xfrm>
-            <a:off x="7896727" y="-450873"/>
-            <a:ext cx="2117558" cy="673768"/>
-          </a:xfrm>
-          <a:prstGeom prst="roundRect">
-            <a:avLst/>
-          </a:prstGeom>
-          <a:solidFill>
-            <a:srgbClr val="000000"/>
-          </a:solidFill>
-          <a:ln w="28575">
-            <a:solidFill>
-              <a:schemeClr val="tx1"/>
-            </a:solidFill>
-          </a:ln>
-        </p:spPr>
-        <p:style>
-          <a:lnRef idx="2">
-            <a:schemeClr val="accent1">
-              <a:shade val="15000"/>
-            </a:schemeClr>
-          </a:lnRef>
-          <a:fillRef idx="1">
-            <a:schemeClr val="accent1"/>
-          </a:fillRef>
-          <a:effectRef idx="0">
-            <a:schemeClr val="accent1"/>
-          </a:effectRef>
-          <a:fontRef idx="minor">
-            <a:schemeClr val="lt1"/>
-          </a:fontRef>
-        </p:style>
-        <p:txBody>
-          <a:bodyPr rtlCol="0" anchor="ctr"/>
-          <a:lstStyle/>
-          <a:p>
-            <a:pPr algn="ctr"/>
-            <a:r>
-              <a:rPr lang="en-US" b="1" dirty="0">
-                <a:solidFill>
-                  <a:schemeClr val="bg1"/>
-                </a:solidFill>
-                <a:latin typeface="Arial" panose="020B0604020202020204" pitchFamily="34" charset="0"/>
-                <a:cs typeface="Arial" panose="020B0604020202020204" pitchFamily="34" charset="0"/>
-              </a:rPr>
-              <a:t>Subset of lakes</a:t>
-            </a:r>
-          </a:p>
-          <a:p>
-            <a:pPr algn="ctr"/>
-            <a:r>
-              <a:rPr lang="en-US" dirty="0">
-                <a:solidFill>
-                  <a:schemeClr val="bg1"/>
-                </a:solidFill>
-                <a:latin typeface="Arial" panose="020B0604020202020204" pitchFamily="34" charset="0"/>
-                <a:cs typeface="Arial" panose="020B0604020202020204" pitchFamily="34" charset="0"/>
-              </a:rPr>
-              <a:t>n=9,180</a:t>
-            </a:r>
-          </a:p>
-        </p:txBody>
-      </p:sp>
-      <p:cxnSp>
-        <p:nvCxnSpPr>
-          <p:cNvPr id="30" name="Straight Arrow Connector 29">
-            <a:extLst>
-              <a:ext uri="{FF2B5EF4-FFF2-40B4-BE49-F238E27FC236}">
-                <a16:creationId xmlns:a16="http://schemas.microsoft.com/office/drawing/2014/main" id="{424F4312-6D63-1893-5C9E-2C960A53EC06}"/>
-              </a:ext>
-            </a:extLst>
-          </p:cNvPr>
-          <p:cNvCxnSpPr>
-            <a:cxnSpLocks/>
-          </p:cNvCxnSpPr>
-          <p:nvPr/>
-        </p:nvCxnSpPr>
-        <p:spPr>
-          <a:xfrm flipH="1">
-            <a:off x="7602811" y="323159"/>
-            <a:ext cx="425115" cy="509338"/>
-          </a:xfrm>
-          <a:prstGeom prst="straightConnector1">
-            <a:avLst/>
-          </a:prstGeom>
-          <a:ln w="76200">
-            <a:solidFill>
-              <a:schemeClr val="tx1"/>
-            </a:solidFill>
-            <a:tailEnd type="triangle"/>
-          </a:ln>
-        </p:spPr>
-        <p:style>
-          <a:lnRef idx="2">
-            <a:schemeClr val="accent1"/>
-          </a:lnRef>
-          <a:fillRef idx="0">
-            <a:schemeClr val="accent1"/>
-          </a:fillRef>
-          <a:effectRef idx="1">
-            <a:schemeClr val="accent1"/>
-          </a:effectRef>
-          <a:fontRef idx="minor">
-            <a:schemeClr val="tx1"/>
-          </a:fontRef>
-        </p:style>
-      </p:cxnSp>
-      <p:cxnSp>
-        <p:nvCxnSpPr>
-          <p:cNvPr id="31" name="Straight Arrow Connector 30">
-            <a:extLst>
-              <a:ext uri="{FF2B5EF4-FFF2-40B4-BE49-F238E27FC236}">
-                <a16:creationId xmlns:a16="http://schemas.microsoft.com/office/drawing/2014/main" id="{4F1B2863-D41D-5577-2FF9-AFDFC42E6BD8}"/>
-              </a:ext>
-            </a:extLst>
-          </p:cNvPr>
-          <p:cNvCxnSpPr>
-            <a:cxnSpLocks/>
-          </p:cNvCxnSpPr>
-          <p:nvPr/>
-        </p:nvCxnSpPr>
-        <p:spPr>
-          <a:xfrm>
-            <a:off x="9896369" y="323159"/>
-            <a:ext cx="420624" cy="512064"/>
-          </a:xfrm>
-          <a:prstGeom prst="straightConnector1">
-            <a:avLst/>
-          </a:prstGeom>
-          <a:ln w="76200">
-            <a:solidFill>
-              <a:schemeClr val="tx1"/>
-            </a:solidFill>
-            <a:tailEnd type="triangle"/>
-          </a:ln>
-        </p:spPr>
-        <p:style>
-          <a:lnRef idx="2">
-            <a:schemeClr val="accent1"/>
-          </a:lnRef>
-          <a:fillRef idx="0">
-            <a:schemeClr val="accent1"/>
-          </a:fillRef>
-          <a:effectRef idx="1">
-            <a:schemeClr val="accent1"/>
-          </a:effectRef>
-          <a:fontRef idx="minor">
-            <a:schemeClr val="tx1"/>
-          </a:fontRef>
-        </p:style>
-      </p:cxnSp>
-      <p:sp>
-        <p:nvSpPr>
-          <p:cNvPr id="33" name="Rounded Rectangle 32">
-            <a:extLst>
-              <a:ext uri="{FF2B5EF4-FFF2-40B4-BE49-F238E27FC236}">
-                <a16:creationId xmlns:a16="http://schemas.microsoft.com/office/drawing/2014/main" id="{9344444F-E9CA-F7E5-97FC-4630C26D9419}"/>
-              </a:ext>
-            </a:extLst>
-          </p:cNvPr>
-          <p:cNvSpPr/>
-          <p:nvPr/>
-        </p:nvSpPr>
-        <p:spPr>
-          <a:xfrm>
-            <a:off x="5925285" y="940794"/>
-            <a:ext cx="1938528" cy="1471861"/>
-          </a:xfrm>
-          <a:prstGeom prst="roundRect">
-            <a:avLst/>
-          </a:prstGeom>
-          <a:solidFill>
-            <a:srgbClr val="3D7DB0">
-              <a:alpha val="78824"/>
-            </a:srgbClr>
-          </a:solidFill>
-          <a:ln w="28575">
-            <a:solidFill>
-              <a:schemeClr val="tx1"/>
-            </a:solidFill>
-          </a:ln>
-        </p:spPr>
-        <p:style>
-          <a:lnRef idx="2">
-            <a:schemeClr val="accent1">
-              <a:shade val="15000"/>
-            </a:schemeClr>
-          </a:lnRef>
-          <a:fillRef idx="1">
-            <a:schemeClr val="accent1"/>
-          </a:fillRef>
-          <a:effectRef idx="0">
-            <a:schemeClr val="accent1"/>
-          </a:effectRef>
-          <a:fontRef idx="minor">
-            <a:schemeClr val="lt1"/>
-          </a:fontRef>
-        </p:style>
-        <p:txBody>
-          <a:bodyPr rtlCol="0" anchor="ctr"/>
-          <a:lstStyle/>
-          <a:p>
-            <a:pPr algn="ctr"/>
-            <a:r>
-              <a:rPr lang="en-US" b="1" dirty="0">
-                <a:solidFill>
-                  <a:schemeClr val="tx1"/>
-                </a:solidFill>
-                <a:latin typeface="Arial" panose="020B0604020202020204" pitchFamily="34" charset="0"/>
-                <a:cs typeface="Arial" panose="020B0604020202020204" pitchFamily="34" charset="0"/>
-              </a:rPr>
-              <a:t>Trending blue</a:t>
-            </a:r>
-          </a:p>
-          <a:p>
-            <a:pPr algn="ctr"/>
-            <a:r>
-              <a:rPr lang="en-US" sz="1600" i="1" dirty="0">
-                <a:solidFill>
-                  <a:schemeClr val="tx1"/>
-                </a:solidFill>
-                <a:latin typeface="Arial" panose="020B0604020202020204" pitchFamily="34" charset="0"/>
-                <a:cs typeface="Arial" panose="020B0604020202020204" pitchFamily="34" charset="0"/>
-              </a:rPr>
-              <a:t>P </a:t>
-            </a:r>
-            <a:r>
-              <a:rPr lang="en-US" sz="1600" dirty="0">
-                <a:solidFill>
-                  <a:schemeClr val="tx1"/>
-                </a:solidFill>
-                <a:latin typeface="Arial" panose="020B0604020202020204" pitchFamily="34" charset="0"/>
-                <a:cs typeface="Arial" panose="020B0604020202020204" pitchFamily="34" charset="0"/>
-              </a:rPr>
-              <a:t>≤ 0.05</a:t>
-            </a:r>
-          </a:p>
-          <a:p>
-            <a:pPr algn="ctr"/>
-            <a:r>
-              <a:rPr lang="en-US" sz="1600" dirty="0">
-                <a:solidFill>
-                  <a:schemeClr val="tx1"/>
-                </a:solidFill>
-                <a:latin typeface="Arial" panose="020B0604020202020204" pitchFamily="34" charset="0"/>
-                <a:cs typeface="Arial" panose="020B0604020202020204" pitchFamily="34" charset="0"/>
-              </a:rPr>
-              <a:t>slope coef. &lt; 0</a:t>
-            </a:r>
-          </a:p>
-          <a:p>
-            <a:pPr algn="ctr"/>
-            <a:r>
-              <a:rPr lang="en-US" sz="1600" b="1" dirty="0">
-                <a:solidFill>
-                  <a:schemeClr val="tx1"/>
-                </a:solidFill>
-                <a:latin typeface="Arial" panose="020B0604020202020204" pitchFamily="34" charset="0"/>
-                <a:cs typeface="Arial" panose="020B0604020202020204" pitchFamily="34" charset="0"/>
-              </a:rPr>
-              <a:t>55.6%</a:t>
-            </a:r>
-            <a:r>
-              <a:rPr lang="en-US" sz="1600" dirty="0">
-                <a:solidFill>
-                  <a:schemeClr val="tx1"/>
-                </a:solidFill>
-                <a:latin typeface="Arial" panose="020B0604020202020204" pitchFamily="34" charset="0"/>
-                <a:cs typeface="Arial" panose="020B0604020202020204" pitchFamily="34" charset="0"/>
-              </a:rPr>
-              <a:t> correct classifications</a:t>
-            </a:r>
-          </a:p>
-        </p:txBody>
-      </p:sp>
-      <p:cxnSp>
-        <p:nvCxnSpPr>
-          <p:cNvPr id="35" name="Straight Arrow Connector 34">
-            <a:extLst>
-              <a:ext uri="{FF2B5EF4-FFF2-40B4-BE49-F238E27FC236}">
-                <a16:creationId xmlns:a16="http://schemas.microsoft.com/office/drawing/2014/main" id="{6CB054C5-C01D-8C02-1780-58132A71CECE}"/>
-              </a:ext>
-            </a:extLst>
-          </p:cNvPr>
-          <p:cNvCxnSpPr>
-            <a:cxnSpLocks/>
-          </p:cNvCxnSpPr>
-          <p:nvPr/>
-        </p:nvCxnSpPr>
-        <p:spPr>
-          <a:xfrm>
-            <a:off x="8963825" y="347239"/>
-            <a:ext cx="12893" cy="561473"/>
-          </a:xfrm>
-          <a:prstGeom prst="straightConnector1">
-            <a:avLst/>
-          </a:prstGeom>
-          <a:ln w="76200">
-            <a:solidFill>
-              <a:schemeClr val="tx1"/>
-            </a:solidFill>
-            <a:tailEnd type="triangle"/>
-          </a:ln>
-        </p:spPr>
-        <p:style>
-          <a:lnRef idx="2">
-            <a:schemeClr val="accent1"/>
-          </a:lnRef>
-          <a:fillRef idx="0">
-            <a:schemeClr val="accent1"/>
-          </a:fillRef>
-          <a:effectRef idx="1">
-            <a:schemeClr val="accent1"/>
-          </a:effectRef>
-          <a:fontRef idx="minor">
-            <a:schemeClr val="tx1"/>
-          </a:fontRef>
-        </p:style>
-      </p:cxnSp>
-      <p:sp>
-        <p:nvSpPr>
-          <p:cNvPr id="37" name="Rounded Rectangle 36">
-            <a:extLst>
-              <a:ext uri="{FF2B5EF4-FFF2-40B4-BE49-F238E27FC236}">
-                <a16:creationId xmlns:a16="http://schemas.microsoft.com/office/drawing/2014/main" id="{685A3D0D-E997-4551-628F-6F37D2972E31}"/>
-              </a:ext>
-            </a:extLst>
-          </p:cNvPr>
-          <p:cNvSpPr/>
-          <p:nvPr/>
-        </p:nvSpPr>
-        <p:spPr>
-          <a:xfrm>
-            <a:off x="8045672" y="936787"/>
-            <a:ext cx="1938528" cy="1471861"/>
-          </a:xfrm>
-          <a:prstGeom prst="roundRect">
-            <a:avLst/>
-          </a:prstGeom>
-          <a:solidFill>
-            <a:schemeClr val="bg1">
-              <a:lumMod val="85000"/>
-            </a:schemeClr>
-          </a:solidFill>
-          <a:ln w="28575">
-            <a:solidFill>
-              <a:schemeClr val="tx1"/>
-            </a:solidFill>
-          </a:ln>
-        </p:spPr>
-        <p:style>
-          <a:lnRef idx="2">
-            <a:schemeClr val="accent1">
-              <a:shade val="15000"/>
-            </a:schemeClr>
-          </a:lnRef>
-          <a:fillRef idx="1">
-            <a:schemeClr val="accent1"/>
-          </a:fillRef>
-          <a:effectRef idx="0">
-            <a:schemeClr val="accent1"/>
-          </a:effectRef>
-          <a:fontRef idx="minor">
-            <a:schemeClr val="lt1"/>
-          </a:fontRef>
-        </p:style>
-        <p:txBody>
-          <a:bodyPr rtlCol="0" anchor="ctr"/>
-          <a:lstStyle/>
-          <a:p>
-            <a:pPr algn="ctr"/>
-            <a:r>
-              <a:rPr lang="en-US" b="1" dirty="0">
-                <a:solidFill>
-                  <a:schemeClr val="tx1"/>
-                </a:solidFill>
-                <a:latin typeface="Arial" panose="020B0604020202020204" pitchFamily="34" charset="0"/>
-                <a:cs typeface="Arial" panose="020B0604020202020204" pitchFamily="34" charset="0"/>
-              </a:rPr>
-              <a:t>No trend</a:t>
-            </a:r>
-          </a:p>
-          <a:p>
-            <a:pPr algn="ctr"/>
-            <a:r>
-              <a:rPr lang="en-US" sz="1600" i="1" dirty="0">
-                <a:solidFill>
-                  <a:schemeClr val="tx1"/>
-                </a:solidFill>
-                <a:latin typeface="Arial" panose="020B0604020202020204" pitchFamily="34" charset="0"/>
-                <a:cs typeface="Arial" panose="020B0604020202020204" pitchFamily="34" charset="0"/>
-              </a:rPr>
-              <a:t>P &gt;</a:t>
-            </a:r>
-            <a:r>
-              <a:rPr lang="en-US" sz="1600" dirty="0">
-                <a:solidFill>
-                  <a:schemeClr val="tx1"/>
-                </a:solidFill>
-                <a:latin typeface="Arial" panose="020B0604020202020204" pitchFamily="34" charset="0"/>
-                <a:cs typeface="Arial" panose="020B0604020202020204" pitchFamily="34" charset="0"/>
-              </a:rPr>
-              <a:t> 0.05</a:t>
-            </a:r>
-          </a:p>
-          <a:p>
-            <a:pPr algn="ctr"/>
-            <a:r>
-              <a:rPr lang="en-US" sz="1600" b="1" dirty="0">
-                <a:solidFill>
-                  <a:schemeClr val="tx1"/>
-                </a:solidFill>
-                <a:latin typeface="Arial" panose="020B0604020202020204" pitchFamily="34" charset="0"/>
-                <a:cs typeface="Arial" panose="020B0604020202020204" pitchFamily="34" charset="0"/>
-              </a:rPr>
-              <a:t>36.4%</a:t>
-            </a:r>
-            <a:r>
-              <a:rPr lang="en-US" sz="1600" dirty="0">
-                <a:solidFill>
-                  <a:schemeClr val="tx1"/>
-                </a:solidFill>
-                <a:latin typeface="Arial" panose="020B0604020202020204" pitchFamily="34" charset="0"/>
-                <a:cs typeface="Arial" panose="020B0604020202020204" pitchFamily="34" charset="0"/>
-              </a:rPr>
-              <a:t> correct classifications </a:t>
-            </a:r>
-          </a:p>
-        </p:txBody>
-      </p:sp>
-      <p:sp>
-        <p:nvSpPr>
-          <p:cNvPr id="38" name="Rounded Rectangle 37">
-            <a:extLst>
-              <a:ext uri="{FF2B5EF4-FFF2-40B4-BE49-F238E27FC236}">
-                <a16:creationId xmlns:a16="http://schemas.microsoft.com/office/drawing/2014/main" id="{299B93B5-00F0-9CDE-794A-B51E592F91DD}"/>
-              </a:ext>
-            </a:extLst>
-          </p:cNvPr>
-          <p:cNvSpPr/>
-          <p:nvPr/>
-        </p:nvSpPr>
-        <p:spPr>
-          <a:xfrm>
-            <a:off x="10166058" y="936786"/>
-            <a:ext cx="1984248" cy="1471861"/>
-          </a:xfrm>
-          <a:prstGeom prst="roundRect">
-            <a:avLst/>
-          </a:prstGeom>
-          <a:solidFill>
-            <a:srgbClr val="93C47D"/>
-          </a:solidFill>
-          <a:ln w="28575">
-            <a:solidFill>
-              <a:schemeClr val="tx1"/>
-            </a:solidFill>
-          </a:ln>
-        </p:spPr>
-        <p:style>
-          <a:lnRef idx="2">
-            <a:schemeClr val="accent1">
-              <a:shade val="15000"/>
-            </a:schemeClr>
-          </a:lnRef>
-          <a:fillRef idx="1">
-            <a:schemeClr val="accent1"/>
-          </a:fillRef>
-          <a:effectRef idx="0">
-            <a:schemeClr val="accent1"/>
-          </a:effectRef>
-          <a:fontRef idx="minor">
-            <a:schemeClr val="lt1"/>
-          </a:fontRef>
-        </p:style>
-        <p:txBody>
-          <a:bodyPr rtlCol="0" anchor="ctr"/>
-          <a:lstStyle/>
-          <a:p>
-            <a:pPr algn="ctr"/>
-            <a:r>
-              <a:rPr lang="en-US" b="1" dirty="0">
-                <a:solidFill>
-                  <a:schemeClr val="tx1"/>
-                </a:solidFill>
-                <a:latin typeface="Arial" panose="020B0604020202020204" pitchFamily="34" charset="0"/>
-                <a:cs typeface="Arial" panose="020B0604020202020204" pitchFamily="34" charset="0"/>
-              </a:rPr>
-              <a:t>Trending green</a:t>
-            </a:r>
-          </a:p>
-          <a:p>
-            <a:pPr algn="ctr"/>
-            <a:r>
-              <a:rPr lang="en-US" sz="1600" i="1" dirty="0">
-                <a:solidFill>
-                  <a:schemeClr val="tx1"/>
-                </a:solidFill>
-                <a:latin typeface="Arial" panose="020B0604020202020204" pitchFamily="34" charset="0"/>
-                <a:cs typeface="Arial" panose="020B0604020202020204" pitchFamily="34" charset="0"/>
-              </a:rPr>
-              <a:t>P </a:t>
-            </a:r>
-            <a:r>
-              <a:rPr lang="en-US" sz="1600" dirty="0">
-                <a:solidFill>
-                  <a:schemeClr val="tx1"/>
-                </a:solidFill>
-                <a:latin typeface="Arial" panose="020B0604020202020204" pitchFamily="34" charset="0"/>
-                <a:cs typeface="Arial" panose="020B0604020202020204" pitchFamily="34" charset="0"/>
-              </a:rPr>
-              <a:t>≤ 0.05</a:t>
-            </a:r>
-          </a:p>
-          <a:p>
-            <a:pPr algn="ctr"/>
-            <a:r>
-              <a:rPr lang="en-US" sz="1600" dirty="0">
-                <a:solidFill>
-                  <a:schemeClr val="tx1"/>
-                </a:solidFill>
-                <a:latin typeface="Arial" panose="020B0604020202020204" pitchFamily="34" charset="0"/>
-                <a:cs typeface="Arial" panose="020B0604020202020204" pitchFamily="34" charset="0"/>
-              </a:rPr>
-              <a:t>slope coef. &gt; 0</a:t>
-            </a:r>
-          </a:p>
-          <a:p>
-            <a:pPr algn="ctr"/>
-            <a:r>
-              <a:rPr lang="en-US" sz="1600" b="1" dirty="0">
-                <a:solidFill>
-                  <a:schemeClr val="tx1"/>
-                </a:solidFill>
-                <a:latin typeface="Arial" panose="020B0604020202020204" pitchFamily="34" charset="0"/>
-                <a:cs typeface="Arial" panose="020B0604020202020204" pitchFamily="34" charset="0"/>
-              </a:rPr>
-              <a:t>47.7%</a:t>
-            </a:r>
-            <a:r>
-              <a:rPr lang="en-US" sz="1600" dirty="0">
-                <a:solidFill>
-                  <a:schemeClr val="tx1"/>
-                </a:solidFill>
-                <a:latin typeface="Arial" panose="020B0604020202020204" pitchFamily="34" charset="0"/>
-                <a:cs typeface="Arial" panose="020B0604020202020204" pitchFamily="34" charset="0"/>
-              </a:rPr>
-              <a:t> correct classifications</a:t>
-            </a:r>
-          </a:p>
-        </p:txBody>
-      </p:sp>
-      <p:pic>
-        <p:nvPicPr>
-          <p:cNvPr id="104" name="Picture 103" descr="A chart with text and numbers&#10;&#10;Description automatically generated with medium confidence">
-            <a:extLst>
-              <a:ext uri="{FF2B5EF4-FFF2-40B4-BE49-F238E27FC236}">
-                <a16:creationId xmlns:a16="http://schemas.microsoft.com/office/drawing/2014/main" id="{2AA53669-C542-F8B0-B661-593958EC228A}"/>
-              </a:ext>
-            </a:extLst>
-          </p:cNvPr>
-          <p:cNvPicPr>
-            <a:picLocks noChangeAspect="1"/>
-          </p:cNvPicPr>
-          <p:nvPr/>
-        </p:nvPicPr>
-        <p:blipFill rotWithShape="1">
-          <a:blip r:embed="rId5"/>
-          <a:srcRect t="38975" r="95435" b="45096"/>
-          <a:stretch/>
-        </p:blipFill>
-        <p:spPr>
-          <a:xfrm>
-            <a:off x="159048" y="3462841"/>
-            <a:ext cx="279400" cy="1165225"/>
-          </a:xfrm>
-          <a:prstGeom prst="rect">
-            <a:avLst/>
-          </a:prstGeom>
-        </p:spPr>
-      </p:pic>
-      <p:pic>
-        <p:nvPicPr>
-          <p:cNvPr id="13" name="Picture 12">
-            <a:extLst>
-              <a:ext uri="{FF2B5EF4-FFF2-40B4-BE49-F238E27FC236}">
-                <a16:creationId xmlns:a16="http://schemas.microsoft.com/office/drawing/2014/main" id="{BB77A367-FA2C-299E-6AB9-622209D4A1CF}"/>
-              </a:ext>
-            </a:extLst>
-          </p:cNvPr>
-          <p:cNvPicPr>
-            <a:picLocks noChangeAspect="1"/>
-          </p:cNvPicPr>
-          <p:nvPr/>
-        </p:nvPicPr>
-        <p:blipFill>
-          <a:blip r:embed="rId6"/>
-          <a:srcRect/>
-          <a:stretch/>
-        </p:blipFill>
-        <p:spPr>
-          <a:xfrm>
-            <a:off x="159053" y="6541699"/>
-            <a:ext cx="4474001" cy="3027520"/>
-          </a:xfrm>
-          <a:prstGeom prst="rect">
-            <a:avLst/>
-          </a:prstGeom>
-        </p:spPr>
-      </p:pic>
-      <p:pic>
-        <p:nvPicPr>
-          <p:cNvPr id="18" name="Picture 17">
-            <a:extLst>
-              <a:ext uri="{FF2B5EF4-FFF2-40B4-BE49-F238E27FC236}">
-                <a16:creationId xmlns:a16="http://schemas.microsoft.com/office/drawing/2014/main" id="{E22F9EF7-5A1F-2B8E-3F83-68A83EDE63E0}"/>
-              </a:ext>
-            </a:extLst>
-          </p:cNvPr>
-          <p:cNvPicPr>
-            <a:picLocks noChangeAspect="1"/>
-          </p:cNvPicPr>
-          <p:nvPr/>
-        </p:nvPicPr>
-        <p:blipFill>
-          <a:blip r:embed="rId7"/>
-          <a:srcRect/>
-          <a:stretch/>
-        </p:blipFill>
-        <p:spPr>
-          <a:xfrm>
-            <a:off x="4955366" y="6541699"/>
-            <a:ext cx="7266048" cy="3027520"/>
-          </a:xfrm>
-          <a:prstGeom prst="rect">
-            <a:avLst/>
-          </a:prstGeom>
-        </p:spPr>
-      </p:pic>
-    </p:spTree>
-    <p:extLst>
-      <p:ext uri="{BB962C8B-B14F-4D97-AF65-F5344CB8AC3E}">
-        <p14:creationId xmlns:p14="http://schemas.microsoft.com/office/powerpoint/2010/main" val="1786437691"/>
-      </p:ext>
-    </p:extLst>
-  </p:cSld>
-  <p:clrMapOvr>
-    <a:masterClrMapping/>
-  </p:clrMapOvr>
-</p:sld>
-</file>
-
-<file path=ppt/slides/slide2.xml><?xml version="1.0" encoding="utf-8"?>
-<p:sld xmlns:a="http://schemas.openxmlformats.org/drawingml/2006/main" xmlns:r="http://schemas.openxmlformats.org/officeDocument/2006/relationships" xmlns:p="http://schemas.openxmlformats.org/presentationml/2006/main">
-  <p:cSld>
-    <p:spTree>
-      <p:nvGrpSpPr>
-        <p:cNvPr id="1" name="">
-          <a:extLst>
-            <a:ext uri="{FF2B5EF4-FFF2-40B4-BE49-F238E27FC236}">
               <a16:creationId xmlns:a16="http://schemas.microsoft.com/office/drawing/2014/main" id="{5D04680A-7C0D-B20A-5924-9E63627C8AAC}"/>
             </a:ext>
           </a:extLst>
@@ -7509,7 +6696,7 @@
                 <a:latin typeface="Arial" panose="020B0604020202020204" pitchFamily="34" charset="0"/>
                 <a:cs typeface="Arial" panose="020B0604020202020204" pitchFamily="34" charset="0"/>
               </a:rPr>
-              <a:t>n = 81,773</a:t>
+              <a:t>n = 81,740</a:t>
             </a:r>
           </a:p>
         </p:txBody>
@@ -7598,7 +6785,7 @@
                 <a:latin typeface="Arial" panose="020B0604020202020204" pitchFamily="34" charset="0"/>
                 <a:cs typeface="Arial" panose="020B0604020202020204" pitchFamily="34" charset="0"/>
               </a:rPr>
-              <a:t>87.5% </a:t>
+              <a:t>87.0% </a:t>
             </a:r>
             <a:r>
               <a:rPr lang="en-US" sz="1600" dirty="0">
@@ -8085,7 +7272,7 @@
                 <a:latin typeface="Arial" panose="020B0604020202020204" pitchFamily="34" charset="0"/>
                 <a:cs typeface="Arial" panose="020B0604020202020204" pitchFamily="34" charset="0"/>
               </a:rPr>
-              <a:t>53.3%</a:t>
+              <a:t>52.6%</a:t>
             </a:r>
             <a:r>
               <a:rPr lang="en-US" sz="1600" dirty="0">
@@ -8240,7 +7427,7 @@
                 <a:latin typeface="Arial" panose="020B0604020202020204" pitchFamily="34" charset="0"/>
                 <a:cs typeface="Arial" panose="020B0604020202020204" pitchFamily="34" charset="0"/>
               </a:rPr>
-              <a:t>40.1%</a:t>
+              <a:t>43.7%</a:t>
             </a:r>
             <a:r>
               <a:rPr lang="en-US" sz="1600" dirty="0">
@@ -8362,7 +7549,7 @@
                 <a:latin typeface="Arial" panose="020B0604020202020204" pitchFamily="34" charset="0"/>
                 <a:cs typeface="Arial" panose="020B0604020202020204" pitchFamily="34" charset="0"/>
               </a:rPr>
-              <a:t>48.2%</a:t>
+              <a:t>52.0%</a:t>
             </a:r>
             <a:r>
               <a:rPr lang="en-US" sz="1600" dirty="0">
@@ -8399,7 +7586,7 @@
         <p:spPr>
           <a:xfrm>
             <a:off x="377053" y="6106182"/>
-            <a:ext cx="4123548" cy="2790371"/>
+            <a:ext cx="4123548" cy="2790370"/>
           </a:xfrm>
           <a:prstGeom prst="rect">
             <a:avLst/>
@@ -8428,7 +7615,7 @@
         <p:spPr>
           <a:xfrm>
             <a:off x="5440715" y="6106182"/>
-            <a:ext cx="6696890" cy="2790371"/>
+            <a:ext cx="6696890" cy="2790370"/>
           </a:xfrm>
           <a:prstGeom prst="rect">
             <a:avLst/>
@@ -8466,7 +7653,7 @@
       </p:pic>
       <p:pic>
         <p:nvPicPr>
-          <p:cNvPr id="3" name="Picture 2" descr="A graph with numbers and a few points&#10;&#10;Description automatically generated with medium confidence">
+          <p:cNvPr id="3" name="Picture 2">
             <a:extLst>
               <a:ext uri="{FF2B5EF4-FFF2-40B4-BE49-F238E27FC236}">
                 <a16:creationId xmlns:a16="http://schemas.microsoft.com/office/drawing/2014/main" id="{2E0C873B-7421-834D-3182-2D0AA1F4947F}"/>
@@ -8480,9 +7667,8 @@
         </p:nvPicPr>
         <p:blipFill>
           <a:blip r:embed="rId6"/>
-          <a:stretch>
-            <a:fillRect/>
-          </a:stretch>
+          <a:srcRect/>
+          <a:stretch/>
         </p:blipFill>
         <p:spPr>
           <a:xfrm>
@@ -8527,6 +7713,2236 @@
     <p:extLst>
       <p:ext uri="{BB962C8B-B14F-4D97-AF65-F5344CB8AC3E}">
         <p14:creationId xmlns:p14="http://schemas.microsoft.com/office/powerpoint/2010/main" val="2068078990"/>
+      </p:ext>
+    </p:extLst>
+  </p:cSld>
+  <p:clrMapOvr>
+    <a:masterClrMapping/>
+  </p:clrMapOvr>
+</p:sld>
+</file>
+
+<file path=ppt/slides/slide2.xml><?xml version="1.0" encoding="utf-8"?>
+<p:sld xmlns:a="http://schemas.openxmlformats.org/drawingml/2006/main" xmlns:r="http://schemas.openxmlformats.org/officeDocument/2006/relationships" xmlns:p="http://schemas.openxmlformats.org/presentationml/2006/main">
+  <p:cSld>
+    <p:spTree>
+      <p:nvGrpSpPr>
+        <p:cNvPr id="1" name="">
+          <a:extLst>
+            <a:ext uri="{FF2B5EF4-FFF2-40B4-BE49-F238E27FC236}">
+              <a16:creationId xmlns:a16="http://schemas.microsoft.com/office/drawing/2014/main" id="{E9612617-84EE-EB9A-61D3-862309813D04}"/>
+            </a:ext>
+          </a:extLst>
+        </p:cNvPr>
+        <p:cNvGrpSpPr/>
+        <p:nvPr/>
+      </p:nvGrpSpPr>
+      <p:grpSpPr>
+        <a:xfrm>
+          <a:off x="0" y="0"/>
+          <a:ext cx="0" cy="0"/>
+          <a:chOff x="0" y="0"/>
+          <a:chExt cx="0" cy="0"/>
+        </a:xfrm>
+      </p:grpSpPr>
+      <p:sp>
+        <p:nvSpPr>
+          <p:cNvPr id="7" name="Rounded Rectangle 6">
+            <a:extLst>
+              <a:ext uri="{FF2B5EF4-FFF2-40B4-BE49-F238E27FC236}">
+                <a16:creationId xmlns:a16="http://schemas.microsoft.com/office/drawing/2014/main" id="{0D20DA7B-A846-AB8B-08E7-E7AF9D66E197}"/>
+              </a:ext>
+            </a:extLst>
+          </p:cNvPr>
+          <p:cNvSpPr/>
+          <p:nvPr/>
+        </p:nvSpPr>
+        <p:spPr>
+          <a:xfrm>
+            <a:off x="1690436" y="175519"/>
+            <a:ext cx="2117558" cy="673768"/>
+          </a:xfrm>
+          <a:prstGeom prst="roundRect">
+            <a:avLst/>
+          </a:prstGeom>
+          <a:solidFill>
+            <a:srgbClr val="000000"/>
+          </a:solidFill>
+          <a:ln w="28575">
+            <a:solidFill>
+              <a:schemeClr val="tx1"/>
+            </a:solidFill>
+          </a:ln>
+        </p:spPr>
+        <p:style>
+          <a:lnRef idx="2">
+            <a:schemeClr val="accent1">
+              <a:shade val="15000"/>
+            </a:schemeClr>
+          </a:lnRef>
+          <a:fillRef idx="1">
+            <a:schemeClr val="accent1"/>
+          </a:fillRef>
+          <a:effectRef idx="0">
+            <a:schemeClr val="accent1"/>
+          </a:effectRef>
+          <a:fontRef idx="minor">
+            <a:schemeClr val="lt1"/>
+          </a:fontRef>
+        </p:style>
+        <p:txBody>
+          <a:bodyPr rtlCol="0" anchor="ctr"/>
+          <a:lstStyle/>
+          <a:p>
+            <a:pPr algn="ctr"/>
+            <a:r>
+              <a:rPr lang="en-US" b="1" dirty="0">
+                <a:solidFill>
+                  <a:schemeClr val="bg1"/>
+                </a:solidFill>
+                <a:latin typeface="Arial" panose="020B0604020202020204" pitchFamily="34" charset="0"/>
+                <a:cs typeface="Arial" panose="020B0604020202020204" pitchFamily="34" charset="0"/>
+              </a:rPr>
+              <a:t>All lakes</a:t>
+            </a:r>
+          </a:p>
+          <a:p>
+            <a:pPr algn="ctr"/>
+            <a:r>
+              <a:rPr lang="en-US" dirty="0">
+                <a:solidFill>
+                  <a:schemeClr val="bg1"/>
+                </a:solidFill>
+                <a:latin typeface="Arial" panose="020B0604020202020204" pitchFamily="34" charset="0"/>
+                <a:cs typeface="Arial" panose="020B0604020202020204" pitchFamily="34" charset="0"/>
+              </a:rPr>
+              <a:t>n = 43,174</a:t>
+            </a:r>
+          </a:p>
+        </p:txBody>
+      </p:sp>
+      <p:sp>
+        <p:nvSpPr>
+          <p:cNvPr id="9" name="Rounded Rectangle 8">
+            <a:extLst>
+              <a:ext uri="{FF2B5EF4-FFF2-40B4-BE49-F238E27FC236}">
+                <a16:creationId xmlns:a16="http://schemas.microsoft.com/office/drawing/2014/main" id="{204A079C-A8E4-8AC8-15BB-794D595400BF}"/>
+              </a:ext>
+            </a:extLst>
+          </p:cNvPr>
+          <p:cNvSpPr/>
+          <p:nvPr/>
+        </p:nvSpPr>
+        <p:spPr>
+          <a:xfrm>
+            <a:off x="3161177" y="1567171"/>
+            <a:ext cx="1760623" cy="1472184"/>
+          </a:xfrm>
+          <a:prstGeom prst="roundRect">
+            <a:avLst/>
+          </a:prstGeom>
+          <a:solidFill>
+            <a:srgbClr val="93C47D"/>
+          </a:solidFill>
+          <a:ln w="28575">
+            <a:solidFill>
+              <a:schemeClr val="tx1"/>
+            </a:solidFill>
+          </a:ln>
+        </p:spPr>
+        <p:style>
+          <a:lnRef idx="2">
+            <a:schemeClr val="accent1">
+              <a:shade val="15000"/>
+            </a:schemeClr>
+          </a:lnRef>
+          <a:fillRef idx="1">
+            <a:schemeClr val="accent1"/>
+          </a:fillRef>
+          <a:effectRef idx="0">
+            <a:schemeClr val="accent1"/>
+          </a:effectRef>
+          <a:fontRef idx="minor">
+            <a:schemeClr val="lt1"/>
+          </a:fontRef>
+        </p:style>
+        <p:txBody>
+          <a:bodyPr rtlCol="0" anchor="ctr"/>
+          <a:lstStyle/>
+          <a:p>
+            <a:pPr algn="ctr"/>
+            <a:r>
+              <a:rPr lang="en-US" b="1" dirty="0">
+                <a:solidFill>
+                  <a:schemeClr val="tx1"/>
+                </a:solidFill>
+                <a:latin typeface="Arial" panose="020B0604020202020204" pitchFamily="34" charset="0"/>
+                <a:cs typeface="Arial" panose="020B0604020202020204" pitchFamily="34" charset="0"/>
+              </a:rPr>
+              <a:t>Green lakes </a:t>
+            </a:r>
+          </a:p>
+          <a:p>
+            <a:pPr algn="ctr"/>
+            <a:r>
+              <a:rPr lang="en-US" sz="1600" dirty="0">
+                <a:solidFill>
+                  <a:schemeClr val="tx1"/>
+                </a:solidFill>
+                <a:latin typeface="Arial" panose="020B0604020202020204" pitchFamily="34" charset="0"/>
+                <a:cs typeface="Arial" panose="020B0604020202020204" pitchFamily="34" charset="0"/>
+              </a:rPr>
+              <a:t>DWL &gt; 530</a:t>
+            </a:r>
+          </a:p>
+          <a:p>
+            <a:pPr algn="ctr"/>
+            <a:r>
+              <a:rPr lang="en-US" sz="1600" b="1" dirty="0">
+                <a:solidFill>
+                  <a:schemeClr val="tx1"/>
+                </a:solidFill>
+                <a:latin typeface="Arial" panose="020B0604020202020204" pitchFamily="34" charset="0"/>
+                <a:cs typeface="Arial" panose="020B0604020202020204" pitchFamily="34" charset="0"/>
+              </a:rPr>
+              <a:t>88.4% </a:t>
+            </a:r>
+            <a:r>
+              <a:rPr lang="en-US" sz="1600" dirty="0">
+                <a:solidFill>
+                  <a:schemeClr val="tx1"/>
+                </a:solidFill>
+                <a:latin typeface="Arial" panose="020B0604020202020204" pitchFamily="34" charset="0"/>
+                <a:cs typeface="Arial" panose="020B0604020202020204" pitchFamily="34" charset="0"/>
+              </a:rPr>
+              <a:t>correct classifications</a:t>
+            </a:r>
+          </a:p>
+        </p:txBody>
+      </p:sp>
+      <p:sp>
+        <p:nvSpPr>
+          <p:cNvPr id="11" name="Rounded Rectangle 10">
+            <a:extLst>
+              <a:ext uri="{FF2B5EF4-FFF2-40B4-BE49-F238E27FC236}">
+                <a16:creationId xmlns:a16="http://schemas.microsoft.com/office/drawing/2014/main" id="{C336CA75-6C0E-8054-81A9-7960F6FA2194}"/>
+              </a:ext>
+            </a:extLst>
+          </p:cNvPr>
+          <p:cNvSpPr/>
+          <p:nvPr/>
+        </p:nvSpPr>
+        <p:spPr>
+          <a:xfrm>
+            <a:off x="670034" y="1567173"/>
+            <a:ext cx="1764792" cy="1472184"/>
+          </a:xfrm>
+          <a:prstGeom prst="roundRect">
+            <a:avLst/>
+          </a:prstGeom>
+          <a:solidFill>
+            <a:srgbClr val="75AEDB">
+              <a:alpha val="78824"/>
+            </a:srgbClr>
+          </a:solidFill>
+          <a:ln w="28575">
+            <a:solidFill>
+              <a:schemeClr val="tx1"/>
+            </a:solidFill>
+          </a:ln>
+        </p:spPr>
+        <p:style>
+          <a:lnRef idx="2">
+            <a:schemeClr val="accent1">
+              <a:shade val="15000"/>
+            </a:schemeClr>
+          </a:lnRef>
+          <a:fillRef idx="1">
+            <a:schemeClr val="accent1"/>
+          </a:fillRef>
+          <a:effectRef idx="0">
+            <a:schemeClr val="accent1"/>
+          </a:effectRef>
+          <a:fontRef idx="minor">
+            <a:schemeClr val="lt1"/>
+          </a:fontRef>
+        </p:style>
+        <p:txBody>
+          <a:bodyPr rtlCol="0" anchor="ctr"/>
+          <a:lstStyle/>
+          <a:p>
+            <a:pPr algn="ctr"/>
+            <a:r>
+              <a:rPr lang="en-US" b="1" dirty="0">
+                <a:solidFill>
+                  <a:schemeClr val="tx1"/>
+                </a:solidFill>
+                <a:latin typeface="Arial" panose="020B0604020202020204" pitchFamily="34" charset="0"/>
+                <a:cs typeface="Arial" panose="020B0604020202020204" pitchFamily="34" charset="0"/>
+              </a:rPr>
+              <a:t>Blue lakes </a:t>
+            </a:r>
+          </a:p>
+          <a:p>
+            <a:pPr algn="ctr"/>
+            <a:r>
+              <a:rPr lang="en-US" sz="1600" dirty="0">
+                <a:solidFill>
+                  <a:schemeClr val="tx1"/>
+                </a:solidFill>
+                <a:latin typeface="Arial" panose="020B0604020202020204" pitchFamily="34" charset="0"/>
+                <a:cs typeface="Arial" panose="020B0604020202020204" pitchFamily="34" charset="0"/>
+              </a:rPr>
+              <a:t>DWL &lt; 530</a:t>
+            </a:r>
+          </a:p>
+          <a:p>
+            <a:pPr algn="ctr"/>
+            <a:r>
+              <a:rPr lang="en-US" sz="1600" b="1" dirty="0">
+                <a:solidFill>
+                  <a:schemeClr val="tx1"/>
+                </a:solidFill>
+                <a:latin typeface="Arial" panose="020B0604020202020204" pitchFamily="34" charset="0"/>
+                <a:cs typeface="Arial" panose="020B0604020202020204" pitchFamily="34" charset="0"/>
+              </a:rPr>
+              <a:t>74.8%</a:t>
+            </a:r>
+            <a:r>
+              <a:rPr lang="en-US" sz="1600" dirty="0">
+                <a:solidFill>
+                  <a:schemeClr val="tx1"/>
+                </a:solidFill>
+                <a:latin typeface="Arial" panose="020B0604020202020204" pitchFamily="34" charset="0"/>
+                <a:cs typeface="Arial" panose="020B0604020202020204" pitchFamily="34" charset="0"/>
+              </a:rPr>
+              <a:t> correct classifications</a:t>
+            </a:r>
+          </a:p>
+        </p:txBody>
+      </p:sp>
+      <p:cxnSp>
+        <p:nvCxnSpPr>
+          <p:cNvPr id="14" name="Straight Arrow Connector 13">
+            <a:extLst>
+              <a:ext uri="{FF2B5EF4-FFF2-40B4-BE49-F238E27FC236}">
+                <a16:creationId xmlns:a16="http://schemas.microsoft.com/office/drawing/2014/main" id="{F3711D15-35E7-3F20-2045-CA94B53C4922}"/>
+              </a:ext>
+            </a:extLst>
+          </p:cNvPr>
+          <p:cNvCxnSpPr>
+            <a:cxnSpLocks/>
+          </p:cNvCxnSpPr>
+          <p:nvPr/>
+        </p:nvCxnSpPr>
+        <p:spPr>
+          <a:xfrm flipH="1">
+            <a:off x="1784700" y="953561"/>
+            <a:ext cx="425115" cy="512064"/>
+          </a:xfrm>
+          <a:prstGeom prst="straightConnector1">
+            <a:avLst/>
+          </a:prstGeom>
+          <a:ln w="76200">
+            <a:solidFill>
+              <a:schemeClr val="tx1"/>
+            </a:solidFill>
+            <a:tailEnd type="triangle"/>
+          </a:ln>
+        </p:spPr>
+        <p:style>
+          <a:lnRef idx="2">
+            <a:schemeClr val="accent1"/>
+          </a:lnRef>
+          <a:fillRef idx="0">
+            <a:schemeClr val="accent1"/>
+          </a:fillRef>
+          <a:effectRef idx="1">
+            <a:schemeClr val="accent1"/>
+          </a:effectRef>
+          <a:fontRef idx="minor">
+            <a:schemeClr val="tx1"/>
+          </a:fontRef>
+        </p:style>
+      </p:cxnSp>
+      <p:cxnSp>
+        <p:nvCxnSpPr>
+          <p:cNvPr id="16" name="Straight Arrow Connector 15">
+            <a:extLst>
+              <a:ext uri="{FF2B5EF4-FFF2-40B4-BE49-F238E27FC236}">
+                <a16:creationId xmlns:a16="http://schemas.microsoft.com/office/drawing/2014/main" id="{0A343D77-906C-6051-4B2C-66B02199F114}"/>
+              </a:ext>
+            </a:extLst>
+          </p:cNvPr>
+          <p:cNvCxnSpPr>
+            <a:cxnSpLocks/>
+          </p:cNvCxnSpPr>
+          <p:nvPr/>
+        </p:nvCxnSpPr>
+        <p:spPr>
+          <a:xfrm>
+            <a:off x="3298658" y="955329"/>
+            <a:ext cx="420624" cy="512064"/>
+          </a:xfrm>
+          <a:prstGeom prst="straightConnector1">
+            <a:avLst/>
+          </a:prstGeom>
+          <a:ln w="76200">
+            <a:solidFill>
+              <a:schemeClr val="tx1"/>
+            </a:solidFill>
+            <a:tailEnd type="triangle"/>
+          </a:ln>
+        </p:spPr>
+        <p:style>
+          <a:lnRef idx="2">
+            <a:schemeClr val="accent1"/>
+          </a:lnRef>
+          <a:fillRef idx="0">
+            <a:schemeClr val="accent1"/>
+          </a:fillRef>
+          <a:effectRef idx="1">
+            <a:schemeClr val="accent1"/>
+          </a:effectRef>
+          <a:fontRef idx="minor">
+            <a:schemeClr val="tx1"/>
+          </a:fontRef>
+        </p:style>
+      </p:cxnSp>
+      <p:sp>
+        <p:nvSpPr>
+          <p:cNvPr id="27" name="Rounded Rectangle 26">
+            <a:extLst>
+              <a:ext uri="{FF2B5EF4-FFF2-40B4-BE49-F238E27FC236}">
+                <a16:creationId xmlns:a16="http://schemas.microsoft.com/office/drawing/2014/main" id="{6BE0CB4D-DC73-6D43-0BFD-B039E4B4E095}"/>
+              </a:ext>
+            </a:extLst>
+          </p:cNvPr>
+          <p:cNvSpPr/>
+          <p:nvPr/>
+        </p:nvSpPr>
+        <p:spPr>
+          <a:xfrm>
+            <a:off x="7896727" y="175519"/>
+            <a:ext cx="2117558" cy="673768"/>
+          </a:xfrm>
+          <a:prstGeom prst="roundRect">
+            <a:avLst/>
+          </a:prstGeom>
+          <a:solidFill>
+            <a:srgbClr val="000000"/>
+          </a:solidFill>
+          <a:ln w="28575">
+            <a:solidFill>
+              <a:schemeClr val="tx1"/>
+            </a:solidFill>
+          </a:ln>
+        </p:spPr>
+        <p:style>
+          <a:lnRef idx="2">
+            <a:schemeClr val="accent1">
+              <a:shade val="15000"/>
+            </a:schemeClr>
+          </a:lnRef>
+          <a:fillRef idx="1">
+            <a:schemeClr val="accent1"/>
+          </a:fillRef>
+          <a:effectRef idx="0">
+            <a:schemeClr val="accent1"/>
+          </a:effectRef>
+          <a:fontRef idx="minor">
+            <a:schemeClr val="lt1"/>
+          </a:fontRef>
+        </p:style>
+        <p:txBody>
+          <a:bodyPr rtlCol="0" anchor="ctr"/>
+          <a:lstStyle/>
+          <a:p>
+            <a:pPr algn="ctr"/>
+            <a:r>
+              <a:rPr lang="en-US" b="1" dirty="0">
+                <a:solidFill>
+                  <a:schemeClr val="bg1"/>
+                </a:solidFill>
+                <a:latin typeface="Arial" panose="020B0604020202020204" pitchFamily="34" charset="0"/>
+                <a:cs typeface="Arial" panose="020B0604020202020204" pitchFamily="34" charset="0"/>
+              </a:rPr>
+              <a:t>Subset of lakes</a:t>
+            </a:r>
+          </a:p>
+          <a:p>
+            <a:pPr algn="ctr"/>
+            <a:r>
+              <a:rPr lang="en-US" dirty="0">
+                <a:solidFill>
+                  <a:schemeClr val="bg1"/>
+                </a:solidFill>
+                <a:latin typeface="Arial" panose="020B0604020202020204" pitchFamily="34" charset="0"/>
+                <a:cs typeface="Arial" panose="020B0604020202020204" pitchFamily="34" charset="0"/>
+              </a:rPr>
+              <a:t>n = 1,809</a:t>
+            </a:r>
+          </a:p>
+        </p:txBody>
+      </p:sp>
+      <p:cxnSp>
+        <p:nvCxnSpPr>
+          <p:cNvPr id="30" name="Straight Arrow Connector 29">
+            <a:extLst>
+              <a:ext uri="{FF2B5EF4-FFF2-40B4-BE49-F238E27FC236}">
+                <a16:creationId xmlns:a16="http://schemas.microsoft.com/office/drawing/2014/main" id="{CABFB964-52EB-4FF9-9435-447F037BD87E}"/>
+              </a:ext>
+            </a:extLst>
+          </p:cNvPr>
+          <p:cNvCxnSpPr>
+            <a:cxnSpLocks/>
+          </p:cNvCxnSpPr>
+          <p:nvPr/>
+        </p:nvCxnSpPr>
+        <p:spPr>
+          <a:xfrm flipH="1">
+            <a:off x="7602811" y="949551"/>
+            <a:ext cx="425115" cy="509338"/>
+          </a:xfrm>
+          <a:prstGeom prst="straightConnector1">
+            <a:avLst/>
+          </a:prstGeom>
+          <a:ln w="76200">
+            <a:solidFill>
+              <a:schemeClr val="tx1"/>
+            </a:solidFill>
+            <a:tailEnd type="triangle"/>
+          </a:ln>
+        </p:spPr>
+        <p:style>
+          <a:lnRef idx="2">
+            <a:schemeClr val="accent1"/>
+          </a:lnRef>
+          <a:fillRef idx="0">
+            <a:schemeClr val="accent1"/>
+          </a:fillRef>
+          <a:effectRef idx="1">
+            <a:schemeClr val="accent1"/>
+          </a:effectRef>
+          <a:fontRef idx="minor">
+            <a:schemeClr val="tx1"/>
+          </a:fontRef>
+        </p:style>
+      </p:cxnSp>
+      <p:cxnSp>
+        <p:nvCxnSpPr>
+          <p:cNvPr id="31" name="Straight Arrow Connector 30">
+            <a:extLst>
+              <a:ext uri="{FF2B5EF4-FFF2-40B4-BE49-F238E27FC236}">
+                <a16:creationId xmlns:a16="http://schemas.microsoft.com/office/drawing/2014/main" id="{D0273B7E-2A9F-8EC6-DF82-50579FFEA477}"/>
+              </a:ext>
+            </a:extLst>
+          </p:cNvPr>
+          <p:cNvCxnSpPr>
+            <a:cxnSpLocks/>
+          </p:cNvCxnSpPr>
+          <p:nvPr/>
+        </p:nvCxnSpPr>
+        <p:spPr>
+          <a:xfrm>
+            <a:off x="9896369" y="949551"/>
+            <a:ext cx="420624" cy="512064"/>
+          </a:xfrm>
+          <a:prstGeom prst="straightConnector1">
+            <a:avLst/>
+          </a:prstGeom>
+          <a:ln w="76200">
+            <a:solidFill>
+              <a:schemeClr val="tx1"/>
+            </a:solidFill>
+            <a:tailEnd type="triangle"/>
+          </a:ln>
+        </p:spPr>
+        <p:style>
+          <a:lnRef idx="2">
+            <a:schemeClr val="accent1"/>
+          </a:lnRef>
+          <a:fillRef idx="0">
+            <a:schemeClr val="accent1"/>
+          </a:fillRef>
+          <a:effectRef idx="1">
+            <a:schemeClr val="accent1"/>
+          </a:effectRef>
+          <a:fontRef idx="minor">
+            <a:schemeClr val="tx1"/>
+          </a:fontRef>
+        </p:style>
+      </p:cxnSp>
+      <p:sp>
+        <p:nvSpPr>
+          <p:cNvPr id="33" name="Rounded Rectangle 32">
+            <a:extLst>
+              <a:ext uri="{FF2B5EF4-FFF2-40B4-BE49-F238E27FC236}">
+                <a16:creationId xmlns:a16="http://schemas.microsoft.com/office/drawing/2014/main" id="{19EA5EC0-A14A-4B0E-34A3-9EEE5C3B0800}"/>
+              </a:ext>
+            </a:extLst>
+          </p:cNvPr>
+          <p:cNvSpPr/>
+          <p:nvPr/>
+        </p:nvSpPr>
+        <p:spPr>
+          <a:xfrm>
+            <a:off x="5925285" y="1567186"/>
+            <a:ext cx="1938528" cy="1471861"/>
+          </a:xfrm>
+          <a:prstGeom prst="roundRect">
+            <a:avLst/>
+          </a:prstGeom>
+          <a:solidFill>
+            <a:srgbClr val="75AEDB">
+              <a:alpha val="78824"/>
+            </a:srgbClr>
+          </a:solidFill>
+          <a:ln w="28575">
+            <a:solidFill>
+              <a:schemeClr val="tx1"/>
+            </a:solidFill>
+          </a:ln>
+        </p:spPr>
+        <p:style>
+          <a:lnRef idx="2">
+            <a:schemeClr val="accent1">
+              <a:shade val="15000"/>
+            </a:schemeClr>
+          </a:lnRef>
+          <a:fillRef idx="1">
+            <a:schemeClr val="accent1"/>
+          </a:fillRef>
+          <a:effectRef idx="0">
+            <a:schemeClr val="accent1"/>
+          </a:effectRef>
+          <a:fontRef idx="minor">
+            <a:schemeClr val="lt1"/>
+          </a:fontRef>
+        </p:style>
+        <p:txBody>
+          <a:bodyPr rtlCol="0" anchor="ctr"/>
+          <a:lstStyle/>
+          <a:p>
+            <a:pPr algn="ctr"/>
+            <a:r>
+              <a:rPr lang="en-US" b="1" dirty="0">
+                <a:solidFill>
+                  <a:schemeClr val="tx1"/>
+                </a:solidFill>
+                <a:latin typeface="Arial" panose="020B0604020202020204" pitchFamily="34" charset="0"/>
+                <a:cs typeface="Arial" panose="020B0604020202020204" pitchFamily="34" charset="0"/>
+              </a:rPr>
+              <a:t>Trending blue</a:t>
+            </a:r>
+          </a:p>
+          <a:p>
+            <a:pPr algn="ctr"/>
+            <a:r>
+              <a:rPr lang="en-US" sz="1600" i="1" dirty="0">
+                <a:solidFill>
+                  <a:schemeClr val="tx1"/>
+                </a:solidFill>
+                <a:latin typeface="Arial" panose="020B0604020202020204" pitchFamily="34" charset="0"/>
+                <a:cs typeface="Arial" panose="020B0604020202020204" pitchFamily="34" charset="0"/>
+              </a:rPr>
+              <a:t>P </a:t>
+            </a:r>
+            <a:r>
+              <a:rPr lang="en-US" sz="1600" dirty="0">
+                <a:solidFill>
+                  <a:schemeClr val="tx1"/>
+                </a:solidFill>
+                <a:latin typeface="Arial" panose="020B0604020202020204" pitchFamily="34" charset="0"/>
+                <a:cs typeface="Arial" panose="020B0604020202020204" pitchFamily="34" charset="0"/>
+              </a:rPr>
+              <a:t>≤ 0.05</a:t>
+            </a:r>
+          </a:p>
+          <a:p>
+            <a:pPr algn="ctr"/>
+            <a:r>
+              <a:rPr lang="en-US" sz="1600" dirty="0">
+                <a:solidFill>
+                  <a:schemeClr val="tx1"/>
+                </a:solidFill>
+                <a:latin typeface="Arial" panose="020B0604020202020204" pitchFamily="34" charset="0"/>
+                <a:cs typeface="Arial" panose="020B0604020202020204" pitchFamily="34" charset="0"/>
+              </a:rPr>
+              <a:t>slope coef. &lt; -0.4</a:t>
+            </a:r>
+          </a:p>
+          <a:p>
+            <a:pPr algn="ctr"/>
+            <a:r>
+              <a:rPr lang="en-US" sz="1600" b="1" dirty="0">
+                <a:solidFill>
+                  <a:schemeClr val="tx1"/>
+                </a:solidFill>
+                <a:latin typeface="Arial" panose="020B0604020202020204" pitchFamily="34" charset="0"/>
+                <a:cs typeface="Arial" panose="020B0604020202020204" pitchFamily="34" charset="0"/>
+              </a:rPr>
+              <a:t>49.6%</a:t>
+            </a:r>
+            <a:r>
+              <a:rPr lang="en-US" sz="1600" dirty="0">
+                <a:solidFill>
+                  <a:schemeClr val="tx1"/>
+                </a:solidFill>
+                <a:latin typeface="Arial" panose="020B0604020202020204" pitchFamily="34" charset="0"/>
+                <a:cs typeface="Arial" panose="020B0604020202020204" pitchFamily="34" charset="0"/>
+              </a:rPr>
+              <a:t> correct classifications</a:t>
+            </a:r>
+          </a:p>
+        </p:txBody>
+      </p:sp>
+      <p:cxnSp>
+        <p:nvCxnSpPr>
+          <p:cNvPr id="35" name="Straight Arrow Connector 34">
+            <a:extLst>
+              <a:ext uri="{FF2B5EF4-FFF2-40B4-BE49-F238E27FC236}">
+                <a16:creationId xmlns:a16="http://schemas.microsoft.com/office/drawing/2014/main" id="{18A26BE6-A544-9FD1-8BC1-7E581D7D702D}"/>
+              </a:ext>
+            </a:extLst>
+          </p:cNvPr>
+          <p:cNvCxnSpPr>
+            <a:cxnSpLocks/>
+          </p:cNvCxnSpPr>
+          <p:nvPr/>
+        </p:nvCxnSpPr>
+        <p:spPr>
+          <a:xfrm>
+            <a:off x="8963825" y="973631"/>
+            <a:ext cx="12893" cy="561473"/>
+          </a:xfrm>
+          <a:prstGeom prst="straightConnector1">
+            <a:avLst/>
+          </a:prstGeom>
+          <a:ln w="76200">
+            <a:solidFill>
+              <a:schemeClr val="tx1"/>
+            </a:solidFill>
+            <a:tailEnd type="triangle"/>
+          </a:ln>
+        </p:spPr>
+        <p:style>
+          <a:lnRef idx="2">
+            <a:schemeClr val="accent1"/>
+          </a:lnRef>
+          <a:fillRef idx="0">
+            <a:schemeClr val="accent1"/>
+          </a:fillRef>
+          <a:effectRef idx="1">
+            <a:schemeClr val="accent1"/>
+          </a:effectRef>
+          <a:fontRef idx="minor">
+            <a:schemeClr val="tx1"/>
+          </a:fontRef>
+        </p:style>
+      </p:cxnSp>
+      <p:sp>
+        <p:nvSpPr>
+          <p:cNvPr id="37" name="Rounded Rectangle 36">
+            <a:extLst>
+              <a:ext uri="{FF2B5EF4-FFF2-40B4-BE49-F238E27FC236}">
+                <a16:creationId xmlns:a16="http://schemas.microsoft.com/office/drawing/2014/main" id="{ECD09860-2E26-A502-58F7-2BBA15D0CD40}"/>
+              </a:ext>
+            </a:extLst>
+          </p:cNvPr>
+          <p:cNvSpPr/>
+          <p:nvPr/>
+        </p:nvSpPr>
+        <p:spPr>
+          <a:xfrm>
+            <a:off x="8045672" y="1563179"/>
+            <a:ext cx="1938528" cy="1471861"/>
+          </a:xfrm>
+          <a:prstGeom prst="roundRect">
+            <a:avLst/>
+          </a:prstGeom>
+          <a:solidFill>
+            <a:schemeClr val="bg1">
+              <a:lumMod val="85000"/>
+            </a:schemeClr>
+          </a:solidFill>
+          <a:ln w="28575">
+            <a:solidFill>
+              <a:schemeClr val="tx1"/>
+            </a:solidFill>
+          </a:ln>
+        </p:spPr>
+        <p:style>
+          <a:lnRef idx="2">
+            <a:schemeClr val="accent1">
+              <a:shade val="15000"/>
+            </a:schemeClr>
+          </a:lnRef>
+          <a:fillRef idx="1">
+            <a:schemeClr val="accent1"/>
+          </a:fillRef>
+          <a:effectRef idx="0">
+            <a:schemeClr val="accent1"/>
+          </a:effectRef>
+          <a:fontRef idx="minor">
+            <a:schemeClr val="lt1"/>
+          </a:fontRef>
+        </p:style>
+        <p:txBody>
+          <a:bodyPr rtlCol="0" anchor="ctr"/>
+          <a:lstStyle/>
+          <a:p>
+            <a:pPr algn="ctr"/>
+            <a:r>
+              <a:rPr lang="en-US" b="1" dirty="0">
+                <a:solidFill>
+                  <a:schemeClr val="tx1"/>
+                </a:solidFill>
+                <a:latin typeface="Arial" panose="020B0604020202020204" pitchFamily="34" charset="0"/>
+                <a:cs typeface="Arial" panose="020B0604020202020204" pitchFamily="34" charset="0"/>
+              </a:rPr>
+              <a:t>No trend</a:t>
+            </a:r>
+          </a:p>
+          <a:p>
+            <a:pPr algn="ctr"/>
+            <a:r>
+              <a:rPr lang="en-US" sz="1600" i="1" dirty="0">
+                <a:solidFill>
+                  <a:schemeClr val="tx1"/>
+                </a:solidFill>
+                <a:latin typeface="Arial" panose="020B0604020202020204" pitchFamily="34" charset="0"/>
+                <a:cs typeface="Arial" panose="020B0604020202020204" pitchFamily="34" charset="0"/>
+              </a:rPr>
+              <a:t>P &gt;</a:t>
+            </a:r>
+            <a:r>
+              <a:rPr lang="en-US" sz="1600" dirty="0">
+                <a:solidFill>
+                  <a:schemeClr val="tx1"/>
+                </a:solidFill>
+                <a:latin typeface="Arial" panose="020B0604020202020204" pitchFamily="34" charset="0"/>
+                <a:cs typeface="Arial" panose="020B0604020202020204" pitchFamily="34" charset="0"/>
+              </a:rPr>
+              <a:t> 0.05</a:t>
+            </a:r>
+          </a:p>
+          <a:p>
+            <a:pPr algn="ctr"/>
+            <a:r>
+              <a:rPr lang="en-US" sz="1600" b="1" dirty="0">
+                <a:solidFill>
+                  <a:schemeClr val="tx1"/>
+                </a:solidFill>
+                <a:latin typeface="Arial" panose="020B0604020202020204" pitchFamily="34" charset="0"/>
+                <a:cs typeface="Arial" panose="020B0604020202020204" pitchFamily="34" charset="0"/>
+              </a:rPr>
+              <a:t>47.6%</a:t>
+            </a:r>
+            <a:r>
+              <a:rPr lang="en-US" sz="1600" dirty="0">
+                <a:solidFill>
+                  <a:schemeClr val="tx1"/>
+                </a:solidFill>
+                <a:latin typeface="Arial" panose="020B0604020202020204" pitchFamily="34" charset="0"/>
+                <a:cs typeface="Arial" panose="020B0604020202020204" pitchFamily="34" charset="0"/>
+              </a:rPr>
+              <a:t> correct classifications </a:t>
+            </a:r>
+          </a:p>
+        </p:txBody>
+      </p:sp>
+      <p:sp>
+        <p:nvSpPr>
+          <p:cNvPr id="38" name="Rounded Rectangle 37">
+            <a:extLst>
+              <a:ext uri="{FF2B5EF4-FFF2-40B4-BE49-F238E27FC236}">
+                <a16:creationId xmlns:a16="http://schemas.microsoft.com/office/drawing/2014/main" id="{F26B67FA-9377-8D14-3106-2FCFF91AD194}"/>
+              </a:ext>
+            </a:extLst>
+          </p:cNvPr>
+          <p:cNvSpPr/>
+          <p:nvPr/>
+        </p:nvSpPr>
+        <p:spPr>
+          <a:xfrm>
+            <a:off x="10166058" y="1563178"/>
+            <a:ext cx="1984248" cy="1471861"/>
+          </a:xfrm>
+          <a:prstGeom prst="roundRect">
+            <a:avLst/>
+          </a:prstGeom>
+          <a:solidFill>
+            <a:srgbClr val="93C47D"/>
+          </a:solidFill>
+          <a:ln w="28575">
+            <a:solidFill>
+              <a:schemeClr val="tx1"/>
+            </a:solidFill>
+          </a:ln>
+        </p:spPr>
+        <p:style>
+          <a:lnRef idx="2">
+            <a:schemeClr val="accent1">
+              <a:shade val="15000"/>
+            </a:schemeClr>
+          </a:lnRef>
+          <a:fillRef idx="1">
+            <a:schemeClr val="accent1"/>
+          </a:fillRef>
+          <a:effectRef idx="0">
+            <a:schemeClr val="accent1"/>
+          </a:effectRef>
+          <a:fontRef idx="minor">
+            <a:schemeClr val="lt1"/>
+          </a:fontRef>
+        </p:style>
+        <p:txBody>
+          <a:bodyPr rtlCol="0" anchor="ctr"/>
+          <a:lstStyle/>
+          <a:p>
+            <a:pPr algn="ctr"/>
+            <a:r>
+              <a:rPr lang="en-US" b="1" dirty="0">
+                <a:solidFill>
+                  <a:schemeClr val="tx1"/>
+                </a:solidFill>
+                <a:latin typeface="Arial" panose="020B0604020202020204" pitchFamily="34" charset="0"/>
+                <a:cs typeface="Arial" panose="020B0604020202020204" pitchFamily="34" charset="0"/>
+              </a:rPr>
+              <a:t>Trending green</a:t>
+            </a:r>
+          </a:p>
+          <a:p>
+            <a:pPr algn="ctr"/>
+            <a:r>
+              <a:rPr lang="en-US" sz="1600" i="1" dirty="0">
+                <a:solidFill>
+                  <a:schemeClr val="tx1"/>
+                </a:solidFill>
+                <a:latin typeface="Arial" panose="020B0604020202020204" pitchFamily="34" charset="0"/>
+                <a:cs typeface="Arial" panose="020B0604020202020204" pitchFamily="34" charset="0"/>
+              </a:rPr>
+              <a:t>P </a:t>
+            </a:r>
+            <a:r>
+              <a:rPr lang="en-US" sz="1600" dirty="0">
+                <a:solidFill>
+                  <a:schemeClr val="tx1"/>
+                </a:solidFill>
+                <a:latin typeface="Arial" panose="020B0604020202020204" pitchFamily="34" charset="0"/>
+                <a:cs typeface="Arial" panose="020B0604020202020204" pitchFamily="34" charset="0"/>
+              </a:rPr>
+              <a:t>≤ 0.05</a:t>
+            </a:r>
+          </a:p>
+          <a:p>
+            <a:pPr algn="ctr"/>
+            <a:r>
+              <a:rPr lang="en-US" sz="1600" dirty="0">
+                <a:solidFill>
+                  <a:schemeClr val="tx1"/>
+                </a:solidFill>
+                <a:latin typeface="Arial" panose="020B0604020202020204" pitchFamily="34" charset="0"/>
+                <a:cs typeface="Arial" panose="020B0604020202020204" pitchFamily="34" charset="0"/>
+              </a:rPr>
+              <a:t>slope coef. &gt; 0.4</a:t>
+            </a:r>
+          </a:p>
+          <a:p>
+            <a:pPr algn="ctr"/>
+            <a:r>
+              <a:rPr lang="en-US" sz="1600" b="1" dirty="0">
+                <a:solidFill>
+                  <a:schemeClr val="tx1"/>
+                </a:solidFill>
+                <a:latin typeface="Arial" panose="020B0604020202020204" pitchFamily="34" charset="0"/>
+                <a:cs typeface="Arial" panose="020B0604020202020204" pitchFamily="34" charset="0"/>
+              </a:rPr>
+              <a:t>44.4%</a:t>
+            </a:r>
+            <a:r>
+              <a:rPr lang="en-US" sz="1600" dirty="0">
+                <a:solidFill>
+                  <a:schemeClr val="tx1"/>
+                </a:solidFill>
+                <a:latin typeface="Arial" panose="020B0604020202020204" pitchFamily="34" charset="0"/>
+                <a:cs typeface="Arial" panose="020B0604020202020204" pitchFamily="34" charset="0"/>
+              </a:rPr>
+              <a:t> correct classifications</a:t>
+            </a:r>
+          </a:p>
+        </p:txBody>
+      </p:sp>
+      <p:pic>
+        <p:nvPicPr>
+          <p:cNvPr id="13" name="Picture 12">
+            <a:extLst>
+              <a:ext uri="{FF2B5EF4-FFF2-40B4-BE49-F238E27FC236}">
+                <a16:creationId xmlns:a16="http://schemas.microsoft.com/office/drawing/2014/main" id="{383878D6-1177-F081-6C24-F8C1641D5E8D}"/>
+              </a:ext>
+            </a:extLst>
+          </p:cNvPr>
+          <p:cNvPicPr>
+            <a:picLocks noChangeAspect="1"/>
+          </p:cNvPicPr>
+          <p:nvPr/>
+        </p:nvPicPr>
+        <p:blipFill>
+          <a:blip r:embed="rId3"/>
+          <a:srcRect/>
+          <a:stretch/>
+        </p:blipFill>
+        <p:spPr>
+          <a:xfrm>
+            <a:off x="377054" y="6106182"/>
+            <a:ext cx="4123546" cy="2790370"/>
+          </a:xfrm>
+          <a:prstGeom prst="rect">
+            <a:avLst/>
+          </a:prstGeom>
+        </p:spPr>
+      </p:pic>
+      <p:pic>
+        <p:nvPicPr>
+          <p:cNvPr id="18" name="Picture 17">
+            <a:extLst>
+              <a:ext uri="{FF2B5EF4-FFF2-40B4-BE49-F238E27FC236}">
+                <a16:creationId xmlns:a16="http://schemas.microsoft.com/office/drawing/2014/main" id="{7E6FC67A-D3F2-B466-F29F-89987FF2F2DA}"/>
+              </a:ext>
+            </a:extLst>
+          </p:cNvPr>
+          <p:cNvPicPr>
+            <a:picLocks noChangeAspect="1"/>
+          </p:cNvPicPr>
+          <p:nvPr/>
+        </p:nvPicPr>
+        <p:blipFill>
+          <a:blip r:embed="rId4"/>
+          <a:srcRect/>
+          <a:stretch/>
+        </p:blipFill>
+        <p:spPr>
+          <a:xfrm>
+            <a:off x="5440716" y="6106182"/>
+            <a:ext cx="6696888" cy="2790370"/>
+          </a:xfrm>
+          <a:prstGeom prst="rect">
+            <a:avLst/>
+          </a:prstGeom>
+        </p:spPr>
+      </p:pic>
+      <p:pic>
+        <p:nvPicPr>
+          <p:cNvPr id="6" name="Picture 5">
+            <a:extLst>
+              <a:ext uri="{FF2B5EF4-FFF2-40B4-BE49-F238E27FC236}">
+                <a16:creationId xmlns:a16="http://schemas.microsoft.com/office/drawing/2014/main" id="{2AD3B3A7-68F8-0F96-2E61-80E2A12CA200}"/>
+              </a:ext>
+            </a:extLst>
+          </p:cNvPr>
+          <p:cNvPicPr>
+            <a:picLocks noChangeAspect="1"/>
+          </p:cNvPicPr>
+          <p:nvPr/>
+        </p:nvPicPr>
+        <p:blipFill>
+          <a:blip r:embed="rId5"/>
+          <a:srcRect/>
+          <a:stretch/>
+        </p:blipFill>
+        <p:spPr>
+          <a:xfrm>
+            <a:off x="6024667" y="3206523"/>
+            <a:ext cx="6299200" cy="2743200"/>
+          </a:xfrm>
+          <a:prstGeom prst="rect">
+            <a:avLst/>
+          </a:prstGeom>
+        </p:spPr>
+      </p:pic>
+      <p:pic>
+        <p:nvPicPr>
+          <p:cNvPr id="3" name="Picture 2">
+            <a:extLst>
+              <a:ext uri="{FF2B5EF4-FFF2-40B4-BE49-F238E27FC236}">
+                <a16:creationId xmlns:a16="http://schemas.microsoft.com/office/drawing/2014/main" id="{B56BD701-256A-B6B0-4B69-52519B8DE0B4}"/>
+              </a:ext>
+            </a:extLst>
+          </p:cNvPr>
+          <p:cNvPicPr>
+            <a:picLocks noChangeAspect="1"/>
+          </p:cNvPicPr>
+          <p:nvPr/>
+        </p:nvPicPr>
+        <p:blipFill>
+          <a:blip r:embed="rId6"/>
+          <a:srcRect/>
+          <a:stretch/>
+        </p:blipFill>
+        <p:spPr>
+          <a:xfrm>
+            <a:off x="145271" y="3210842"/>
+            <a:ext cx="6121400" cy="2743200"/>
+          </a:xfrm>
+          <a:prstGeom prst="rect">
+            <a:avLst/>
+          </a:prstGeom>
+        </p:spPr>
+      </p:pic>
+      <p:pic>
+        <p:nvPicPr>
+          <p:cNvPr id="104" name="Picture 103" descr="A chart with text and numbers&#10;&#10;Description automatically generated with medium confidence">
+            <a:extLst>
+              <a:ext uri="{FF2B5EF4-FFF2-40B4-BE49-F238E27FC236}">
+                <a16:creationId xmlns:a16="http://schemas.microsoft.com/office/drawing/2014/main" id="{34FC3C48-4D5C-3ED3-0387-C3187286D521}"/>
+              </a:ext>
+            </a:extLst>
+          </p:cNvPr>
+          <p:cNvPicPr>
+            <a:picLocks noChangeAspect="1"/>
+          </p:cNvPicPr>
+          <p:nvPr/>
+        </p:nvPicPr>
+        <p:blipFill rotWithShape="1">
+          <a:blip r:embed="rId7"/>
+          <a:srcRect t="38975" r="95435" b="45096"/>
+          <a:stretch/>
+        </p:blipFill>
+        <p:spPr>
+          <a:xfrm>
+            <a:off x="110061" y="3632023"/>
+            <a:ext cx="279400" cy="1165225"/>
+          </a:xfrm>
+          <a:prstGeom prst="rect">
+            <a:avLst/>
+          </a:prstGeom>
+        </p:spPr>
+      </p:pic>
+    </p:spTree>
+    <p:extLst>
+      <p:ext uri="{BB962C8B-B14F-4D97-AF65-F5344CB8AC3E}">
+        <p14:creationId xmlns:p14="http://schemas.microsoft.com/office/powerpoint/2010/main" val="2375331731"/>
+      </p:ext>
+    </p:extLst>
+  </p:cSld>
+  <p:clrMapOvr>
+    <a:masterClrMapping/>
+  </p:clrMapOvr>
+</p:sld>
+</file>
+
+<file path=ppt/slides/slide3.xml><?xml version="1.0" encoding="utf-8"?>
+<p:sld xmlns:a="http://schemas.openxmlformats.org/drawingml/2006/main" xmlns:r="http://schemas.openxmlformats.org/officeDocument/2006/relationships" xmlns:p="http://schemas.openxmlformats.org/presentationml/2006/main">
+  <p:cSld>
+    <p:spTree>
+      <p:nvGrpSpPr>
+        <p:cNvPr id="1" name="">
+          <a:extLst>
+            <a:ext uri="{FF2B5EF4-FFF2-40B4-BE49-F238E27FC236}">
+              <a16:creationId xmlns:a16="http://schemas.microsoft.com/office/drawing/2014/main" id="{B7FFE3AA-28C1-B882-DD14-0A0FFF126160}"/>
+            </a:ext>
+          </a:extLst>
+        </p:cNvPr>
+        <p:cNvGrpSpPr/>
+        <p:nvPr/>
+      </p:nvGrpSpPr>
+      <p:grpSpPr>
+        <a:xfrm>
+          <a:off x="0" y="0"/>
+          <a:ext cx="0" cy="0"/>
+          <a:chOff x="0" y="0"/>
+          <a:chExt cx="0" cy="0"/>
+        </a:xfrm>
+      </p:grpSpPr>
+      <p:sp>
+        <p:nvSpPr>
+          <p:cNvPr id="7" name="Rounded Rectangle 6">
+            <a:extLst>
+              <a:ext uri="{FF2B5EF4-FFF2-40B4-BE49-F238E27FC236}">
+                <a16:creationId xmlns:a16="http://schemas.microsoft.com/office/drawing/2014/main" id="{153DF881-BF27-3018-4AF9-9E5DB4D7E614}"/>
+              </a:ext>
+            </a:extLst>
+          </p:cNvPr>
+          <p:cNvSpPr/>
+          <p:nvPr/>
+        </p:nvSpPr>
+        <p:spPr>
+          <a:xfrm>
+            <a:off x="1690436" y="175519"/>
+            <a:ext cx="2117558" cy="673768"/>
+          </a:xfrm>
+          <a:prstGeom prst="roundRect">
+            <a:avLst/>
+          </a:prstGeom>
+          <a:solidFill>
+            <a:srgbClr val="000000"/>
+          </a:solidFill>
+          <a:ln w="28575">
+            <a:solidFill>
+              <a:schemeClr val="tx1"/>
+            </a:solidFill>
+          </a:ln>
+        </p:spPr>
+        <p:style>
+          <a:lnRef idx="2">
+            <a:schemeClr val="accent1">
+              <a:shade val="15000"/>
+            </a:schemeClr>
+          </a:lnRef>
+          <a:fillRef idx="1">
+            <a:schemeClr val="accent1"/>
+          </a:fillRef>
+          <a:effectRef idx="0">
+            <a:schemeClr val="accent1"/>
+          </a:effectRef>
+          <a:fontRef idx="minor">
+            <a:schemeClr val="lt1"/>
+          </a:fontRef>
+        </p:style>
+        <p:txBody>
+          <a:bodyPr rtlCol="0" anchor="ctr"/>
+          <a:lstStyle/>
+          <a:p>
+            <a:pPr algn="ctr"/>
+            <a:r>
+              <a:rPr lang="en-US" b="1" dirty="0">
+                <a:solidFill>
+                  <a:schemeClr val="bg1"/>
+                </a:solidFill>
+                <a:latin typeface="Arial" panose="020B0604020202020204" pitchFamily="34" charset="0"/>
+                <a:cs typeface="Arial" panose="020B0604020202020204" pitchFamily="34" charset="0"/>
+              </a:rPr>
+              <a:t>All lakes</a:t>
+            </a:r>
+          </a:p>
+          <a:p>
+            <a:pPr algn="ctr"/>
+            <a:r>
+              <a:rPr lang="en-US" dirty="0">
+                <a:solidFill>
+                  <a:schemeClr val="bg1"/>
+                </a:solidFill>
+                <a:latin typeface="Arial" panose="020B0604020202020204" pitchFamily="34" charset="0"/>
+                <a:cs typeface="Arial" panose="020B0604020202020204" pitchFamily="34" charset="0"/>
+              </a:rPr>
+              <a:t>n = 38,566</a:t>
+            </a:r>
+          </a:p>
+        </p:txBody>
+      </p:sp>
+      <p:sp>
+        <p:nvSpPr>
+          <p:cNvPr id="9" name="Rounded Rectangle 8">
+            <a:extLst>
+              <a:ext uri="{FF2B5EF4-FFF2-40B4-BE49-F238E27FC236}">
+                <a16:creationId xmlns:a16="http://schemas.microsoft.com/office/drawing/2014/main" id="{FDA439D0-AFC5-6B99-A5BD-7A8262EE38F2}"/>
+              </a:ext>
+            </a:extLst>
+          </p:cNvPr>
+          <p:cNvSpPr/>
+          <p:nvPr/>
+        </p:nvSpPr>
+        <p:spPr>
+          <a:xfrm>
+            <a:off x="3161177" y="1567171"/>
+            <a:ext cx="1760623" cy="1472184"/>
+          </a:xfrm>
+          <a:prstGeom prst="roundRect">
+            <a:avLst/>
+          </a:prstGeom>
+          <a:solidFill>
+            <a:srgbClr val="93C47D"/>
+          </a:solidFill>
+          <a:ln w="28575">
+            <a:solidFill>
+              <a:schemeClr val="tx1"/>
+            </a:solidFill>
+          </a:ln>
+        </p:spPr>
+        <p:style>
+          <a:lnRef idx="2">
+            <a:schemeClr val="accent1">
+              <a:shade val="15000"/>
+            </a:schemeClr>
+          </a:lnRef>
+          <a:fillRef idx="1">
+            <a:schemeClr val="accent1"/>
+          </a:fillRef>
+          <a:effectRef idx="0">
+            <a:schemeClr val="accent1"/>
+          </a:effectRef>
+          <a:fontRef idx="minor">
+            <a:schemeClr val="lt1"/>
+          </a:fontRef>
+        </p:style>
+        <p:txBody>
+          <a:bodyPr rtlCol="0" anchor="ctr"/>
+          <a:lstStyle/>
+          <a:p>
+            <a:pPr algn="ctr"/>
+            <a:r>
+              <a:rPr lang="en-US" b="1" dirty="0">
+                <a:solidFill>
+                  <a:schemeClr val="tx1"/>
+                </a:solidFill>
+                <a:latin typeface="Arial" panose="020B0604020202020204" pitchFamily="34" charset="0"/>
+                <a:cs typeface="Arial" panose="020B0604020202020204" pitchFamily="34" charset="0"/>
+              </a:rPr>
+              <a:t>Green lakes </a:t>
+            </a:r>
+          </a:p>
+          <a:p>
+            <a:pPr algn="ctr"/>
+            <a:r>
+              <a:rPr lang="en-US" sz="1600" dirty="0">
+                <a:solidFill>
+                  <a:schemeClr val="tx1"/>
+                </a:solidFill>
+                <a:latin typeface="Arial" panose="020B0604020202020204" pitchFamily="34" charset="0"/>
+                <a:cs typeface="Arial" panose="020B0604020202020204" pitchFamily="34" charset="0"/>
+              </a:rPr>
+              <a:t>DWL &gt; 530</a:t>
+            </a:r>
+          </a:p>
+          <a:p>
+            <a:pPr algn="ctr"/>
+            <a:r>
+              <a:rPr lang="en-US" sz="1600" b="1" dirty="0">
+                <a:solidFill>
+                  <a:schemeClr val="tx1"/>
+                </a:solidFill>
+                <a:latin typeface="Arial" panose="020B0604020202020204" pitchFamily="34" charset="0"/>
+                <a:cs typeface="Arial" panose="020B0604020202020204" pitchFamily="34" charset="0"/>
+              </a:rPr>
+              <a:t>84.9% </a:t>
+            </a:r>
+            <a:r>
+              <a:rPr lang="en-US" sz="1600" dirty="0">
+                <a:solidFill>
+                  <a:schemeClr val="tx1"/>
+                </a:solidFill>
+                <a:latin typeface="Arial" panose="020B0604020202020204" pitchFamily="34" charset="0"/>
+                <a:cs typeface="Arial" panose="020B0604020202020204" pitchFamily="34" charset="0"/>
+              </a:rPr>
+              <a:t>correct classifications</a:t>
+            </a:r>
+          </a:p>
+        </p:txBody>
+      </p:sp>
+      <p:sp>
+        <p:nvSpPr>
+          <p:cNvPr id="11" name="Rounded Rectangle 10">
+            <a:extLst>
+              <a:ext uri="{FF2B5EF4-FFF2-40B4-BE49-F238E27FC236}">
+                <a16:creationId xmlns:a16="http://schemas.microsoft.com/office/drawing/2014/main" id="{0F903863-08D5-29EE-CFD2-564F5E7449D1}"/>
+              </a:ext>
+            </a:extLst>
+          </p:cNvPr>
+          <p:cNvSpPr/>
+          <p:nvPr/>
+        </p:nvSpPr>
+        <p:spPr>
+          <a:xfrm>
+            <a:off x="670034" y="1567173"/>
+            <a:ext cx="1764792" cy="1472184"/>
+          </a:xfrm>
+          <a:prstGeom prst="roundRect">
+            <a:avLst/>
+          </a:prstGeom>
+          <a:solidFill>
+            <a:srgbClr val="75AEDB">
+              <a:alpha val="78824"/>
+            </a:srgbClr>
+          </a:solidFill>
+          <a:ln w="28575">
+            <a:solidFill>
+              <a:schemeClr val="tx1"/>
+            </a:solidFill>
+          </a:ln>
+        </p:spPr>
+        <p:style>
+          <a:lnRef idx="2">
+            <a:schemeClr val="accent1">
+              <a:shade val="15000"/>
+            </a:schemeClr>
+          </a:lnRef>
+          <a:fillRef idx="1">
+            <a:schemeClr val="accent1"/>
+          </a:fillRef>
+          <a:effectRef idx="0">
+            <a:schemeClr val="accent1"/>
+          </a:effectRef>
+          <a:fontRef idx="minor">
+            <a:schemeClr val="lt1"/>
+          </a:fontRef>
+        </p:style>
+        <p:txBody>
+          <a:bodyPr rtlCol="0" anchor="ctr"/>
+          <a:lstStyle/>
+          <a:p>
+            <a:pPr algn="ctr"/>
+            <a:r>
+              <a:rPr lang="en-US" b="1" dirty="0">
+                <a:solidFill>
+                  <a:schemeClr val="tx1"/>
+                </a:solidFill>
+                <a:latin typeface="Arial" panose="020B0604020202020204" pitchFamily="34" charset="0"/>
+                <a:cs typeface="Arial" panose="020B0604020202020204" pitchFamily="34" charset="0"/>
+              </a:rPr>
+              <a:t>Blue lakes </a:t>
+            </a:r>
+          </a:p>
+          <a:p>
+            <a:pPr algn="ctr"/>
+            <a:r>
+              <a:rPr lang="en-US" sz="1600" dirty="0">
+                <a:solidFill>
+                  <a:schemeClr val="tx1"/>
+                </a:solidFill>
+                <a:latin typeface="Arial" panose="020B0604020202020204" pitchFamily="34" charset="0"/>
+                <a:cs typeface="Arial" panose="020B0604020202020204" pitchFamily="34" charset="0"/>
+              </a:rPr>
+              <a:t>DWL &lt; 530</a:t>
+            </a:r>
+          </a:p>
+          <a:p>
+            <a:pPr algn="ctr"/>
+            <a:r>
+              <a:rPr lang="en-US" sz="1600" b="1">
+                <a:solidFill>
+                  <a:schemeClr val="tx1"/>
+                </a:solidFill>
+                <a:latin typeface="Arial" panose="020B0604020202020204" pitchFamily="34" charset="0"/>
+                <a:cs typeface="Arial" panose="020B0604020202020204" pitchFamily="34" charset="0"/>
+              </a:rPr>
+              <a:t>86.8</a:t>
+            </a:r>
+            <a:r>
+              <a:rPr lang="en-US" sz="1600" b="1" dirty="0">
+                <a:solidFill>
+                  <a:schemeClr val="tx1"/>
+                </a:solidFill>
+                <a:latin typeface="Arial" panose="020B0604020202020204" pitchFamily="34" charset="0"/>
+                <a:cs typeface="Arial" panose="020B0604020202020204" pitchFamily="34" charset="0"/>
+              </a:rPr>
+              <a:t>%</a:t>
+            </a:r>
+            <a:r>
+              <a:rPr lang="en-US" sz="1600" dirty="0">
+                <a:solidFill>
+                  <a:schemeClr val="tx1"/>
+                </a:solidFill>
+                <a:latin typeface="Arial" panose="020B0604020202020204" pitchFamily="34" charset="0"/>
+                <a:cs typeface="Arial" panose="020B0604020202020204" pitchFamily="34" charset="0"/>
+              </a:rPr>
+              <a:t> correct classifications</a:t>
+            </a:r>
+          </a:p>
+        </p:txBody>
+      </p:sp>
+      <p:cxnSp>
+        <p:nvCxnSpPr>
+          <p:cNvPr id="14" name="Straight Arrow Connector 13">
+            <a:extLst>
+              <a:ext uri="{FF2B5EF4-FFF2-40B4-BE49-F238E27FC236}">
+                <a16:creationId xmlns:a16="http://schemas.microsoft.com/office/drawing/2014/main" id="{526EAD6D-434F-803C-7083-4FD1A34E372C}"/>
+              </a:ext>
+            </a:extLst>
+          </p:cNvPr>
+          <p:cNvCxnSpPr>
+            <a:cxnSpLocks/>
+          </p:cNvCxnSpPr>
+          <p:nvPr/>
+        </p:nvCxnSpPr>
+        <p:spPr>
+          <a:xfrm flipH="1">
+            <a:off x="1784700" y="953561"/>
+            <a:ext cx="425115" cy="512064"/>
+          </a:xfrm>
+          <a:prstGeom prst="straightConnector1">
+            <a:avLst/>
+          </a:prstGeom>
+          <a:ln w="76200">
+            <a:solidFill>
+              <a:schemeClr val="tx1"/>
+            </a:solidFill>
+            <a:tailEnd type="triangle"/>
+          </a:ln>
+        </p:spPr>
+        <p:style>
+          <a:lnRef idx="2">
+            <a:schemeClr val="accent1"/>
+          </a:lnRef>
+          <a:fillRef idx="0">
+            <a:schemeClr val="accent1"/>
+          </a:fillRef>
+          <a:effectRef idx="1">
+            <a:schemeClr val="accent1"/>
+          </a:effectRef>
+          <a:fontRef idx="minor">
+            <a:schemeClr val="tx1"/>
+          </a:fontRef>
+        </p:style>
+      </p:cxnSp>
+      <p:cxnSp>
+        <p:nvCxnSpPr>
+          <p:cNvPr id="16" name="Straight Arrow Connector 15">
+            <a:extLst>
+              <a:ext uri="{FF2B5EF4-FFF2-40B4-BE49-F238E27FC236}">
+                <a16:creationId xmlns:a16="http://schemas.microsoft.com/office/drawing/2014/main" id="{4CDDB712-03C4-E7CC-0FC1-F97E9565009B}"/>
+              </a:ext>
+            </a:extLst>
+          </p:cNvPr>
+          <p:cNvCxnSpPr>
+            <a:cxnSpLocks/>
+          </p:cNvCxnSpPr>
+          <p:nvPr/>
+        </p:nvCxnSpPr>
+        <p:spPr>
+          <a:xfrm>
+            <a:off x="3298658" y="955329"/>
+            <a:ext cx="420624" cy="512064"/>
+          </a:xfrm>
+          <a:prstGeom prst="straightConnector1">
+            <a:avLst/>
+          </a:prstGeom>
+          <a:ln w="76200">
+            <a:solidFill>
+              <a:schemeClr val="tx1"/>
+            </a:solidFill>
+            <a:tailEnd type="triangle"/>
+          </a:ln>
+        </p:spPr>
+        <p:style>
+          <a:lnRef idx="2">
+            <a:schemeClr val="accent1"/>
+          </a:lnRef>
+          <a:fillRef idx="0">
+            <a:schemeClr val="accent1"/>
+          </a:fillRef>
+          <a:effectRef idx="1">
+            <a:schemeClr val="accent1"/>
+          </a:effectRef>
+          <a:fontRef idx="minor">
+            <a:schemeClr val="tx1"/>
+          </a:fontRef>
+        </p:style>
+      </p:cxnSp>
+      <p:sp>
+        <p:nvSpPr>
+          <p:cNvPr id="27" name="Rounded Rectangle 26">
+            <a:extLst>
+              <a:ext uri="{FF2B5EF4-FFF2-40B4-BE49-F238E27FC236}">
+                <a16:creationId xmlns:a16="http://schemas.microsoft.com/office/drawing/2014/main" id="{E31D6988-FC2F-9E4F-FBCE-91D9E1ACCE35}"/>
+              </a:ext>
+            </a:extLst>
+          </p:cNvPr>
+          <p:cNvSpPr/>
+          <p:nvPr/>
+        </p:nvSpPr>
+        <p:spPr>
+          <a:xfrm>
+            <a:off x="7896727" y="175519"/>
+            <a:ext cx="2117558" cy="673768"/>
+          </a:xfrm>
+          <a:prstGeom prst="roundRect">
+            <a:avLst/>
+          </a:prstGeom>
+          <a:solidFill>
+            <a:srgbClr val="000000"/>
+          </a:solidFill>
+          <a:ln w="28575">
+            <a:solidFill>
+              <a:schemeClr val="tx1"/>
+            </a:solidFill>
+          </a:ln>
+        </p:spPr>
+        <p:style>
+          <a:lnRef idx="2">
+            <a:schemeClr val="accent1">
+              <a:shade val="15000"/>
+            </a:schemeClr>
+          </a:lnRef>
+          <a:fillRef idx="1">
+            <a:schemeClr val="accent1"/>
+          </a:fillRef>
+          <a:effectRef idx="0">
+            <a:schemeClr val="accent1"/>
+          </a:effectRef>
+          <a:fontRef idx="minor">
+            <a:schemeClr val="lt1"/>
+          </a:fontRef>
+        </p:style>
+        <p:txBody>
+          <a:bodyPr rtlCol="0" anchor="ctr"/>
+          <a:lstStyle/>
+          <a:p>
+            <a:pPr algn="ctr"/>
+            <a:r>
+              <a:rPr lang="en-US" b="1" dirty="0">
+                <a:solidFill>
+                  <a:schemeClr val="bg1"/>
+                </a:solidFill>
+                <a:latin typeface="Arial" panose="020B0604020202020204" pitchFamily="34" charset="0"/>
+                <a:cs typeface="Arial" panose="020B0604020202020204" pitchFamily="34" charset="0"/>
+              </a:rPr>
+              <a:t>Subset of lakes</a:t>
+            </a:r>
+          </a:p>
+          <a:p>
+            <a:pPr algn="ctr"/>
+            <a:r>
+              <a:rPr lang="en-US" dirty="0">
+                <a:solidFill>
+                  <a:schemeClr val="bg1"/>
+                </a:solidFill>
+                <a:latin typeface="Arial" panose="020B0604020202020204" pitchFamily="34" charset="0"/>
+                <a:cs typeface="Arial" panose="020B0604020202020204" pitchFamily="34" charset="0"/>
+              </a:rPr>
+              <a:t>n = 2,160</a:t>
+            </a:r>
+          </a:p>
+        </p:txBody>
+      </p:sp>
+      <p:cxnSp>
+        <p:nvCxnSpPr>
+          <p:cNvPr id="30" name="Straight Arrow Connector 29">
+            <a:extLst>
+              <a:ext uri="{FF2B5EF4-FFF2-40B4-BE49-F238E27FC236}">
+                <a16:creationId xmlns:a16="http://schemas.microsoft.com/office/drawing/2014/main" id="{62247B04-E21C-B319-CD17-76B0166868CF}"/>
+              </a:ext>
+            </a:extLst>
+          </p:cNvPr>
+          <p:cNvCxnSpPr>
+            <a:cxnSpLocks/>
+          </p:cNvCxnSpPr>
+          <p:nvPr/>
+        </p:nvCxnSpPr>
+        <p:spPr>
+          <a:xfrm flipH="1">
+            <a:off x="7602811" y="949551"/>
+            <a:ext cx="425115" cy="509338"/>
+          </a:xfrm>
+          <a:prstGeom prst="straightConnector1">
+            <a:avLst/>
+          </a:prstGeom>
+          <a:ln w="76200">
+            <a:solidFill>
+              <a:schemeClr val="tx1"/>
+            </a:solidFill>
+            <a:tailEnd type="triangle"/>
+          </a:ln>
+        </p:spPr>
+        <p:style>
+          <a:lnRef idx="2">
+            <a:schemeClr val="accent1"/>
+          </a:lnRef>
+          <a:fillRef idx="0">
+            <a:schemeClr val="accent1"/>
+          </a:fillRef>
+          <a:effectRef idx="1">
+            <a:schemeClr val="accent1"/>
+          </a:effectRef>
+          <a:fontRef idx="minor">
+            <a:schemeClr val="tx1"/>
+          </a:fontRef>
+        </p:style>
+      </p:cxnSp>
+      <p:cxnSp>
+        <p:nvCxnSpPr>
+          <p:cNvPr id="31" name="Straight Arrow Connector 30">
+            <a:extLst>
+              <a:ext uri="{FF2B5EF4-FFF2-40B4-BE49-F238E27FC236}">
+                <a16:creationId xmlns:a16="http://schemas.microsoft.com/office/drawing/2014/main" id="{881F10B2-7A43-ADC8-B71E-1071EBF13E2A}"/>
+              </a:ext>
+            </a:extLst>
+          </p:cNvPr>
+          <p:cNvCxnSpPr>
+            <a:cxnSpLocks/>
+          </p:cNvCxnSpPr>
+          <p:nvPr/>
+        </p:nvCxnSpPr>
+        <p:spPr>
+          <a:xfrm>
+            <a:off x="9896369" y="949551"/>
+            <a:ext cx="420624" cy="512064"/>
+          </a:xfrm>
+          <a:prstGeom prst="straightConnector1">
+            <a:avLst/>
+          </a:prstGeom>
+          <a:ln w="76200">
+            <a:solidFill>
+              <a:schemeClr val="tx1"/>
+            </a:solidFill>
+            <a:tailEnd type="triangle"/>
+          </a:ln>
+        </p:spPr>
+        <p:style>
+          <a:lnRef idx="2">
+            <a:schemeClr val="accent1"/>
+          </a:lnRef>
+          <a:fillRef idx="0">
+            <a:schemeClr val="accent1"/>
+          </a:fillRef>
+          <a:effectRef idx="1">
+            <a:schemeClr val="accent1"/>
+          </a:effectRef>
+          <a:fontRef idx="minor">
+            <a:schemeClr val="tx1"/>
+          </a:fontRef>
+        </p:style>
+      </p:cxnSp>
+      <p:sp>
+        <p:nvSpPr>
+          <p:cNvPr id="33" name="Rounded Rectangle 32">
+            <a:extLst>
+              <a:ext uri="{FF2B5EF4-FFF2-40B4-BE49-F238E27FC236}">
+                <a16:creationId xmlns:a16="http://schemas.microsoft.com/office/drawing/2014/main" id="{060E6BDB-3C5B-22FA-58BA-86F3DB4B243F}"/>
+              </a:ext>
+            </a:extLst>
+          </p:cNvPr>
+          <p:cNvSpPr/>
+          <p:nvPr/>
+        </p:nvSpPr>
+        <p:spPr>
+          <a:xfrm>
+            <a:off x="5925285" y="1567186"/>
+            <a:ext cx="1938528" cy="1471861"/>
+          </a:xfrm>
+          <a:prstGeom prst="roundRect">
+            <a:avLst/>
+          </a:prstGeom>
+          <a:solidFill>
+            <a:srgbClr val="75AEDB">
+              <a:alpha val="78824"/>
+            </a:srgbClr>
+          </a:solidFill>
+          <a:ln w="28575">
+            <a:solidFill>
+              <a:schemeClr val="tx1"/>
+            </a:solidFill>
+          </a:ln>
+        </p:spPr>
+        <p:style>
+          <a:lnRef idx="2">
+            <a:schemeClr val="accent1">
+              <a:shade val="15000"/>
+            </a:schemeClr>
+          </a:lnRef>
+          <a:fillRef idx="1">
+            <a:schemeClr val="accent1"/>
+          </a:fillRef>
+          <a:effectRef idx="0">
+            <a:schemeClr val="accent1"/>
+          </a:effectRef>
+          <a:fontRef idx="minor">
+            <a:schemeClr val="lt1"/>
+          </a:fontRef>
+        </p:style>
+        <p:txBody>
+          <a:bodyPr rtlCol="0" anchor="ctr"/>
+          <a:lstStyle/>
+          <a:p>
+            <a:pPr algn="ctr"/>
+            <a:r>
+              <a:rPr lang="en-US" b="1" dirty="0">
+                <a:solidFill>
+                  <a:schemeClr val="tx1"/>
+                </a:solidFill>
+                <a:latin typeface="Arial" panose="020B0604020202020204" pitchFamily="34" charset="0"/>
+                <a:cs typeface="Arial" panose="020B0604020202020204" pitchFamily="34" charset="0"/>
+              </a:rPr>
+              <a:t>Trending blue</a:t>
+            </a:r>
+          </a:p>
+          <a:p>
+            <a:pPr algn="ctr"/>
+            <a:r>
+              <a:rPr lang="en-US" sz="1600" i="1" dirty="0">
+                <a:solidFill>
+                  <a:schemeClr val="tx1"/>
+                </a:solidFill>
+                <a:latin typeface="Arial" panose="020B0604020202020204" pitchFamily="34" charset="0"/>
+                <a:cs typeface="Arial" panose="020B0604020202020204" pitchFamily="34" charset="0"/>
+              </a:rPr>
+              <a:t>P </a:t>
+            </a:r>
+            <a:r>
+              <a:rPr lang="en-US" sz="1600" dirty="0">
+                <a:solidFill>
+                  <a:schemeClr val="tx1"/>
+                </a:solidFill>
+                <a:latin typeface="Arial" panose="020B0604020202020204" pitchFamily="34" charset="0"/>
+                <a:cs typeface="Arial" panose="020B0604020202020204" pitchFamily="34" charset="0"/>
+              </a:rPr>
+              <a:t>≤ 0.05</a:t>
+            </a:r>
+          </a:p>
+          <a:p>
+            <a:pPr algn="ctr"/>
+            <a:r>
+              <a:rPr lang="en-US" sz="1600" dirty="0">
+                <a:solidFill>
+                  <a:schemeClr val="tx1"/>
+                </a:solidFill>
+                <a:latin typeface="Arial" panose="020B0604020202020204" pitchFamily="34" charset="0"/>
+                <a:cs typeface="Arial" panose="020B0604020202020204" pitchFamily="34" charset="0"/>
+              </a:rPr>
+              <a:t>slope coef. &lt; -0.4</a:t>
+            </a:r>
+          </a:p>
+          <a:p>
+            <a:pPr algn="ctr"/>
+            <a:r>
+              <a:rPr lang="en-US" sz="1600" b="1" dirty="0">
+                <a:solidFill>
+                  <a:schemeClr val="tx1"/>
+                </a:solidFill>
+                <a:latin typeface="Arial" panose="020B0604020202020204" pitchFamily="34" charset="0"/>
+                <a:cs typeface="Arial" panose="020B0604020202020204" pitchFamily="34" charset="0"/>
+              </a:rPr>
+              <a:t>54.5%</a:t>
+            </a:r>
+            <a:r>
+              <a:rPr lang="en-US" sz="1600" dirty="0">
+                <a:solidFill>
+                  <a:schemeClr val="tx1"/>
+                </a:solidFill>
+                <a:latin typeface="Arial" panose="020B0604020202020204" pitchFamily="34" charset="0"/>
+                <a:cs typeface="Arial" panose="020B0604020202020204" pitchFamily="34" charset="0"/>
+              </a:rPr>
+              <a:t> correct classifications</a:t>
+            </a:r>
+          </a:p>
+        </p:txBody>
+      </p:sp>
+      <p:cxnSp>
+        <p:nvCxnSpPr>
+          <p:cNvPr id="35" name="Straight Arrow Connector 34">
+            <a:extLst>
+              <a:ext uri="{FF2B5EF4-FFF2-40B4-BE49-F238E27FC236}">
+                <a16:creationId xmlns:a16="http://schemas.microsoft.com/office/drawing/2014/main" id="{4617868F-C8EF-79E7-4BF6-CF93AAF808A6}"/>
+              </a:ext>
+            </a:extLst>
+          </p:cNvPr>
+          <p:cNvCxnSpPr>
+            <a:cxnSpLocks/>
+          </p:cNvCxnSpPr>
+          <p:nvPr/>
+        </p:nvCxnSpPr>
+        <p:spPr>
+          <a:xfrm>
+            <a:off x="8963825" y="973631"/>
+            <a:ext cx="12893" cy="561473"/>
+          </a:xfrm>
+          <a:prstGeom prst="straightConnector1">
+            <a:avLst/>
+          </a:prstGeom>
+          <a:ln w="76200">
+            <a:solidFill>
+              <a:schemeClr val="tx1"/>
+            </a:solidFill>
+            <a:tailEnd type="triangle"/>
+          </a:ln>
+        </p:spPr>
+        <p:style>
+          <a:lnRef idx="2">
+            <a:schemeClr val="accent1"/>
+          </a:lnRef>
+          <a:fillRef idx="0">
+            <a:schemeClr val="accent1"/>
+          </a:fillRef>
+          <a:effectRef idx="1">
+            <a:schemeClr val="accent1"/>
+          </a:effectRef>
+          <a:fontRef idx="minor">
+            <a:schemeClr val="tx1"/>
+          </a:fontRef>
+        </p:style>
+      </p:cxnSp>
+      <p:sp>
+        <p:nvSpPr>
+          <p:cNvPr id="37" name="Rounded Rectangle 36">
+            <a:extLst>
+              <a:ext uri="{FF2B5EF4-FFF2-40B4-BE49-F238E27FC236}">
+                <a16:creationId xmlns:a16="http://schemas.microsoft.com/office/drawing/2014/main" id="{6F8DB553-6284-1F6D-66C7-EF4809D63209}"/>
+              </a:ext>
+            </a:extLst>
+          </p:cNvPr>
+          <p:cNvSpPr/>
+          <p:nvPr/>
+        </p:nvSpPr>
+        <p:spPr>
+          <a:xfrm>
+            <a:off x="8045672" y="1563179"/>
+            <a:ext cx="1938528" cy="1471861"/>
+          </a:xfrm>
+          <a:prstGeom prst="roundRect">
+            <a:avLst/>
+          </a:prstGeom>
+          <a:solidFill>
+            <a:schemeClr val="bg1">
+              <a:lumMod val="85000"/>
+            </a:schemeClr>
+          </a:solidFill>
+          <a:ln w="28575">
+            <a:solidFill>
+              <a:schemeClr val="tx1"/>
+            </a:solidFill>
+          </a:ln>
+        </p:spPr>
+        <p:style>
+          <a:lnRef idx="2">
+            <a:schemeClr val="accent1">
+              <a:shade val="15000"/>
+            </a:schemeClr>
+          </a:lnRef>
+          <a:fillRef idx="1">
+            <a:schemeClr val="accent1"/>
+          </a:fillRef>
+          <a:effectRef idx="0">
+            <a:schemeClr val="accent1"/>
+          </a:effectRef>
+          <a:fontRef idx="minor">
+            <a:schemeClr val="lt1"/>
+          </a:fontRef>
+        </p:style>
+        <p:txBody>
+          <a:bodyPr rtlCol="0" anchor="ctr"/>
+          <a:lstStyle/>
+          <a:p>
+            <a:pPr algn="ctr"/>
+            <a:r>
+              <a:rPr lang="en-US" b="1" dirty="0">
+                <a:solidFill>
+                  <a:schemeClr val="tx1"/>
+                </a:solidFill>
+                <a:latin typeface="Arial" panose="020B0604020202020204" pitchFamily="34" charset="0"/>
+                <a:cs typeface="Arial" panose="020B0604020202020204" pitchFamily="34" charset="0"/>
+              </a:rPr>
+              <a:t>No trend</a:t>
+            </a:r>
+          </a:p>
+          <a:p>
+            <a:pPr algn="ctr"/>
+            <a:r>
+              <a:rPr lang="en-US" sz="1600" i="1" dirty="0">
+                <a:solidFill>
+                  <a:schemeClr val="tx1"/>
+                </a:solidFill>
+                <a:latin typeface="Arial" panose="020B0604020202020204" pitchFamily="34" charset="0"/>
+                <a:cs typeface="Arial" panose="020B0604020202020204" pitchFamily="34" charset="0"/>
+              </a:rPr>
+              <a:t>P &gt;</a:t>
+            </a:r>
+            <a:r>
+              <a:rPr lang="en-US" sz="1600" dirty="0">
+                <a:solidFill>
+                  <a:schemeClr val="tx1"/>
+                </a:solidFill>
+                <a:latin typeface="Arial" panose="020B0604020202020204" pitchFamily="34" charset="0"/>
+                <a:cs typeface="Arial" panose="020B0604020202020204" pitchFamily="34" charset="0"/>
+              </a:rPr>
+              <a:t> 0.05</a:t>
+            </a:r>
+          </a:p>
+          <a:p>
+            <a:pPr algn="ctr"/>
+            <a:r>
+              <a:rPr lang="en-US" sz="1600" b="1" dirty="0">
+                <a:solidFill>
+                  <a:schemeClr val="tx1"/>
+                </a:solidFill>
+                <a:latin typeface="Arial" panose="020B0604020202020204" pitchFamily="34" charset="0"/>
+                <a:cs typeface="Arial" panose="020B0604020202020204" pitchFamily="34" charset="0"/>
+              </a:rPr>
+              <a:t>44.7%</a:t>
+            </a:r>
+            <a:r>
+              <a:rPr lang="en-US" sz="1600" dirty="0">
+                <a:solidFill>
+                  <a:schemeClr val="tx1"/>
+                </a:solidFill>
+                <a:latin typeface="Arial" panose="020B0604020202020204" pitchFamily="34" charset="0"/>
+                <a:cs typeface="Arial" panose="020B0604020202020204" pitchFamily="34" charset="0"/>
+              </a:rPr>
+              <a:t> correct classifications </a:t>
+            </a:r>
+          </a:p>
+        </p:txBody>
+      </p:sp>
+      <p:sp>
+        <p:nvSpPr>
+          <p:cNvPr id="38" name="Rounded Rectangle 37">
+            <a:extLst>
+              <a:ext uri="{FF2B5EF4-FFF2-40B4-BE49-F238E27FC236}">
+                <a16:creationId xmlns:a16="http://schemas.microsoft.com/office/drawing/2014/main" id="{1F8FE1C2-EC1E-D8E2-7527-E8A10C482607}"/>
+              </a:ext>
+            </a:extLst>
+          </p:cNvPr>
+          <p:cNvSpPr/>
+          <p:nvPr/>
+        </p:nvSpPr>
+        <p:spPr>
+          <a:xfrm>
+            <a:off x="10166058" y="1563178"/>
+            <a:ext cx="1984248" cy="1471861"/>
+          </a:xfrm>
+          <a:prstGeom prst="roundRect">
+            <a:avLst/>
+          </a:prstGeom>
+          <a:solidFill>
+            <a:srgbClr val="93C47D"/>
+          </a:solidFill>
+          <a:ln w="28575">
+            <a:solidFill>
+              <a:schemeClr val="tx1"/>
+            </a:solidFill>
+          </a:ln>
+        </p:spPr>
+        <p:style>
+          <a:lnRef idx="2">
+            <a:schemeClr val="accent1">
+              <a:shade val="15000"/>
+            </a:schemeClr>
+          </a:lnRef>
+          <a:fillRef idx="1">
+            <a:schemeClr val="accent1"/>
+          </a:fillRef>
+          <a:effectRef idx="0">
+            <a:schemeClr val="accent1"/>
+          </a:effectRef>
+          <a:fontRef idx="minor">
+            <a:schemeClr val="lt1"/>
+          </a:fontRef>
+        </p:style>
+        <p:txBody>
+          <a:bodyPr rtlCol="0" anchor="ctr"/>
+          <a:lstStyle/>
+          <a:p>
+            <a:pPr algn="ctr"/>
+            <a:r>
+              <a:rPr lang="en-US" b="1" dirty="0">
+                <a:solidFill>
+                  <a:schemeClr val="tx1"/>
+                </a:solidFill>
+                <a:latin typeface="Arial" panose="020B0604020202020204" pitchFamily="34" charset="0"/>
+                <a:cs typeface="Arial" panose="020B0604020202020204" pitchFamily="34" charset="0"/>
+              </a:rPr>
+              <a:t>Trending green</a:t>
+            </a:r>
+          </a:p>
+          <a:p>
+            <a:pPr algn="ctr"/>
+            <a:r>
+              <a:rPr lang="en-US" sz="1600" i="1" dirty="0">
+                <a:solidFill>
+                  <a:schemeClr val="tx1"/>
+                </a:solidFill>
+                <a:latin typeface="Arial" panose="020B0604020202020204" pitchFamily="34" charset="0"/>
+                <a:cs typeface="Arial" panose="020B0604020202020204" pitchFamily="34" charset="0"/>
+              </a:rPr>
+              <a:t>P </a:t>
+            </a:r>
+            <a:r>
+              <a:rPr lang="en-US" sz="1600" dirty="0">
+                <a:solidFill>
+                  <a:schemeClr val="tx1"/>
+                </a:solidFill>
+                <a:latin typeface="Arial" panose="020B0604020202020204" pitchFamily="34" charset="0"/>
+                <a:cs typeface="Arial" panose="020B0604020202020204" pitchFamily="34" charset="0"/>
+              </a:rPr>
+              <a:t>≤ 0.05</a:t>
+            </a:r>
+          </a:p>
+          <a:p>
+            <a:pPr algn="ctr"/>
+            <a:r>
+              <a:rPr lang="en-US" sz="1600" dirty="0">
+                <a:solidFill>
+                  <a:schemeClr val="tx1"/>
+                </a:solidFill>
+                <a:latin typeface="Arial" panose="020B0604020202020204" pitchFamily="34" charset="0"/>
+                <a:cs typeface="Arial" panose="020B0604020202020204" pitchFamily="34" charset="0"/>
+              </a:rPr>
+              <a:t>slope coef. &gt; 0.4</a:t>
+            </a:r>
+          </a:p>
+          <a:p>
+            <a:pPr algn="ctr"/>
+            <a:r>
+              <a:rPr lang="en-US" sz="1600" b="1" dirty="0">
+                <a:solidFill>
+                  <a:schemeClr val="tx1"/>
+                </a:solidFill>
+                <a:latin typeface="Arial" panose="020B0604020202020204" pitchFamily="34" charset="0"/>
+                <a:cs typeface="Arial" panose="020B0604020202020204" pitchFamily="34" charset="0"/>
+              </a:rPr>
+              <a:t>52.9%</a:t>
+            </a:r>
+            <a:r>
+              <a:rPr lang="en-US" sz="1600" dirty="0">
+                <a:solidFill>
+                  <a:schemeClr val="tx1"/>
+                </a:solidFill>
+                <a:latin typeface="Arial" panose="020B0604020202020204" pitchFamily="34" charset="0"/>
+                <a:cs typeface="Arial" panose="020B0604020202020204" pitchFamily="34" charset="0"/>
+              </a:rPr>
+              <a:t> correct classifications</a:t>
+            </a:r>
+          </a:p>
+        </p:txBody>
+      </p:sp>
+      <p:pic>
+        <p:nvPicPr>
+          <p:cNvPr id="13" name="Picture 12">
+            <a:extLst>
+              <a:ext uri="{FF2B5EF4-FFF2-40B4-BE49-F238E27FC236}">
+                <a16:creationId xmlns:a16="http://schemas.microsoft.com/office/drawing/2014/main" id="{427DB2B6-71E3-ADED-A37E-DFB486D1BCBF}"/>
+              </a:ext>
+            </a:extLst>
+          </p:cNvPr>
+          <p:cNvPicPr>
+            <a:picLocks noChangeAspect="1"/>
+          </p:cNvPicPr>
+          <p:nvPr/>
+        </p:nvPicPr>
+        <p:blipFill>
+          <a:blip r:embed="rId3"/>
+          <a:srcRect/>
+          <a:stretch/>
+        </p:blipFill>
+        <p:spPr>
+          <a:xfrm>
+            <a:off x="377054" y="6106182"/>
+            <a:ext cx="4123546" cy="2790369"/>
+          </a:xfrm>
+          <a:prstGeom prst="rect">
+            <a:avLst/>
+          </a:prstGeom>
+        </p:spPr>
+      </p:pic>
+      <p:pic>
+        <p:nvPicPr>
+          <p:cNvPr id="18" name="Picture 17">
+            <a:extLst>
+              <a:ext uri="{FF2B5EF4-FFF2-40B4-BE49-F238E27FC236}">
+                <a16:creationId xmlns:a16="http://schemas.microsoft.com/office/drawing/2014/main" id="{F1EEECF4-994B-C75E-EA18-EB89078D259B}"/>
+              </a:ext>
+            </a:extLst>
+          </p:cNvPr>
+          <p:cNvPicPr>
+            <a:picLocks noChangeAspect="1"/>
+          </p:cNvPicPr>
+          <p:nvPr/>
+        </p:nvPicPr>
+        <p:blipFill>
+          <a:blip r:embed="rId4"/>
+          <a:srcRect/>
+          <a:stretch/>
+        </p:blipFill>
+        <p:spPr>
+          <a:xfrm>
+            <a:off x="5440716" y="6106182"/>
+            <a:ext cx="6696888" cy="2790370"/>
+          </a:xfrm>
+          <a:prstGeom prst="rect">
+            <a:avLst/>
+          </a:prstGeom>
+        </p:spPr>
+      </p:pic>
+      <p:pic>
+        <p:nvPicPr>
+          <p:cNvPr id="6" name="Picture 5">
+            <a:extLst>
+              <a:ext uri="{FF2B5EF4-FFF2-40B4-BE49-F238E27FC236}">
+                <a16:creationId xmlns:a16="http://schemas.microsoft.com/office/drawing/2014/main" id="{48D846B6-0538-C1F4-6BAF-11DA2B3E73C1}"/>
+              </a:ext>
+            </a:extLst>
+          </p:cNvPr>
+          <p:cNvPicPr>
+            <a:picLocks noChangeAspect="1"/>
+          </p:cNvPicPr>
+          <p:nvPr/>
+        </p:nvPicPr>
+        <p:blipFill>
+          <a:blip r:embed="rId5"/>
+          <a:srcRect/>
+          <a:stretch/>
+        </p:blipFill>
+        <p:spPr>
+          <a:xfrm>
+            <a:off x="6024667" y="3206523"/>
+            <a:ext cx="6299200" cy="2743200"/>
+          </a:xfrm>
+          <a:prstGeom prst="rect">
+            <a:avLst/>
+          </a:prstGeom>
+        </p:spPr>
+      </p:pic>
+      <p:pic>
+        <p:nvPicPr>
+          <p:cNvPr id="3" name="Picture 2">
+            <a:extLst>
+              <a:ext uri="{FF2B5EF4-FFF2-40B4-BE49-F238E27FC236}">
+                <a16:creationId xmlns:a16="http://schemas.microsoft.com/office/drawing/2014/main" id="{FEE8720A-F8A5-38FF-412C-E461D2DF4B23}"/>
+              </a:ext>
+            </a:extLst>
+          </p:cNvPr>
+          <p:cNvPicPr>
+            <a:picLocks noChangeAspect="1"/>
+          </p:cNvPicPr>
+          <p:nvPr/>
+        </p:nvPicPr>
+        <p:blipFill>
+          <a:blip r:embed="rId6"/>
+          <a:srcRect/>
+          <a:stretch/>
+        </p:blipFill>
+        <p:spPr>
+          <a:xfrm>
+            <a:off x="145271" y="3210842"/>
+            <a:ext cx="6121400" cy="2743200"/>
+          </a:xfrm>
+          <a:prstGeom prst="rect">
+            <a:avLst/>
+          </a:prstGeom>
+        </p:spPr>
+      </p:pic>
+      <p:pic>
+        <p:nvPicPr>
+          <p:cNvPr id="104" name="Picture 103" descr="A chart with text and numbers&#10;&#10;Description automatically generated with medium confidence">
+            <a:extLst>
+              <a:ext uri="{FF2B5EF4-FFF2-40B4-BE49-F238E27FC236}">
+                <a16:creationId xmlns:a16="http://schemas.microsoft.com/office/drawing/2014/main" id="{EFCFFA97-C9C9-FBA7-BCA4-3B52E8861545}"/>
+              </a:ext>
+            </a:extLst>
+          </p:cNvPr>
+          <p:cNvPicPr>
+            <a:picLocks noChangeAspect="1"/>
+          </p:cNvPicPr>
+          <p:nvPr/>
+        </p:nvPicPr>
+        <p:blipFill rotWithShape="1">
+          <a:blip r:embed="rId7"/>
+          <a:srcRect t="38975" r="95435" b="45096"/>
+          <a:stretch/>
+        </p:blipFill>
+        <p:spPr>
+          <a:xfrm>
+            <a:off x="110061" y="3632023"/>
+            <a:ext cx="279400" cy="1165225"/>
+          </a:xfrm>
+          <a:prstGeom prst="rect">
+            <a:avLst/>
+          </a:prstGeom>
+        </p:spPr>
+      </p:pic>
+    </p:spTree>
+    <p:extLst>
+      <p:ext uri="{BB962C8B-B14F-4D97-AF65-F5344CB8AC3E}">
+        <p14:creationId xmlns:p14="http://schemas.microsoft.com/office/powerpoint/2010/main" val="181068942"/>
       </p:ext>
     </p:extLst>
   </p:cSld>

</xml_diff>

<commit_message>
Update analyses for figure 4-6 and supplementary figures of RF and PCA analyses for small and large lakes
</commit_message>
<xml_diff>
--- a/Figures/Figure4/Figure4_RandomForest.pptx
+++ b/Figures/Figure4/Figure4_RandomForest.pptx
@@ -5,12 +5,10 @@
     <p:sldMasterId id="2147483816" r:id="rId1"/>
   </p:sldMasterIdLst>
   <p:notesMasterIdLst>
-    <p:notesMasterId r:id="rId5"/>
+    <p:notesMasterId r:id="rId3"/>
   </p:notesMasterIdLst>
   <p:sldIdLst>
     <p:sldId id="261" r:id="rId2"/>
-    <p:sldId id="262" r:id="rId3"/>
-    <p:sldId id="263" r:id="rId4"/>
   </p:sldIdLst>
   <p:sldSz cx="12344400" cy="8961438"/>
   <p:notesSz cx="6858000" cy="9144000"/>
@@ -2272,7 +2270,7 @@
   <pc:docChgLst>
     <pc:chgData name="Jordan May Von Eggers" userId="2bcc5b33-6bd2-4559-ac12-5178b17ae4b3" providerId="ADAL" clId="{E058BD1E-1C18-0B4B-86A0-6DE1E2E4609B}"/>
     <pc:docChg chg="undo custSel addSld delSld modSld modMainMaster modNotesMaster">
-      <pc:chgData name="Jordan May Von Eggers" userId="2bcc5b33-6bd2-4559-ac12-5178b17ae4b3" providerId="ADAL" clId="{E058BD1E-1C18-0B4B-86A0-6DE1E2E4609B}" dt="2024-11-26T19:59:07.786" v="286" actId="20577"/>
+      <pc:chgData name="Jordan May Von Eggers" userId="2bcc5b33-6bd2-4559-ac12-5178b17ae4b3" providerId="ADAL" clId="{E058BD1E-1C18-0B4B-86A0-6DE1E2E4609B}" dt="2024-11-27T22:04:41.359" v="294" actId="2696"/>
       <pc:docMkLst>
         <pc:docMk/>
       </pc:docMkLst>
@@ -2578,8 +2576,8 @@
           </ac:cxnSpMkLst>
         </pc:cxnChg>
       </pc:sldChg>
-      <pc:sldChg chg="addSp modSp add mod modNotesTx">
-        <pc:chgData name="Jordan May Von Eggers" userId="2bcc5b33-6bd2-4559-ac12-5178b17ae4b3" providerId="ADAL" clId="{E058BD1E-1C18-0B4B-86A0-6DE1E2E4609B}" dt="2024-11-26T19:45:35.288" v="243" actId="20577"/>
+      <pc:sldChg chg="addSp modSp add del mod modNotesTx">
+        <pc:chgData name="Jordan May Von Eggers" userId="2bcc5b33-6bd2-4559-ac12-5178b17ae4b3" providerId="ADAL" clId="{E058BD1E-1C18-0B4B-86A0-6DE1E2E4609B}" dt="2024-11-27T22:04:41.359" v="294" actId="2696"/>
         <pc:sldMkLst>
           <pc:docMk/>
           <pc:sldMk cId="2375331731" sldId="262"/>
@@ -2681,8 +2679,8 @@
           </ac:picMkLst>
         </pc:picChg>
       </pc:sldChg>
-      <pc:sldChg chg="modSp add mod">
-        <pc:chgData name="Jordan May Von Eggers" userId="2bcc5b33-6bd2-4559-ac12-5178b17ae4b3" providerId="ADAL" clId="{E058BD1E-1C18-0B4B-86A0-6DE1E2E4609B}" dt="2024-11-26T19:59:07.786" v="286" actId="20577"/>
+      <pc:sldChg chg="modSp add del mod modNotesTx">
+        <pc:chgData name="Jordan May Von Eggers" userId="2bcc5b33-6bd2-4559-ac12-5178b17ae4b3" providerId="ADAL" clId="{E058BD1E-1C18-0B4B-86A0-6DE1E2E4609B}" dt="2024-11-27T22:04:41.359" v="294" actId="2696"/>
         <pc:sldMkLst>
           <pc:docMk/>
           <pc:sldMk cId="181068942" sldId="263"/>
@@ -3137,7 +3135,7 @@
           <a:p>
             <a:fld id="{4AB11435-BC9C-C649-B93C-0243AFB6DB2E}" type="datetimeFigureOut">
               <a:rPr lang="en-US" smtClean="0"/>
-              <a:t>11/26/24</a:t>
+              <a:t>11/27/24</a:t>
             </a:fld>
             <a:endParaRPr lang="en-US"/>
           </a:p>
@@ -3520,244 +3518,6 @@
 </p:notes>
 </file>
 
-<file path=ppt/notesSlides/notesSlide2.xml><?xml version="1.0" encoding="utf-8"?>
-<p:notes xmlns:a="http://schemas.openxmlformats.org/drawingml/2006/main" xmlns:r="http://schemas.openxmlformats.org/officeDocument/2006/relationships" xmlns:p="http://schemas.openxmlformats.org/presentationml/2006/main">
-  <p:cSld>
-    <p:spTree>
-      <p:nvGrpSpPr>
-        <p:cNvPr id="1" name="">
-          <a:extLst>
-            <a:ext uri="{FF2B5EF4-FFF2-40B4-BE49-F238E27FC236}">
-              <a16:creationId xmlns:a16="http://schemas.microsoft.com/office/drawing/2014/main" id="{2FB7656C-D855-60E9-1614-19A9D739A6D7}"/>
-            </a:ext>
-          </a:extLst>
-        </p:cNvPr>
-        <p:cNvGrpSpPr/>
-        <p:nvPr/>
-      </p:nvGrpSpPr>
-      <p:grpSpPr>
-        <a:xfrm>
-          <a:off x="0" y="0"/>
-          <a:ext cx="0" cy="0"/>
-          <a:chOff x="0" y="0"/>
-          <a:chExt cx="0" cy="0"/>
-        </a:xfrm>
-      </p:grpSpPr>
-      <p:sp>
-        <p:nvSpPr>
-          <p:cNvPr id="2" name="Slide Image Placeholder 1">
-            <a:extLst>
-              <a:ext uri="{FF2B5EF4-FFF2-40B4-BE49-F238E27FC236}">
-                <a16:creationId xmlns:a16="http://schemas.microsoft.com/office/drawing/2014/main" id="{2F3AB990-349F-F81B-8EBC-B866B20512B4}"/>
-              </a:ext>
-            </a:extLst>
-          </p:cNvPr>
-          <p:cNvSpPr>
-            <a:spLocks noGrp="1" noRot="1" noChangeAspect="1"/>
-          </p:cNvSpPr>
-          <p:nvPr>
-            <p:ph type="sldImg"/>
-          </p:nvPr>
-        </p:nvSpPr>
-        <p:spPr>
-          <a:xfrm>
-            <a:off x="1303338" y="1143000"/>
-            <a:ext cx="4251325" cy="3086100"/>
-          </a:xfrm>
-        </p:spPr>
-      </p:sp>
-      <p:sp>
-        <p:nvSpPr>
-          <p:cNvPr id="3" name="Notes Placeholder 2">
-            <a:extLst>
-              <a:ext uri="{FF2B5EF4-FFF2-40B4-BE49-F238E27FC236}">
-                <a16:creationId xmlns:a16="http://schemas.microsoft.com/office/drawing/2014/main" id="{7E9AC5E6-9033-A2B7-CEF7-67534E7F4E5F}"/>
-              </a:ext>
-            </a:extLst>
-          </p:cNvPr>
-          <p:cNvSpPr>
-            <a:spLocks noGrp="1"/>
-          </p:cNvSpPr>
-          <p:nvPr>
-            <p:ph type="body" idx="1"/>
-          </p:nvPr>
-        </p:nvSpPr>
-        <p:spPr/>
-        <p:txBody>
-          <a:bodyPr/>
-          <a:lstStyle/>
-          <a:p>
-            <a:r>
-              <a:rPr lang="en-US" dirty="0"/>
-              <a:t>small</a:t>
-            </a:r>
-          </a:p>
-          <a:p>
-            <a:endParaRPr lang="en-US" dirty="0"/>
-          </a:p>
-        </p:txBody>
-      </p:sp>
-      <p:sp>
-        <p:nvSpPr>
-          <p:cNvPr id="4" name="Slide Number Placeholder 3">
-            <a:extLst>
-              <a:ext uri="{FF2B5EF4-FFF2-40B4-BE49-F238E27FC236}">
-                <a16:creationId xmlns:a16="http://schemas.microsoft.com/office/drawing/2014/main" id="{474677D0-B5CC-F0BD-AB10-7ECAE6AC7441}"/>
-              </a:ext>
-            </a:extLst>
-          </p:cNvPr>
-          <p:cNvSpPr>
-            <a:spLocks noGrp="1"/>
-          </p:cNvSpPr>
-          <p:nvPr>
-            <p:ph type="sldNum" sz="quarter" idx="5"/>
-          </p:nvPr>
-        </p:nvSpPr>
-        <p:spPr/>
-        <p:txBody>
-          <a:bodyPr/>
-          <a:lstStyle/>
-          <a:p>
-            <a:fld id="{62CADFC7-EF9B-2D4D-A055-5851C500C558}" type="slidenum">
-              <a:rPr lang="en-US" smtClean="0"/>
-              <a:t>2</a:t>
-            </a:fld>
-            <a:endParaRPr lang="en-US"/>
-          </a:p>
-        </p:txBody>
-      </p:sp>
-    </p:spTree>
-    <p:extLst>
-      <p:ext uri="{BB962C8B-B14F-4D97-AF65-F5344CB8AC3E}">
-        <p14:creationId xmlns:p14="http://schemas.microsoft.com/office/powerpoint/2010/main" val="3083938150"/>
-      </p:ext>
-    </p:extLst>
-  </p:cSld>
-  <p:clrMapOvr>
-    <a:masterClrMapping/>
-  </p:clrMapOvr>
-</p:notes>
-</file>
-
-<file path=ppt/notesSlides/notesSlide3.xml><?xml version="1.0" encoding="utf-8"?>
-<p:notes xmlns:a="http://schemas.openxmlformats.org/drawingml/2006/main" xmlns:r="http://schemas.openxmlformats.org/officeDocument/2006/relationships" xmlns:p="http://schemas.openxmlformats.org/presentationml/2006/main">
-  <p:cSld>
-    <p:spTree>
-      <p:nvGrpSpPr>
-        <p:cNvPr id="1" name="">
-          <a:extLst>
-            <a:ext uri="{FF2B5EF4-FFF2-40B4-BE49-F238E27FC236}">
-              <a16:creationId xmlns:a16="http://schemas.microsoft.com/office/drawing/2014/main" id="{0EFF0DC2-26A7-03D3-D752-7B3610DDB633}"/>
-            </a:ext>
-          </a:extLst>
-        </p:cNvPr>
-        <p:cNvGrpSpPr/>
-        <p:nvPr/>
-      </p:nvGrpSpPr>
-      <p:grpSpPr>
-        <a:xfrm>
-          <a:off x="0" y="0"/>
-          <a:ext cx="0" cy="0"/>
-          <a:chOff x="0" y="0"/>
-          <a:chExt cx="0" cy="0"/>
-        </a:xfrm>
-      </p:grpSpPr>
-      <p:sp>
-        <p:nvSpPr>
-          <p:cNvPr id="2" name="Slide Image Placeholder 1">
-            <a:extLst>
-              <a:ext uri="{FF2B5EF4-FFF2-40B4-BE49-F238E27FC236}">
-                <a16:creationId xmlns:a16="http://schemas.microsoft.com/office/drawing/2014/main" id="{39EED0AB-3E6F-D503-978B-50C948C97C32}"/>
-              </a:ext>
-            </a:extLst>
-          </p:cNvPr>
-          <p:cNvSpPr>
-            <a:spLocks noGrp="1" noRot="1" noChangeAspect="1"/>
-          </p:cNvSpPr>
-          <p:nvPr>
-            <p:ph type="sldImg"/>
-          </p:nvPr>
-        </p:nvSpPr>
-        <p:spPr>
-          <a:xfrm>
-            <a:off x="1303338" y="1143000"/>
-            <a:ext cx="4251325" cy="3086100"/>
-          </a:xfrm>
-        </p:spPr>
-      </p:sp>
-      <p:sp>
-        <p:nvSpPr>
-          <p:cNvPr id="3" name="Notes Placeholder 2">
-            <a:extLst>
-              <a:ext uri="{FF2B5EF4-FFF2-40B4-BE49-F238E27FC236}">
-                <a16:creationId xmlns:a16="http://schemas.microsoft.com/office/drawing/2014/main" id="{249F6BC1-7947-FF7D-80BF-A0EF0EF7026A}"/>
-              </a:ext>
-            </a:extLst>
-          </p:cNvPr>
-          <p:cNvSpPr>
-            <a:spLocks noGrp="1"/>
-          </p:cNvSpPr>
-          <p:nvPr>
-            <p:ph type="body" idx="1"/>
-          </p:nvPr>
-        </p:nvSpPr>
-        <p:spPr/>
-        <p:txBody>
-          <a:bodyPr/>
-          <a:lstStyle/>
-          <a:p>
-            <a:r>
-              <a:rPr lang="en-US" dirty="0"/>
-              <a:t>small</a:t>
-            </a:r>
-          </a:p>
-          <a:p>
-            <a:endParaRPr lang="en-US" dirty="0"/>
-          </a:p>
-        </p:txBody>
-      </p:sp>
-      <p:sp>
-        <p:nvSpPr>
-          <p:cNvPr id="4" name="Slide Number Placeholder 3">
-            <a:extLst>
-              <a:ext uri="{FF2B5EF4-FFF2-40B4-BE49-F238E27FC236}">
-                <a16:creationId xmlns:a16="http://schemas.microsoft.com/office/drawing/2014/main" id="{CB52D1EC-7F15-7F60-011A-DDD43E7047F3}"/>
-              </a:ext>
-            </a:extLst>
-          </p:cNvPr>
-          <p:cNvSpPr>
-            <a:spLocks noGrp="1"/>
-          </p:cNvSpPr>
-          <p:nvPr>
-            <p:ph type="sldNum" sz="quarter" idx="5"/>
-          </p:nvPr>
-        </p:nvSpPr>
-        <p:spPr/>
-        <p:txBody>
-          <a:bodyPr/>
-          <a:lstStyle/>
-          <a:p>
-            <a:fld id="{62CADFC7-EF9B-2D4D-A055-5851C500C558}" type="slidenum">
-              <a:rPr lang="en-US" smtClean="0"/>
-              <a:t>3</a:t>
-            </a:fld>
-            <a:endParaRPr lang="en-US"/>
-          </a:p>
-        </p:txBody>
-      </p:sp>
-    </p:spTree>
-    <p:extLst>
-      <p:ext uri="{BB962C8B-B14F-4D97-AF65-F5344CB8AC3E}">
-        <p14:creationId xmlns:p14="http://schemas.microsoft.com/office/powerpoint/2010/main" val="1755149698"/>
-      </p:ext>
-    </p:extLst>
-  </p:cSld>
-  <p:clrMapOvr>
-    <a:masterClrMapping/>
-  </p:clrMapOvr>
-</p:notes>
-</file>
-
 <file path=ppt/slideLayouts/slideLayout1.xml><?xml version="1.0" encoding="utf-8"?>
 <p:sldLayout xmlns:a="http://schemas.openxmlformats.org/drawingml/2006/main" xmlns:r="http://schemas.openxmlformats.org/officeDocument/2006/relationships" xmlns:p="http://schemas.openxmlformats.org/presentationml/2006/main" type="title" preserve="1">
   <p:cSld name="Title Slide">
@@ -3889,7 +3649,7 @@
           <a:p>
             <a:fld id="{C128D3E9-2565-C645-BAD9-D02505D431F5}" type="datetimeFigureOut">
               <a:rPr lang="en-US" smtClean="0"/>
-              <a:t>11/26/24</a:t>
+              <a:t>11/27/24</a:t>
             </a:fld>
             <a:endParaRPr lang="en-US"/>
           </a:p>
@@ -4059,7 +3819,7 @@
           <a:p>
             <a:fld id="{C128D3E9-2565-C645-BAD9-D02505D431F5}" type="datetimeFigureOut">
               <a:rPr lang="en-US" smtClean="0"/>
-              <a:t>11/26/24</a:t>
+              <a:t>11/27/24</a:t>
             </a:fld>
             <a:endParaRPr lang="en-US"/>
           </a:p>
@@ -4239,7 +3999,7 @@
           <a:p>
             <a:fld id="{C128D3E9-2565-C645-BAD9-D02505D431F5}" type="datetimeFigureOut">
               <a:rPr lang="en-US" smtClean="0"/>
-              <a:t>11/26/24</a:t>
+              <a:t>11/27/24</a:t>
             </a:fld>
             <a:endParaRPr lang="en-US"/>
           </a:p>
@@ -4409,7 +4169,7 @@
           <a:p>
             <a:fld id="{C128D3E9-2565-C645-BAD9-D02505D431F5}" type="datetimeFigureOut">
               <a:rPr lang="en-US" smtClean="0"/>
-              <a:t>11/26/24</a:t>
+              <a:t>11/27/24</a:t>
             </a:fld>
             <a:endParaRPr lang="en-US"/>
           </a:p>
@@ -4655,7 +4415,7 @@
           <a:p>
             <a:fld id="{C128D3E9-2565-C645-BAD9-D02505D431F5}" type="datetimeFigureOut">
               <a:rPr lang="en-US" smtClean="0"/>
-              <a:t>11/26/24</a:t>
+              <a:t>11/27/24</a:t>
             </a:fld>
             <a:endParaRPr lang="en-US"/>
           </a:p>
@@ -4887,7 +4647,7 @@
           <a:p>
             <a:fld id="{C128D3E9-2565-C645-BAD9-D02505D431F5}" type="datetimeFigureOut">
               <a:rPr lang="en-US" smtClean="0"/>
-              <a:t>11/26/24</a:t>
+              <a:t>11/27/24</a:t>
             </a:fld>
             <a:endParaRPr lang="en-US"/>
           </a:p>
@@ -5254,7 +5014,7 @@
           <a:p>
             <a:fld id="{C128D3E9-2565-C645-BAD9-D02505D431F5}" type="datetimeFigureOut">
               <a:rPr lang="en-US" smtClean="0"/>
-              <a:t>11/26/24</a:t>
+              <a:t>11/27/24</a:t>
             </a:fld>
             <a:endParaRPr lang="en-US"/>
           </a:p>
@@ -5372,7 +5132,7 @@
           <a:p>
             <a:fld id="{C128D3E9-2565-C645-BAD9-D02505D431F5}" type="datetimeFigureOut">
               <a:rPr lang="en-US" smtClean="0"/>
-              <a:t>11/26/24</a:t>
+              <a:t>11/27/24</a:t>
             </a:fld>
             <a:endParaRPr lang="en-US"/>
           </a:p>
@@ -5467,7 +5227,7 @@
           <a:p>
             <a:fld id="{C128D3E9-2565-C645-BAD9-D02505D431F5}" type="datetimeFigureOut">
               <a:rPr lang="en-US" smtClean="0"/>
-              <a:t>11/26/24</a:t>
+              <a:t>11/27/24</a:t>
             </a:fld>
             <a:endParaRPr lang="en-US"/>
           </a:p>
@@ -5744,7 +5504,7 @@
           <a:p>
             <a:fld id="{C128D3E9-2565-C645-BAD9-D02505D431F5}" type="datetimeFigureOut">
               <a:rPr lang="en-US" smtClean="0"/>
-              <a:t>11/26/24</a:t>
+              <a:t>11/27/24</a:t>
             </a:fld>
             <a:endParaRPr lang="en-US"/>
           </a:p>
@@ -6001,7 +5761,7 @@
           <a:p>
             <a:fld id="{C128D3E9-2565-C645-BAD9-D02505D431F5}" type="datetimeFigureOut">
               <a:rPr lang="en-US" smtClean="0"/>
-              <a:t>11/26/24</a:t>
+              <a:t>11/27/24</a:t>
             </a:fld>
             <a:endParaRPr lang="en-US"/>
           </a:p>
@@ -6214,7 +5974,7 @@
           <a:p>
             <a:fld id="{C128D3E9-2565-C645-BAD9-D02505D431F5}" type="datetimeFigureOut">
               <a:rPr lang="en-US" smtClean="0"/>
-              <a:t>11/26/24</a:t>
+              <a:t>11/27/24</a:t>
             </a:fld>
             <a:endParaRPr lang="en-US"/>
           </a:p>
@@ -7713,2236 +7473,6 @@
     <p:extLst>
       <p:ext uri="{BB962C8B-B14F-4D97-AF65-F5344CB8AC3E}">
         <p14:creationId xmlns:p14="http://schemas.microsoft.com/office/powerpoint/2010/main" val="2068078990"/>
-      </p:ext>
-    </p:extLst>
-  </p:cSld>
-  <p:clrMapOvr>
-    <a:masterClrMapping/>
-  </p:clrMapOvr>
-</p:sld>
-</file>
-
-<file path=ppt/slides/slide2.xml><?xml version="1.0" encoding="utf-8"?>
-<p:sld xmlns:a="http://schemas.openxmlformats.org/drawingml/2006/main" xmlns:r="http://schemas.openxmlformats.org/officeDocument/2006/relationships" xmlns:p="http://schemas.openxmlformats.org/presentationml/2006/main">
-  <p:cSld>
-    <p:spTree>
-      <p:nvGrpSpPr>
-        <p:cNvPr id="1" name="">
-          <a:extLst>
-            <a:ext uri="{FF2B5EF4-FFF2-40B4-BE49-F238E27FC236}">
-              <a16:creationId xmlns:a16="http://schemas.microsoft.com/office/drawing/2014/main" id="{E9612617-84EE-EB9A-61D3-862309813D04}"/>
-            </a:ext>
-          </a:extLst>
-        </p:cNvPr>
-        <p:cNvGrpSpPr/>
-        <p:nvPr/>
-      </p:nvGrpSpPr>
-      <p:grpSpPr>
-        <a:xfrm>
-          <a:off x="0" y="0"/>
-          <a:ext cx="0" cy="0"/>
-          <a:chOff x="0" y="0"/>
-          <a:chExt cx="0" cy="0"/>
-        </a:xfrm>
-      </p:grpSpPr>
-      <p:sp>
-        <p:nvSpPr>
-          <p:cNvPr id="7" name="Rounded Rectangle 6">
-            <a:extLst>
-              <a:ext uri="{FF2B5EF4-FFF2-40B4-BE49-F238E27FC236}">
-                <a16:creationId xmlns:a16="http://schemas.microsoft.com/office/drawing/2014/main" id="{0D20DA7B-A846-AB8B-08E7-E7AF9D66E197}"/>
-              </a:ext>
-            </a:extLst>
-          </p:cNvPr>
-          <p:cNvSpPr/>
-          <p:nvPr/>
-        </p:nvSpPr>
-        <p:spPr>
-          <a:xfrm>
-            <a:off x="1690436" y="175519"/>
-            <a:ext cx="2117558" cy="673768"/>
-          </a:xfrm>
-          <a:prstGeom prst="roundRect">
-            <a:avLst/>
-          </a:prstGeom>
-          <a:solidFill>
-            <a:srgbClr val="000000"/>
-          </a:solidFill>
-          <a:ln w="28575">
-            <a:solidFill>
-              <a:schemeClr val="tx1"/>
-            </a:solidFill>
-          </a:ln>
-        </p:spPr>
-        <p:style>
-          <a:lnRef idx="2">
-            <a:schemeClr val="accent1">
-              <a:shade val="15000"/>
-            </a:schemeClr>
-          </a:lnRef>
-          <a:fillRef idx="1">
-            <a:schemeClr val="accent1"/>
-          </a:fillRef>
-          <a:effectRef idx="0">
-            <a:schemeClr val="accent1"/>
-          </a:effectRef>
-          <a:fontRef idx="minor">
-            <a:schemeClr val="lt1"/>
-          </a:fontRef>
-        </p:style>
-        <p:txBody>
-          <a:bodyPr rtlCol="0" anchor="ctr"/>
-          <a:lstStyle/>
-          <a:p>
-            <a:pPr algn="ctr"/>
-            <a:r>
-              <a:rPr lang="en-US" b="1" dirty="0">
-                <a:solidFill>
-                  <a:schemeClr val="bg1"/>
-                </a:solidFill>
-                <a:latin typeface="Arial" panose="020B0604020202020204" pitchFamily="34" charset="0"/>
-                <a:cs typeface="Arial" panose="020B0604020202020204" pitchFamily="34" charset="0"/>
-              </a:rPr>
-              <a:t>All lakes</a:t>
-            </a:r>
-          </a:p>
-          <a:p>
-            <a:pPr algn="ctr"/>
-            <a:r>
-              <a:rPr lang="en-US" dirty="0">
-                <a:solidFill>
-                  <a:schemeClr val="bg1"/>
-                </a:solidFill>
-                <a:latin typeface="Arial" panose="020B0604020202020204" pitchFamily="34" charset="0"/>
-                <a:cs typeface="Arial" panose="020B0604020202020204" pitchFamily="34" charset="0"/>
-              </a:rPr>
-              <a:t>n = 43,174</a:t>
-            </a:r>
-          </a:p>
-        </p:txBody>
-      </p:sp>
-      <p:sp>
-        <p:nvSpPr>
-          <p:cNvPr id="9" name="Rounded Rectangle 8">
-            <a:extLst>
-              <a:ext uri="{FF2B5EF4-FFF2-40B4-BE49-F238E27FC236}">
-                <a16:creationId xmlns:a16="http://schemas.microsoft.com/office/drawing/2014/main" id="{204A079C-A8E4-8AC8-15BB-794D595400BF}"/>
-              </a:ext>
-            </a:extLst>
-          </p:cNvPr>
-          <p:cNvSpPr/>
-          <p:nvPr/>
-        </p:nvSpPr>
-        <p:spPr>
-          <a:xfrm>
-            <a:off x="3161177" y="1567171"/>
-            <a:ext cx="1760623" cy="1472184"/>
-          </a:xfrm>
-          <a:prstGeom prst="roundRect">
-            <a:avLst/>
-          </a:prstGeom>
-          <a:solidFill>
-            <a:srgbClr val="93C47D"/>
-          </a:solidFill>
-          <a:ln w="28575">
-            <a:solidFill>
-              <a:schemeClr val="tx1"/>
-            </a:solidFill>
-          </a:ln>
-        </p:spPr>
-        <p:style>
-          <a:lnRef idx="2">
-            <a:schemeClr val="accent1">
-              <a:shade val="15000"/>
-            </a:schemeClr>
-          </a:lnRef>
-          <a:fillRef idx="1">
-            <a:schemeClr val="accent1"/>
-          </a:fillRef>
-          <a:effectRef idx="0">
-            <a:schemeClr val="accent1"/>
-          </a:effectRef>
-          <a:fontRef idx="minor">
-            <a:schemeClr val="lt1"/>
-          </a:fontRef>
-        </p:style>
-        <p:txBody>
-          <a:bodyPr rtlCol="0" anchor="ctr"/>
-          <a:lstStyle/>
-          <a:p>
-            <a:pPr algn="ctr"/>
-            <a:r>
-              <a:rPr lang="en-US" b="1" dirty="0">
-                <a:solidFill>
-                  <a:schemeClr val="tx1"/>
-                </a:solidFill>
-                <a:latin typeface="Arial" panose="020B0604020202020204" pitchFamily="34" charset="0"/>
-                <a:cs typeface="Arial" panose="020B0604020202020204" pitchFamily="34" charset="0"/>
-              </a:rPr>
-              <a:t>Green lakes </a:t>
-            </a:r>
-          </a:p>
-          <a:p>
-            <a:pPr algn="ctr"/>
-            <a:r>
-              <a:rPr lang="en-US" sz="1600" dirty="0">
-                <a:solidFill>
-                  <a:schemeClr val="tx1"/>
-                </a:solidFill>
-                <a:latin typeface="Arial" panose="020B0604020202020204" pitchFamily="34" charset="0"/>
-                <a:cs typeface="Arial" panose="020B0604020202020204" pitchFamily="34" charset="0"/>
-              </a:rPr>
-              <a:t>DWL &gt; 530</a:t>
-            </a:r>
-          </a:p>
-          <a:p>
-            <a:pPr algn="ctr"/>
-            <a:r>
-              <a:rPr lang="en-US" sz="1600" b="1" dirty="0">
-                <a:solidFill>
-                  <a:schemeClr val="tx1"/>
-                </a:solidFill>
-                <a:latin typeface="Arial" panose="020B0604020202020204" pitchFamily="34" charset="0"/>
-                <a:cs typeface="Arial" panose="020B0604020202020204" pitchFamily="34" charset="0"/>
-              </a:rPr>
-              <a:t>88.4% </a:t>
-            </a:r>
-            <a:r>
-              <a:rPr lang="en-US" sz="1600" dirty="0">
-                <a:solidFill>
-                  <a:schemeClr val="tx1"/>
-                </a:solidFill>
-                <a:latin typeface="Arial" panose="020B0604020202020204" pitchFamily="34" charset="0"/>
-                <a:cs typeface="Arial" panose="020B0604020202020204" pitchFamily="34" charset="0"/>
-              </a:rPr>
-              <a:t>correct classifications</a:t>
-            </a:r>
-          </a:p>
-        </p:txBody>
-      </p:sp>
-      <p:sp>
-        <p:nvSpPr>
-          <p:cNvPr id="11" name="Rounded Rectangle 10">
-            <a:extLst>
-              <a:ext uri="{FF2B5EF4-FFF2-40B4-BE49-F238E27FC236}">
-                <a16:creationId xmlns:a16="http://schemas.microsoft.com/office/drawing/2014/main" id="{C336CA75-6C0E-8054-81A9-7960F6FA2194}"/>
-              </a:ext>
-            </a:extLst>
-          </p:cNvPr>
-          <p:cNvSpPr/>
-          <p:nvPr/>
-        </p:nvSpPr>
-        <p:spPr>
-          <a:xfrm>
-            <a:off x="670034" y="1567173"/>
-            <a:ext cx="1764792" cy="1472184"/>
-          </a:xfrm>
-          <a:prstGeom prst="roundRect">
-            <a:avLst/>
-          </a:prstGeom>
-          <a:solidFill>
-            <a:srgbClr val="75AEDB">
-              <a:alpha val="78824"/>
-            </a:srgbClr>
-          </a:solidFill>
-          <a:ln w="28575">
-            <a:solidFill>
-              <a:schemeClr val="tx1"/>
-            </a:solidFill>
-          </a:ln>
-        </p:spPr>
-        <p:style>
-          <a:lnRef idx="2">
-            <a:schemeClr val="accent1">
-              <a:shade val="15000"/>
-            </a:schemeClr>
-          </a:lnRef>
-          <a:fillRef idx="1">
-            <a:schemeClr val="accent1"/>
-          </a:fillRef>
-          <a:effectRef idx="0">
-            <a:schemeClr val="accent1"/>
-          </a:effectRef>
-          <a:fontRef idx="minor">
-            <a:schemeClr val="lt1"/>
-          </a:fontRef>
-        </p:style>
-        <p:txBody>
-          <a:bodyPr rtlCol="0" anchor="ctr"/>
-          <a:lstStyle/>
-          <a:p>
-            <a:pPr algn="ctr"/>
-            <a:r>
-              <a:rPr lang="en-US" b="1" dirty="0">
-                <a:solidFill>
-                  <a:schemeClr val="tx1"/>
-                </a:solidFill>
-                <a:latin typeface="Arial" panose="020B0604020202020204" pitchFamily="34" charset="0"/>
-                <a:cs typeface="Arial" panose="020B0604020202020204" pitchFamily="34" charset="0"/>
-              </a:rPr>
-              <a:t>Blue lakes </a:t>
-            </a:r>
-          </a:p>
-          <a:p>
-            <a:pPr algn="ctr"/>
-            <a:r>
-              <a:rPr lang="en-US" sz="1600" dirty="0">
-                <a:solidFill>
-                  <a:schemeClr val="tx1"/>
-                </a:solidFill>
-                <a:latin typeface="Arial" panose="020B0604020202020204" pitchFamily="34" charset="0"/>
-                <a:cs typeface="Arial" panose="020B0604020202020204" pitchFamily="34" charset="0"/>
-              </a:rPr>
-              <a:t>DWL &lt; 530</a:t>
-            </a:r>
-          </a:p>
-          <a:p>
-            <a:pPr algn="ctr"/>
-            <a:r>
-              <a:rPr lang="en-US" sz="1600" b="1" dirty="0">
-                <a:solidFill>
-                  <a:schemeClr val="tx1"/>
-                </a:solidFill>
-                <a:latin typeface="Arial" panose="020B0604020202020204" pitchFamily="34" charset="0"/>
-                <a:cs typeface="Arial" panose="020B0604020202020204" pitchFamily="34" charset="0"/>
-              </a:rPr>
-              <a:t>74.8%</a:t>
-            </a:r>
-            <a:r>
-              <a:rPr lang="en-US" sz="1600" dirty="0">
-                <a:solidFill>
-                  <a:schemeClr val="tx1"/>
-                </a:solidFill>
-                <a:latin typeface="Arial" panose="020B0604020202020204" pitchFamily="34" charset="0"/>
-                <a:cs typeface="Arial" panose="020B0604020202020204" pitchFamily="34" charset="0"/>
-              </a:rPr>
-              <a:t> correct classifications</a:t>
-            </a:r>
-          </a:p>
-        </p:txBody>
-      </p:sp>
-      <p:cxnSp>
-        <p:nvCxnSpPr>
-          <p:cNvPr id="14" name="Straight Arrow Connector 13">
-            <a:extLst>
-              <a:ext uri="{FF2B5EF4-FFF2-40B4-BE49-F238E27FC236}">
-                <a16:creationId xmlns:a16="http://schemas.microsoft.com/office/drawing/2014/main" id="{F3711D15-35E7-3F20-2045-CA94B53C4922}"/>
-              </a:ext>
-            </a:extLst>
-          </p:cNvPr>
-          <p:cNvCxnSpPr>
-            <a:cxnSpLocks/>
-          </p:cNvCxnSpPr>
-          <p:nvPr/>
-        </p:nvCxnSpPr>
-        <p:spPr>
-          <a:xfrm flipH="1">
-            <a:off x="1784700" y="953561"/>
-            <a:ext cx="425115" cy="512064"/>
-          </a:xfrm>
-          <a:prstGeom prst="straightConnector1">
-            <a:avLst/>
-          </a:prstGeom>
-          <a:ln w="76200">
-            <a:solidFill>
-              <a:schemeClr val="tx1"/>
-            </a:solidFill>
-            <a:tailEnd type="triangle"/>
-          </a:ln>
-        </p:spPr>
-        <p:style>
-          <a:lnRef idx="2">
-            <a:schemeClr val="accent1"/>
-          </a:lnRef>
-          <a:fillRef idx="0">
-            <a:schemeClr val="accent1"/>
-          </a:fillRef>
-          <a:effectRef idx="1">
-            <a:schemeClr val="accent1"/>
-          </a:effectRef>
-          <a:fontRef idx="minor">
-            <a:schemeClr val="tx1"/>
-          </a:fontRef>
-        </p:style>
-      </p:cxnSp>
-      <p:cxnSp>
-        <p:nvCxnSpPr>
-          <p:cNvPr id="16" name="Straight Arrow Connector 15">
-            <a:extLst>
-              <a:ext uri="{FF2B5EF4-FFF2-40B4-BE49-F238E27FC236}">
-                <a16:creationId xmlns:a16="http://schemas.microsoft.com/office/drawing/2014/main" id="{0A343D77-906C-6051-4B2C-66B02199F114}"/>
-              </a:ext>
-            </a:extLst>
-          </p:cNvPr>
-          <p:cNvCxnSpPr>
-            <a:cxnSpLocks/>
-          </p:cNvCxnSpPr>
-          <p:nvPr/>
-        </p:nvCxnSpPr>
-        <p:spPr>
-          <a:xfrm>
-            <a:off x="3298658" y="955329"/>
-            <a:ext cx="420624" cy="512064"/>
-          </a:xfrm>
-          <a:prstGeom prst="straightConnector1">
-            <a:avLst/>
-          </a:prstGeom>
-          <a:ln w="76200">
-            <a:solidFill>
-              <a:schemeClr val="tx1"/>
-            </a:solidFill>
-            <a:tailEnd type="triangle"/>
-          </a:ln>
-        </p:spPr>
-        <p:style>
-          <a:lnRef idx="2">
-            <a:schemeClr val="accent1"/>
-          </a:lnRef>
-          <a:fillRef idx="0">
-            <a:schemeClr val="accent1"/>
-          </a:fillRef>
-          <a:effectRef idx="1">
-            <a:schemeClr val="accent1"/>
-          </a:effectRef>
-          <a:fontRef idx="minor">
-            <a:schemeClr val="tx1"/>
-          </a:fontRef>
-        </p:style>
-      </p:cxnSp>
-      <p:sp>
-        <p:nvSpPr>
-          <p:cNvPr id="27" name="Rounded Rectangle 26">
-            <a:extLst>
-              <a:ext uri="{FF2B5EF4-FFF2-40B4-BE49-F238E27FC236}">
-                <a16:creationId xmlns:a16="http://schemas.microsoft.com/office/drawing/2014/main" id="{6BE0CB4D-DC73-6D43-0BFD-B039E4B4E095}"/>
-              </a:ext>
-            </a:extLst>
-          </p:cNvPr>
-          <p:cNvSpPr/>
-          <p:nvPr/>
-        </p:nvSpPr>
-        <p:spPr>
-          <a:xfrm>
-            <a:off x="7896727" y="175519"/>
-            <a:ext cx="2117558" cy="673768"/>
-          </a:xfrm>
-          <a:prstGeom prst="roundRect">
-            <a:avLst/>
-          </a:prstGeom>
-          <a:solidFill>
-            <a:srgbClr val="000000"/>
-          </a:solidFill>
-          <a:ln w="28575">
-            <a:solidFill>
-              <a:schemeClr val="tx1"/>
-            </a:solidFill>
-          </a:ln>
-        </p:spPr>
-        <p:style>
-          <a:lnRef idx="2">
-            <a:schemeClr val="accent1">
-              <a:shade val="15000"/>
-            </a:schemeClr>
-          </a:lnRef>
-          <a:fillRef idx="1">
-            <a:schemeClr val="accent1"/>
-          </a:fillRef>
-          <a:effectRef idx="0">
-            <a:schemeClr val="accent1"/>
-          </a:effectRef>
-          <a:fontRef idx="minor">
-            <a:schemeClr val="lt1"/>
-          </a:fontRef>
-        </p:style>
-        <p:txBody>
-          <a:bodyPr rtlCol="0" anchor="ctr"/>
-          <a:lstStyle/>
-          <a:p>
-            <a:pPr algn="ctr"/>
-            <a:r>
-              <a:rPr lang="en-US" b="1" dirty="0">
-                <a:solidFill>
-                  <a:schemeClr val="bg1"/>
-                </a:solidFill>
-                <a:latin typeface="Arial" panose="020B0604020202020204" pitchFamily="34" charset="0"/>
-                <a:cs typeface="Arial" panose="020B0604020202020204" pitchFamily="34" charset="0"/>
-              </a:rPr>
-              <a:t>Subset of lakes</a:t>
-            </a:r>
-          </a:p>
-          <a:p>
-            <a:pPr algn="ctr"/>
-            <a:r>
-              <a:rPr lang="en-US" dirty="0">
-                <a:solidFill>
-                  <a:schemeClr val="bg1"/>
-                </a:solidFill>
-                <a:latin typeface="Arial" panose="020B0604020202020204" pitchFamily="34" charset="0"/>
-                <a:cs typeface="Arial" panose="020B0604020202020204" pitchFamily="34" charset="0"/>
-              </a:rPr>
-              <a:t>n = 1,809</a:t>
-            </a:r>
-          </a:p>
-        </p:txBody>
-      </p:sp>
-      <p:cxnSp>
-        <p:nvCxnSpPr>
-          <p:cNvPr id="30" name="Straight Arrow Connector 29">
-            <a:extLst>
-              <a:ext uri="{FF2B5EF4-FFF2-40B4-BE49-F238E27FC236}">
-                <a16:creationId xmlns:a16="http://schemas.microsoft.com/office/drawing/2014/main" id="{CABFB964-52EB-4FF9-9435-447F037BD87E}"/>
-              </a:ext>
-            </a:extLst>
-          </p:cNvPr>
-          <p:cNvCxnSpPr>
-            <a:cxnSpLocks/>
-          </p:cNvCxnSpPr>
-          <p:nvPr/>
-        </p:nvCxnSpPr>
-        <p:spPr>
-          <a:xfrm flipH="1">
-            <a:off x="7602811" y="949551"/>
-            <a:ext cx="425115" cy="509338"/>
-          </a:xfrm>
-          <a:prstGeom prst="straightConnector1">
-            <a:avLst/>
-          </a:prstGeom>
-          <a:ln w="76200">
-            <a:solidFill>
-              <a:schemeClr val="tx1"/>
-            </a:solidFill>
-            <a:tailEnd type="triangle"/>
-          </a:ln>
-        </p:spPr>
-        <p:style>
-          <a:lnRef idx="2">
-            <a:schemeClr val="accent1"/>
-          </a:lnRef>
-          <a:fillRef idx="0">
-            <a:schemeClr val="accent1"/>
-          </a:fillRef>
-          <a:effectRef idx="1">
-            <a:schemeClr val="accent1"/>
-          </a:effectRef>
-          <a:fontRef idx="minor">
-            <a:schemeClr val="tx1"/>
-          </a:fontRef>
-        </p:style>
-      </p:cxnSp>
-      <p:cxnSp>
-        <p:nvCxnSpPr>
-          <p:cNvPr id="31" name="Straight Arrow Connector 30">
-            <a:extLst>
-              <a:ext uri="{FF2B5EF4-FFF2-40B4-BE49-F238E27FC236}">
-                <a16:creationId xmlns:a16="http://schemas.microsoft.com/office/drawing/2014/main" id="{D0273B7E-2A9F-8EC6-DF82-50579FFEA477}"/>
-              </a:ext>
-            </a:extLst>
-          </p:cNvPr>
-          <p:cNvCxnSpPr>
-            <a:cxnSpLocks/>
-          </p:cNvCxnSpPr>
-          <p:nvPr/>
-        </p:nvCxnSpPr>
-        <p:spPr>
-          <a:xfrm>
-            <a:off x="9896369" y="949551"/>
-            <a:ext cx="420624" cy="512064"/>
-          </a:xfrm>
-          <a:prstGeom prst="straightConnector1">
-            <a:avLst/>
-          </a:prstGeom>
-          <a:ln w="76200">
-            <a:solidFill>
-              <a:schemeClr val="tx1"/>
-            </a:solidFill>
-            <a:tailEnd type="triangle"/>
-          </a:ln>
-        </p:spPr>
-        <p:style>
-          <a:lnRef idx="2">
-            <a:schemeClr val="accent1"/>
-          </a:lnRef>
-          <a:fillRef idx="0">
-            <a:schemeClr val="accent1"/>
-          </a:fillRef>
-          <a:effectRef idx="1">
-            <a:schemeClr val="accent1"/>
-          </a:effectRef>
-          <a:fontRef idx="minor">
-            <a:schemeClr val="tx1"/>
-          </a:fontRef>
-        </p:style>
-      </p:cxnSp>
-      <p:sp>
-        <p:nvSpPr>
-          <p:cNvPr id="33" name="Rounded Rectangle 32">
-            <a:extLst>
-              <a:ext uri="{FF2B5EF4-FFF2-40B4-BE49-F238E27FC236}">
-                <a16:creationId xmlns:a16="http://schemas.microsoft.com/office/drawing/2014/main" id="{19EA5EC0-A14A-4B0E-34A3-9EEE5C3B0800}"/>
-              </a:ext>
-            </a:extLst>
-          </p:cNvPr>
-          <p:cNvSpPr/>
-          <p:nvPr/>
-        </p:nvSpPr>
-        <p:spPr>
-          <a:xfrm>
-            <a:off x="5925285" y="1567186"/>
-            <a:ext cx="1938528" cy="1471861"/>
-          </a:xfrm>
-          <a:prstGeom prst="roundRect">
-            <a:avLst/>
-          </a:prstGeom>
-          <a:solidFill>
-            <a:srgbClr val="75AEDB">
-              <a:alpha val="78824"/>
-            </a:srgbClr>
-          </a:solidFill>
-          <a:ln w="28575">
-            <a:solidFill>
-              <a:schemeClr val="tx1"/>
-            </a:solidFill>
-          </a:ln>
-        </p:spPr>
-        <p:style>
-          <a:lnRef idx="2">
-            <a:schemeClr val="accent1">
-              <a:shade val="15000"/>
-            </a:schemeClr>
-          </a:lnRef>
-          <a:fillRef idx="1">
-            <a:schemeClr val="accent1"/>
-          </a:fillRef>
-          <a:effectRef idx="0">
-            <a:schemeClr val="accent1"/>
-          </a:effectRef>
-          <a:fontRef idx="minor">
-            <a:schemeClr val="lt1"/>
-          </a:fontRef>
-        </p:style>
-        <p:txBody>
-          <a:bodyPr rtlCol="0" anchor="ctr"/>
-          <a:lstStyle/>
-          <a:p>
-            <a:pPr algn="ctr"/>
-            <a:r>
-              <a:rPr lang="en-US" b="1" dirty="0">
-                <a:solidFill>
-                  <a:schemeClr val="tx1"/>
-                </a:solidFill>
-                <a:latin typeface="Arial" panose="020B0604020202020204" pitchFamily="34" charset="0"/>
-                <a:cs typeface="Arial" panose="020B0604020202020204" pitchFamily="34" charset="0"/>
-              </a:rPr>
-              <a:t>Trending blue</a:t>
-            </a:r>
-          </a:p>
-          <a:p>
-            <a:pPr algn="ctr"/>
-            <a:r>
-              <a:rPr lang="en-US" sz="1600" i="1" dirty="0">
-                <a:solidFill>
-                  <a:schemeClr val="tx1"/>
-                </a:solidFill>
-                <a:latin typeface="Arial" panose="020B0604020202020204" pitchFamily="34" charset="0"/>
-                <a:cs typeface="Arial" panose="020B0604020202020204" pitchFamily="34" charset="0"/>
-              </a:rPr>
-              <a:t>P </a:t>
-            </a:r>
-            <a:r>
-              <a:rPr lang="en-US" sz="1600" dirty="0">
-                <a:solidFill>
-                  <a:schemeClr val="tx1"/>
-                </a:solidFill>
-                <a:latin typeface="Arial" panose="020B0604020202020204" pitchFamily="34" charset="0"/>
-                <a:cs typeface="Arial" panose="020B0604020202020204" pitchFamily="34" charset="0"/>
-              </a:rPr>
-              <a:t>≤ 0.05</a:t>
-            </a:r>
-          </a:p>
-          <a:p>
-            <a:pPr algn="ctr"/>
-            <a:r>
-              <a:rPr lang="en-US" sz="1600" dirty="0">
-                <a:solidFill>
-                  <a:schemeClr val="tx1"/>
-                </a:solidFill>
-                <a:latin typeface="Arial" panose="020B0604020202020204" pitchFamily="34" charset="0"/>
-                <a:cs typeface="Arial" panose="020B0604020202020204" pitchFamily="34" charset="0"/>
-              </a:rPr>
-              <a:t>slope coef. &lt; -0.4</a:t>
-            </a:r>
-          </a:p>
-          <a:p>
-            <a:pPr algn="ctr"/>
-            <a:r>
-              <a:rPr lang="en-US" sz="1600" b="1" dirty="0">
-                <a:solidFill>
-                  <a:schemeClr val="tx1"/>
-                </a:solidFill>
-                <a:latin typeface="Arial" panose="020B0604020202020204" pitchFamily="34" charset="0"/>
-                <a:cs typeface="Arial" panose="020B0604020202020204" pitchFamily="34" charset="0"/>
-              </a:rPr>
-              <a:t>49.6%</a:t>
-            </a:r>
-            <a:r>
-              <a:rPr lang="en-US" sz="1600" dirty="0">
-                <a:solidFill>
-                  <a:schemeClr val="tx1"/>
-                </a:solidFill>
-                <a:latin typeface="Arial" panose="020B0604020202020204" pitchFamily="34" charset="0"/>
-                <a:cs typeface="Arial" panose="020B0604020202020204" pitchFamily="34" charset="0"/>
-              </a:rPr>
-              <a:t> correct classifications</a:t>
-            </a:r>
-          </a:p>
-        </p:txBody>
-      </p:sp>
-      <p:cxnSp>
-        <p:nvCxnSpPr>
-          <p:cNvPr id="35" name="Straight Arrow Connector 34">
-            <a:extLst>
-              <a:ext uri="{FF2B5EF4-FFF2-40B4-BE49-F238E27FC236}">
-                <a16:creationId xmlns:a16="http://schemas.microsoft.com/office/drawing/2014/main" id="{18A26BE6-A544-9FD1-8BC1-7E581D7D702D}"/>
-              </a:ext>
-            </a:extLst>
-          </p:cNvPr>
-          <p:cNvCxnSpPr>
-            <a:cxnSpLocks/>
-          </p:cNvCxnSpPr>
-          <p:nvPr/>
-        </p:nvCxnSpPr>
-        <p:spPr>
-          <a:xfrm>
-            <a:off x="8963825" y="973631"/>
-            <a:ext cx="12893" cy="561473"/>
-          </a:xfrm>
-          <a:prstGeom prst="straightConnector1">
-            <a:avLst/>
-          </a:prstGeom>
-          <a:ln w="76200">
-            <a:solidFill>
-              <a:schemeClr val="tx1"/>
-            </a:solidFill>
-            <a:tailEnd type="triangle"/>
-          </a:ln>
-        </p:spPr>
-        <p:style>
-          <a:lnRef idx="2">
-            <a:schemeClr val="accent1"/>
-          </a:lnRef>
-          <a:fillRef idx="0">
-            <a:schemeClr val="accent1"/>
-          </a:fillRef>
-          <a:effectRef idx="1">
-            <a:schemeClr val="accent1"/>
-          </a:effectRef>
-          <a:fontRef idx="minor">
-            <a:schemeClr val="tx1"/>
-          </a:fontRef>
-        </p:style>
-      </p:cxnSp>
-      <p:sp>
-        <p:nvSpPr>
-          <p:cNvPr id="37" name="Rounded Rectangle 36">
-            <a:extLst>
-              <a:ext uri="{FF2B5EF4-FFF2-40B4-BE49-F238E27FC236}">
-                <a16:creationId xmlns:a16="http://schemas.microsoft.com/office/drawing/2014/main" id="{ECD09860-2E26-A502-58F7-2BBA15D0CD40}"/>
-              </a:ext>
-            </a:extLst>
-          </p:cNvPr>
-          <p:cNvSpPr/>
-          <p:nvPr/>
-        </p:nvSpPr>
-        <p:spPr>
-          <a:xfrm>
-            <a:off x="8045672" y="1563179"/>
-            <a:ext cx="1938528" cy="1471861"/>
-          </a:xfrm>
-          <a:prstGeom prst="roundRect">
-            <a:avLst/>
-          </a:prstGeom>
-          <a:solidFill>
-            <a:schemeClr val="bg1">
-              <a:lumMod val="85000"/>
-            </a:schemeClr>
-          </a:solidFill>
-          <a:ln w="28575">
-            <a:solidFill>
-              <a:schemeClr val="tx1"/>
-            </a:solidFill>
-          </a:ln>
-        </p:spPr>
-        <p:style>
-          <a:lnRef idx="2">
-            <a:schemeClr val="accent1">
-              <a:shade val="15000"/>
-            </a:schemeClr>
-          </a:lnRef>
-          <a:fillRef idx="1">
-            <a:schemeClr val="accent1"/>
-          </a:fillRef>
-          <a:effectRef idx="0">
-            <a:schemeClr val="accent1"/>
-          </a:effectRef>
-          <a:fontRef idx="minor">
-            <a:schemeClr val="lt1"/>
-          </a:fontRef>
-        </p:style>
-        <p:txBody>
-          <a:bodyPr rtlCol="0" anchor="ctr"/>
-          <a:lstStyle/>
-          <a:p>
-            <a:pPr algn="ctr"/>
-            <a:r>
-              <a:rPr lang="en-US" b="1" dirty="0">
-                <a:solidFill>
-                  <a:schemeClr val="tx1"/>
-                </a:solidFill>
-                <a:latin typeface="Arial" panose="020B0604020202020204" pitchFamily="34" charset="0"/>
-                <a:cs typeface="Arial" panose="020B0604020202020204" pitchFamily="34" charset="0"/>
-              </a:rPr>
-              <a:t>No trend</a:t>
-            </a:r>
-          </a:p>
-          <a:p>
-            <a:pPr algn="ctr"/>
-            <a:r>
-              <a:rPr lang="en-US" sz="1600" i="1" dirty="0">
-                <a:solidFill>
-                  <a:schemeClr val="tx1"/>
-                </a:solidFill>
-                <a:latin typeface="Arial" panose="020B0604020202020204" pitchFamily="34" charset="0"/>
-                <a:cs typeface="Arial" panose="020B0604020202020204" pitchFamily="34" charset="0"/>
-              </a:rPr>
-              <a:t>P &gt;</a:t>
-            </a:r>
-            <a:r>
-              <a:rPr lang="en-US" sz="1600" dirty="0">
-                <a:solidFill>
-                  <a:schemeClr val="tx1"/>
-                </a:solidFill>
-                <a:latin typeface="Arial" panose="020B0604020202020204" pitchFamily="34" charset="0"/>
-                <a:cs typeface="Arial" panose="020B0604020202020204" pitchFamily="34" charset="0"/>
-              </a:rPr>
-              <a:t> 0.05</a:t>
-            </a:r>
-          </a:p>
-          <a:p>
-            <a:pPr algn="ctr"/>
-            <a:r>
-              <a:rPr lang="en-US" sz="1600" b="1" dirty="0">
-                <a:solidFill>
-                  <a:schemeClr val="tx1"/>
-                </a:solidFill>
-                <a:latin typeface="Arial" panose="020B0604020202020204" pitchFamily="34" charset="0"/>
-                <a:cs typeface="Arial" panose="020B0604020202020204" pitchFamily="34" charset="0"/>
-              </a:rPr>
-              <a:t>47.6%</a:t>
-            </a:r>
-            <a:r>
-              <a:rPr lang="en-US" sz="1600" dirty="0">
-                <a:solidFill>
-                  <a:schemeClr val="tx1"/>
-                </a:solidFill>
-                <a:latin typeface="Arial" panose="020B0604020202020204" pitchFamily="34" charset="0"/>
-                <a:cs typeface="Arial" panose="020B0604020202020204" pitchFamily="34" charset="0"/>
-              </a:rPr>
-              <a:t> correct classifications </a:t>
-            </a:r>
-          </a:p>
-        </p:txBody>
-      </p:sp>
-      <p:sp>
-        <p:nvSpPr>
-          <p:cNvPr id="38" name="Rounded Rectangle 37">
-            <a:extLst>
-              <a:ext uri="{FF2B5EF4-FFF2-40B4-BE49-F238E27FC236}">
-                <a16:creationId xmlns:a16="http://schemas.microsoft.com/office/drawing/2014/main" id="{F26B67FA-9377-8D14-3106-2FCFF91AD194}"/>
-              </a:ext>
-            </a:extLst>
-          </p:cNvPr>
-          <p:cNvSpPr/>
-          <p:nvPr/>
-        </p:nvSpPr>
-        <p:spPr>
-          <a:xfrm>
-            <a:off x="10166058" y="1563178"/>
-            <a:ext cx="1984248" cy="1471861"/>
-          </a:xfrm>
-          <a:prstGeom prst="roundRect">
-            <a:avLst/>
-          </a:prstGeom>
-          <a:solidFill>
-            <a:srgbClr val="93C47D"/>
-          </a:solidFill>
-          <a:ln w="28575">
-            <a:solidFill>
-              <a:schemeClr val="tx1"/>
-            </a:solidFill>
-          </a:ln>
-        </p:spPr>
-        <p:style>
-          <a:lnRef idx="2">
-            <a:schemeClr val="accent1">
-              <a:shade val="15000"/>
-            </a:schemeClr>
-          </a:lnRef>
-          <a:fillRef idx="1">
-            <a:schemeClr val="accent1"/>
-          </a:fillRef>
-          <a:effectRef idx="0">
-            <a:schemeClr val="accent1"/>
-          </a:effectRef>
-          <a:fontRef idx="minor">
-            <a:schemeClr val="lt1"/>
-          </a:fontRef>
-        </p:style>
-        <p:txBody>
-          <a:bodyPr rtlCol="0" anchor="ctr"/>
-          <a:lstStyle/>
-          <a:p>
-            <a:pPr algn="ctr"/>
-            <a:r>
-              <a:rPr lang="en-US" b="1" dirty="0">
-                <a:solidFill>
-                  <a:schemeClr val="tx1"/>
-                </a:solidFill>
-                <a:latin typeface="Arial" panose="020B0604020202020204" pitchFamily="34" charset="0"/>
-                <a:cs typeface="Arial" panose="020B0604020202020204" pitchFamily="34" charset="0"/>
-              </a:rPr>
-              <a:t>Trending green</a:t>
-            </a:r>
-          </a:p>
-          <a:p>
-            <a:pPr algn="ctr"/>
-            <a:r>
-              <a:rPr lang="en-US" sz="1600" i="1" dirty="0">
-                <a:solidFill>
-                  <a:schemeClr val="tx1"/>
-                </a:solidFill>
-                <a:latin typeface="Arial" panose="020B0604020202020204" pitchFamily="34" charset="0"/>
-                <a:cs typeface="Arial" panose="020B0604020202020204" pitchFamily="34" charset="0"/>
-              </a:rPr>
-              <a:t>P </a:t>
-            </a:r>
-            <a:r>
-              <a:rPr lang="en-US" sz="1600" dirty="0">
-                <a:solidFill>
-                  <a:schemeClr val="tx1"/>
-                </a:solidFill>
-                <a:latin typeface="Arial" panose="020B0604020202020204" pitchFamily="34" charset="0"/>
-                <a:cs typeface="Arial" panose="020B0604020202020204" pitchFamily="34" charset="0"/>
-              </a:rPr>
-              <a:t>≤ 0.05</a:t>
-            </a:r>
-          </a:p>
-          <a:p>
-            <a:pPr algn="ctr"/>
-            <a:r>
-              <a:rPr lang="en-US" sz="1600" dirty="0">
-                <a:solidFill>
-                  <a:schemeClr val="tx1"/>
-                </a:solidFill>
-                <a:latin typeface="Arial" panose="020B0604020202020204" pitchFamily="34" charset="0"/>
-                <a:cs typeface="Arial" panose="020B0604020202020204" pitchFamily="34" charset="0"/>
-              </a:rPr>
-              <a:t>slope coef. &gt; 0.4</a:t>
-            </a:r>
-          </a:p>
-          <a:p>
-            <a:pPr algn="ctr"/>
-            <a:r>
-              <a:rPr lang="en-US" sz="1600" b="1" dirty="0">
-                <a:solidFill>
-                  <a:schemeClr val="tx1"/>
-                </a:solidFill>
-                <a:latin typeface="Arial" panose="020B0604020202020204" pitchFamily="34" charset="0"/>
-                <a:cs typeface="Arial" panose="020B0604020202020204" pitchFamily="34" charset="0"/>
-              </a:rPr>
-              <a:t>44.4%</a:t>
-            </a:r>
-            <a:r>
-              <a:rPr lang="en-US" sz="1600" dirty="0">
-                <a:solidFill>
-                  <a:schemeClr val="tx1"/>
-                </a:solidFill>
-                <a:latin typeface="Arial" panose="020B0604020202020204" pitchFamily="34" charset="0"/>
-                <a:cs typeface="Arial" panose="020B0604020202020204" pitchFamily="34" charset="0"/>
-              </a:rPr>
-              <a:t> correct classifications</a:t>
-            </a:r>
-          </a:p>
-        </p:txBody>
-      </p:sp>
-      <p:pic>
-        <p:nvPicPr>
-          <p:cNvPr id="13" name="Picture 12">
-            <a:extLst>
-              <a:ext uri="{FF2B5EF4-FFF2-40B4-BE49-F238E27FC236}">
-                <a16:creationId xmlns:a16="http://schemas.microsoft.com/office/drawing/2014/main" id="{383878D6-1177-F081-6C24-F8C1641D5E8D}"/>
-              </a:ext>
-            </a:extLst>
-          </p:cNvPr>
-          <p:cNvPicPr>
-            <a:picLocks noChangeAspect="1"/>
-          </p:cNvPicPr>
-          <p:nvPr/>
-        </p:nvPicPr>
-        <p:blipFill>
-          <a:blip r:embed="rId3"/>
-          <a:srcRect/>
-          <a:stretch/>
-        </p:blipFill>
-        <p:spPr>
-          <a:xfrm>
-            <a:off x="377054" y="6106182"/>
-            <a:ext cx="4123546" cy="2790370"/>
-          </a:xfrm>
-          <a:prstGeom prst="rect">
-            <a:avLst/>
-          </a:prstGeom>
-        </p:spPr>
-      </p:pic>
-      <p:pic>
-        <p:nvPicPr>
-          <p:cNvPr id="18" name="Picture 17">
-            <a:extLst>
-              <a:ext uri="{FF2B5EF4-FFF2-40B4-BE49-F238E27FC236}">
-                <a16:creationId xmlns:a16="http://schemas.microsoft.com/office/drawing/2014/main" id="{7E6FC67A-D3F2-B466-F29F-89987FF2F2DA}"/>
-              </a:ext>
-            </a:extLst>
-          </p:cNvPr>
-          <p:cNvPicPr>
-            <a:picLocks noChangeAspect="1"/>
-          </p:cNvPicPr>
-          <p:nvPr/>
-        </p:nvPicPr>
-        <p:blipFill>
-          <a:blip r:embed="rId4"/>
-          <a:srcRect/>
-          <a:stretch/>
-        </p:blipFill>
-        <p:spPr>
-          <a:xfrm>
-            <a:off x="5440716" y="6106182"/>
-            <a:ext cx="6696888" cy="2790370"/>
-          </a:xfrm>
-          <a:prstGeom prst="rect">
-            <a:avLst/>
-          </a:prstGeom>
-        </p:spPr>
-      </p:pic>
-      <p:pic>
-        <p:nvPicPr>
-          <p:cNvPr id="6" name="Picture 5">
-            <a:extLst>
-              <a:ext uri="{FF2B5EF4-FFF2-40B4-BE49-F238E27FC236}">
-                <a16:creationId xmlns:a16="http://schemas.microsoft.com/office/drawing/2014/main" id="{2AD3B3A7-68F8-0F96-2E61-80E2A12CA200}"/>
-              </a:ext>
-            </a:extLst>
-          </p:cNvPr>
-          <p:cNvPicPr>
-            <a:picLocks noChangeAspect="1"/>
-          </p:cNvPicPr>
-          <p:nvPr/>
-        </p:nvPicPr>
-        <p:blipFill>
-          <a:blip r:embed="rId5"/>
-          <a:srcRect/>
-          <a:stretch/>
-        </p:blipFill>
-        <p:spPr>
-          <a:xfrm>
-            <a:off x="6024667" y="3206523"/>
-            <a:ext cx="6299200" cy="2743200"/>
-          </a:xfrm>
-          <a:prstGeom prst="rect">
-            <a:avLst/>
-          </a:prstGeom>
-        </p:spPr>
-      </p:pic>
-      <p:pic>
-        <p:nvPicPr>
-          <p:cNvPr id="3" name="Picture 2">
-            <a:extLst>
-              <a:ext uri="{FF2B5EF4-FFF2-40B4-BE49-F238E27FC236}">
-                <a16:creationId xmlns:a16="http://schemas.microsoft.com/office/drawing/2014/main" id="{B56BD701-256A-B6B0-4B69-52519B8DE0B4}"/>
-              </a:ext>
-            </a:extLst>
-          </p:cNvPr>
-          <p:cNvPicPr>
-            <a:picLocks noChangeAspect="1"/>
-          </p:cNvPicPr>
-          <p:nvPr/>
-        </p:nvPicPr>
-        <p:blipFill>
-          <a:blip r:embed="rId6"/>
-          <a:srcRect/>
-          <a:stretch/>
-        </p:blipFill>
-        <p:spPr>
-          <a:xfrm>
-            <a:off x="145271" y="3210842"/>
-            <a:ext cx="6121400" cy="2743200"/>
-          </a:xfrm>
-          <a:prstGeom prst="rect">
-            <a:avLst/>
-          </a:prstGeom>
-        </p:spPr>
-      </p:pic>
-      <p:pic>
-        <p:nvPicPr>
-          <p:cNvPr id="104" name="Picture 103" descr="A chart with text and numbers&#10;&#10;Description automatically generated with medium confidence">
-            <a:extLst>
-              <a:ext uri="{FF2B5EF4-FFF2-40B4-BE49-F238E27FC236}">
-                <a16:creationId xmlns:a16="http://schemas.microsoft.com/office/drawing/2014/main" id="{34FC3C48-4D5C-3ED3-0387-C3187286D521}"/>
-              </a:ext>
-            </a:extLst>
-          </p:cNvPr>
-          <p:cNvPicPr>
-            <a:picLocks noChangeAspect="1"/>
-          </p:cNvPicPr>
-          <p:nvPr/>
-        </p:nvPicPr>
-        <p:blipFill rotWithShape="1">
-          <a:blip r:embed="rId7"/>
-          <a:srcRect t="38975" r="95435" b="45096"/>
-          <a:stretch/>
-        </p:blipFill>
-        <p:spPr>
-          <a:xfrm>
-            <a:off x="110061" y="3632023"/>
-            <a:ext cx="279400" cy="1165225"/>
-          </a:xfrm>
-          <a:prstGeom prst="rect">
-            <a:avLst/>
-          </a:prstGeom>
-        </p:spPr>
-      </p:pic>
-    </p:spTree>
-    <p:extLst>
-      <p:ext uri="{BB962C8B-B14F-4D97-AF65-F5344CB8AC3E}">
-        <p14:creationId xmlns:p14="http://schemas.microsoft.com/office/powerpoint/2010/main" val="2375331731"/>
-      </p:ext>
-    </p:extLst>
-  </p:cSld>
-  <p:clrMapOvr>
-    <a:masterClrMapping/>
-  </p:clrMapOvr>
-</p:sld>
-</file>
-
-<file path=ppt/slides/slide3.xml><?xml version="1.0" encoding="utf-8"?>
-<p:sld xmlns:a="http://schemas.openxmlformats.org/drawingml/2006/main" xmlns:r="http://schemas.openxmlformats.org/officeDocument/2006/relationships" xmlns:p="http://schemas.openxmlformats.org/presentationml/2006/main">
-  <p:cSld>
-    <p:spTree>
-      <p:nvGrpSpPr>
-        <p:cNvPr id="1" name="">
-          <a:extLst>
-            <a:ext uri="{FF2B5EF4-FFF2-40B4-BE49-F238E27FC236}">
-              <a16:creationId xmlns:a16="http://schemas.microsoft.com/office/drawing/2014/main" id="{B7FFE3AA-28C1-B882-DD14-0A0FFF126160}"/>
-            </a:ext>
-          </a:extLst>
-        </p:cNvPr>
-        <p:cNvGrpSpPr/>
-        <p:nvPr/>
-      </p:nvGrpSpPr>
-      <p:grpSpPr>
-        <a:xfrm>
-          <a:off x="0" y="0"/>
-          <a:ext cx="0" cy="0"/>
-          <a:chOff x="0" y="0"/>
-          <a:chExt cx="0" cy="0"/>
-        </a:xfrm>
-      </p:grpSpPr>
-      <p:sp>
-        <p:nvSpPr>
-          <p:cNvPr id="7" name="Rounded Rectangle 6">
-            <a:extLst>
-              <a:ext uri="{FF2B5EF4-FFF2-40B4-BE49-F238E27FC236}">
-                <a16:creationId xmlns:a16="http://schemas.microsoft.com/office/drawing/2014/main" id="{153DF881-BF27-3018-4AF9-9E5DB4D7E614}"/>
-              </a:ext>
-            </a:extLst>
-          </p:cNvPr>
-          <p:cNvSpPr/>
-          <p:nvPr/>
-        </p:nvSpPr>
-        <p:spPr>
-          <a:xfrm>
-            <a:off x="1690436" y="175519"/>
-            <a:ext cx="2117558" cy="673768"/>
-          </a:xfrm>
-          <a:prstGeom prst="roundRect">
-            <a:avLst/>
-          </a:prstGeom>
-          <a:solidFill>
-            <a:srgbClr val="000000"/>
-          </a:solidFill>
-          <a:ln w="28575">
-            <a:solidFill>
-              <a:schemeClr val="tx1"/>
-            </a:solidFill>
-          </a:ln>
-        </p:spPr>
-        <p:style>
-          <a:lnRef idx="2">
-            <a:schemeClr val="accent1">
-              <a:shade val="15000"/>
-            </a:schemeClr>
-          </a:lnRef>
-          <a:fillRef idx="1">
-            <a:schemeClr val="accent1"/>
-          </a:fillRef>
-          <a:effectRef idx="0">
-            <a:schemeClr val="accent1"/>
-          </a:effectRef>
-          <a:fontRef idx="minor">
-            <a:schemeClr val="lt1"/>
-          </a:fontRef>
-        </p:style>
-        <p:txBody>
-          <a:bodyPr rtlCol="0" anchor="ctr"/>
-          <a:lstStyle/>
-          <a:p>
-            <a:pPr algn="ctr"/>
-            <a:r>
-              <a:rPr lang="en-US" b="1" dirty="0">
-                <a:solidFill>
-                  <a:schemeClr val="bg1"/>
-                </a:solidFill>
-                <a:latin typeface="Arial" panose="020B0604020202020204" pitchFamily="34" charset="0"/>
-                <a:cs typeface="Arial" panose="020B0604020202020204" pitchFamily="34" charset="0"/>
-              </a:rPr>
-              <a:t>All lakes</a:t>
-            </a:r>
-          </a:p>
-          <a:p>
-            <a:pPr algn="ctr"/>
-            <a:r>
-              <a:rPr lang="en-US" dirty="0">
-                <a:solidFill>
-                  <a:schemeClr val="bg1"/>
-                </a:solidFill>
-                <a:latin typeface="Arial" panose="020B0604020202020204" pitchFamily="34" charset="0"/>
-                <a:cs typeface="Arial" panose="020B0604020202020204" pitchFamily="34" charset="0"/>
-              </a:rPr>
-              <a:t>n = 38,566</a:t>
-            </a:r>
-          </a:p>
-        </p:txBody>
-      </p:sp>
-      <p:sp>
-        <p:nvSpPr>
-          <p:cNvPr id="9" name="Rounded Rectangle 8">
-            <a:extLst>
-              <a:ext uri="{FF2B5EF4-FFF2-40B4-BE49-F238E27FC236}">
-                <a16:creationId xmlns:a16="http://schemas.microsoft.com/office/drawing/2014/main" id="{FDA439D0-AFC5-6B99-A5BD-7A8262EE38F2}"/>
-              </a:ext>
-            </a:extLst>
-          </p:cNvPr>
-          <p:cNvSpPr/>
-          <p:nvPr/>
-        </p:nvSpPr>
-        <p:spPr>
-          <a:xfrm>
-            <a:off x="3161177" y="1567171"/>
-            <a:ext cx="1760623" cy="1472184"/>
-          </a:xfrm>
-          <a:prstGeom prst="roundRect">
-            <a:avLst/>
-          </a:prstGeom>
-          <a:solidFill>
-            <a:srgbClr val="93C47D"/>
-          </a:solidFill>
-          <a:ln w="28575">
-            <a:solidFill>
-              <a:schemeClr val="tx1"/>
-            </a:solidFill>
-          </a:ln>
-        </p:spPr>
-        <p:style>
-          <a:lnRef idx="2">
-            <a:schemeClr val="accent1">
-              <a:shade val="15000"/>
-            </a:schemeClr>
-          </a:lnRef>
-          <a:fillRef idx="1">
-            <a:schemeClr val="accent1"/>
-          </a:fillRef>
-          <a:effectRef idx="0">
-            <a:schemeClr val="accent1"/>
-          </a:effectRef>
-          <a:fontRef idx="minor">
-            <a:schemeClr val="lt1"/>
-          </a:fontRef>
-        </p:style>
-        <p:txBody>
-          <a:bodyPr rtlCol="0" anchor="ctr"/>
-          <a:lstStyle/>
-          <a:p>
-            <a:pPr algn="ctr"/>
-            <a:r>
-              <a:rPr lang="en-US" b="1" dirty="0">
-                <a:solidFill>
-                  <a:schemeClr val="tx1"/>
-                </a:solidFill>
-                <a:latin typeface="Arial" panose="020B0604020202020204" pitchFamily="34" charset="0"/>
-                <a:cs typeface="Arial" panose="020B0604020202020204" pitchFamily="34" charset="0"/>
-              </a:rPr>
-              <a:t>Green lakes </a:t>
-            </a:r>
-          </a:p>
-          <a:p>
-            <a:pPr algn="ctr"/>
-            <a:r>
-              <a:rPr lang="en-US" sz="1600" dirty="0">
-                <a:solidFill>
-                  <a:schemeClr val="tx1"/>
-                </a:solidFill>
-                <a:latin typeface="Arial" panose="020B0604020202020204" pitchFamily="34" charset="0"/>
-                <a:cs typeface="Arial" panose="020B0604020202020204" pitchFamily="34" charset="0"/>
-              </a:rPr>
-              <a:t>DWL &gt; 530</a:t>
-            </a:r>
-          </a:p>
-          <a:p>
-            <a:pPr algn="ctr"/>
-            <a:r>
-              <a:rPr lang="en-US" sz="1600" b="1" dirty="0">
-                <a:solidFill>
-                  <a:schemeClr val="tx1"/>
-                </a:solidFill>
-                <a:latin typeface="Arial" panose="020B0604020202020204" pitchFamily="34" charset="0"/>
-                <a:cs typeface="Arial" panose="020B0604020202020204" pitchFamily="34" charset="0"/>
-              </a:rPr>
-              <a:t>84.9% </a:t>
-            </a:r>
-            <a:r>
-              <a:rPr lang="en-US" sz="1600" dirty="0">
-                <a:solidFill>
-                  <a:schemeClr val="tx1"/>
-                </a:solidFill>
-                <a:latin typeface="Arial" panose="020B0604020202020204" pitchFamily="34" charset="0"/>
-                <a:cs typeface="Arial" panose="020B0604020202020204" pitchFamily="34" charset="0"/>
-              </a:rPr>
-              <a:t>correct classifications</a:t>
-            </a:r>
-          </a:p>
-        </p:txBody>
-      </p:sp>
-      <p:sp>
-        <p:nvSpPr>
-          <p:cNvPr id="11" name="Rounded Rectangle 10">
-            <a:extLst>
-              <a:ext uri="{FF2B5EF4-FFF2-40B4-BE49-F238E27FC236}">
-                <a16:creationId xmlns:a16="http://schemas.microsoft.com/office/drawing/2014/main" id="{0F903863-08D5-29EE-CFD2-564F5E7449D1}"/>
-              </a:ext>
-            </a:extLst>
-          </p:cNvPr>
-          <p:cNvSpPr/>
-          <p:nvPr/>
-        </p:nvSpPr>
-        <p:spPr>
-          <a:xfrm>
-            <a:off x="670034" y="1567173"/>
-            <a:ext cx="1764792" cy="1472184"/>
-          </a:xfrm>
-          <a:prstGeom prst="roundRect">
-            <a:avLst/>
-          </a:prstGeom>
-          <a:solidFill>
-            <a:srgbClr val="75AEDB">
-              <a:alpha val="78824"/>
-            </a:srgbClr>
-          </a:solidFill>
-          <a:ln w="28575">
-            <a:solidFill>
-              <a:schemeClr val="tx1"/>
-            </a:solidFill>
-          </a:ln>
-        </p:spPr>
-        <p:style>
-          <a:lnRef idx="2">
-            <a:schemeClr val="accent1">
-              <a:shade val="15000"/>
-            </a:schemeClr>
-          </a:lnRef>
-          <a:fillRef idx="1">
-            <a:schemeClr val="accent1"/>
-          </a:fillRef>
-          <a:effectRef idx="0">
-            <a:schemeClr val="accent1"/>
-          </a:effectRef>
-          <a:fontRef idx="minor">
-            <a:schemeClr val="lt1"/>
-          </a:fontRef>
-        </p:style>
-        <p:txBody>
-          <a:bodyPr rtlCol="0" anchor="ctr"/>
-          <a:lstStyle/>
-          <a:p>
-            <a:pPr algn="ctr"/>
-            <a:r>
-              <a:rPr lang="en-US" b="1" dirty="0">
-                <a:solidFill>
-                  <a:schemeClr val="tx1"/>
-                </a:solidFill>
-                <a:latin typeface="Arial" panose="020B0604020202020204" pitchFamily="34" charset="0"/>
-                <a:cs typeface="Arial" panose="020B0604020202020204" pitchFamily="34" charset="0"/>
-              </a:rPr>
-              <a:t>Blue lakes </a:t>
-            </a:r>
-          </a:p>
-          <a:p>
-            <a:pPr algn="ctr"/>
-            <a:r>
-              <a:rPr lang="en-US" sz="1600" dirty="0">
-                <a:solidFill>
-                  <a:schemeClr val="tx1"/>
-                </a:solidFill>
-                <a:latin typeface="Arial" panose="020B0604020202020204" pitchFamily="34" charset="0"/>
-                <a:cs typeface="Arial" panose="020B0604020202020204" pitchFamily="34" charset="0"/>
-              </a:rPr>
-              <a:t>DWL &lt; 530</a:t>
-            </a:r>
-          </a:p>
-          <a:p>
-            <a:pPr algn="ctr"/>
-            <a:r>
-              <a:rPr lang="en-US" sz="1600" b="1">
-                <a:solidFill>
-                  <a:schemeClr val="tx1"/>
-                </a:solidFill>
-                <a:latin typeface="Arial" panose="020B0604020202020204" pitchFamily="34" charset="0"/>
-                <a:cs typeface="Arial" panose="020B0604020202020204" pitchFamily="34" charset="0"/>
-              </a:rPr>
-              <a:t>86.8</a:t>
-            </a:r>
-            <a:r>
-              <a:rPr lang="en-US" sz="1600" b="1" dirty="0">
-                <a:solidFill>
-                  <a:schemeClr val="tx1"/>
-                </a:solidFill>
-                <a:latin typeface="Arial" panose="020B0604020202020204" pitchFamily="34" charset="0"/>
-                <a:cs typeface="Arial" panose="020B0604020202020204" pitchFamily="34" charset="0"/>
-              </a:rPr>
-              <a:t>%</a:t>
-            </a:r>
-            <a:r>
-              <a:rPr lang="en-US" sz="1600" dirty="0">
-                <a:solidFill>
-                  <a:schemeClr val="tx1"/>
-                </a:solidFill>
-                <a:latin typeface="Arial" panose="020B0604020202020204" pitchFamily="34" charset="0"/>
-                <a:cs typeface="Arial" panose="020B0604020202020204" pitchFamily="34" charset="0"/>
-              </a:rPr>
-              <a:t> correct classifications</a:t>
-            </a:r>
-          </a:p>
-        </p:txBody>
-      </p:sp>
-      <p:cxnSp>
-        <p:nvCxnSpPr>
-          <p:cNvPr id="14" name="Straight Arrow Connector 13">
-            <a:extLst>
-              <a:ext uri="{FF2B5EF4-FFF2-40B4-BE49-F238E27FC236}">
-                <a16:creationId xmlns:a16="http://schemas.microsoft.com/office/drawing/2014/main" id="{526EAD6D-434F-803C-7083-4FD1A34E372C}"/>
-              </a:ext>
-            </a:extLst>
-          </p:cNvPr>
-          <p:cNvCxnSpPr>
-            <a:cxnSpLocks/>
-          </p:cNvCxnSpPr>
-          <p:nvPr/>
-        </p:nvCxnSpPr>
-        <p:spPr>
-          <a:xfrm flipH="1">
-            <a:off x="1784700" y="953561"/>
-            <a:ext cx="425115" cy="512064"/>
-          </a:xfrm>
-          <a:prstGeom prst="straightConnector1">
-            <a:avLst/>
-          </a:prstGeom>
-          <a:ln w="76200">
-            <a:solidFill>
-              <a:schemeClr val="tx1"/>
-            </a:solidFill>
-            <a:tailEnd type="triangle"/>
-          </a:ln>
-        </p:spPr>
-        <p:style>
-          <a:lnRef idx="2">
-            <a:schemeClr val="accent1"/>
-          </a:lnRef>
-          <a:fillRef idx="0">
-            <a:schemeClr val="accent1"/>
-          </a:fillRef>
-          <a:effectRef idx="1">
-            <a:schemeClr val="accent1"/>
-          </a:effectRef>
-          <a:fontRef idx="minor">
-            <a:schemeClr val="tx1"/>
-          </a:fontRef>
-        </p:style>
-      </p:cxnSp>
-      <p:cxnSp>
-        <p:nvCxnSpPr>
-          <p:cNvPr id="16" name="Straight Arrow Connector 15">
-            <a:extLst>
-              <a:ext uri="{FF2B5EF4-FFF2-40B4-BE49-F238E27FC236}">
-                <a16:creationId xmlns:a16="http://schemas.microsoft.com/office/drawing/2014/main" id="{4CDDB712-03C4-E7CC-0FC1-F97E9565009B}"/>
-              </a:ext>
-            </a:extLst>
-          </p:cNvPr>
-          <p:cNvCxnSpPr>
-            <a:cxnSpLocks/>
-          </p:cNvCxnSpPr>
-          <p:nvPr/>
-        </p:nvCxnSpPr>
-        <p:spPr>
-          <a:xfrm>
-            <a:off x="3298658" y="955329"/>
-            <a:ext cx="420624" cy="512064"/>
-          </a:xfrm>
-          <a:prstGeom prst="straightConnector1">
-            <a:avLst/>
-          </a:prstGeom>
-          <a:ln w="76200">
-            <a:solidFill>
-              <a:schemeClr val="tx1"/>
-            </a:solidFill>
-            <a:tailEnd type="triangle"/>
-          </a:ln>
-        </p:spPr>
-        <p:style>
-          <a:lnRef idx="2">
-            <a:schemeClr val="accent1"/>
-          </a:lnRef>
-          <a:fillRef idx="0">
-            <a:schemeClr val="accent1"/>
-          </a:fillRef>
-          <a:effectRef idx="1">
-            <a:schemeClr val="accent1"/>
-          </a:effectRef>
-          <a:fontRef idx="minor">
-            <a:schemeClr val="tx1"/>
-          </a:fontRef>
-        </p:style>
-      </p:cxnSp>
-      <p:sp>
-        <p:nvSpPr>
-          <p:cNvPr id="27" name="Rounded Rectangle 26">
-            <a:extLst>
-              <a:ext uri="{FF2B5EF4-FFF2-40B4-BE49-F238E27FC236}">
-                <a16:creationId xmlns:a16="http://schemas.microsoft.com/office/drawing/2014/main" id="{E31D6988-FC2F-9E4F-FBCE-91D9E1ACCE35}"/>
-              </a:ext>
-            </a:extLst>
-          </p:cNvPr>
-          <p:cNvSpPr/>
-          <p:nvPr/>
-        </p:nvSpPr>
-        <p:spPr>
-          <a:xfrm>
-            <a:off x="7896727" y="175519"/>
-            <a:ext cx="2117558" cy="673768"/>
-          </a:xfrm>
-          <a:prstGeom prst="roundRect">
-            <a:avLst/>
-          </a:prstGeom>
-          <a:solidFill>
-            <a:srgbClr val="000000"/>
-          </a:solidFill>
-          <a:ln w="28575">
-            <a:solidFill>
-              <a:schemeClr val="tx1"/>
-            </a:solidFill>
-          </a:ln>
-        </p:spPr>
-        <p:style>
-          <a:lnRef idx="2">
-            <a:schemeClr val="accent1">
-              <a:shade val="15000"/>
-            </a:schemeClr>
-          </a:lnRef>
-          <a:fillRef idx="1">
-            <a:schemeClr val="accent1"/>
-          </a:fillRef>
-          <a:effectRef idx="0">
-            <a:schemeClr val="accent1"/>
-          </a:effectRef>
-          <a:fontRef idx="minor">
-            <a:schemeClr val="lt1"/>
-          </a:fontRef>
-        </p:style>
-        <p:txBody>
-          <a:bodyPr rtlCol="0" anchor="ctr"/>
-          <a:lstStyle/>
-          <a:p>
-            <a:pPr algn="ctr"/>
-            <a:r>
-              <a:rPr lang="en-US" b="1" dirty="0">
-                <a:solidFill>
-                  <a:schemeClr val="bg1"/>
-                </a:solidFill>
-                <a:latin typeface="Arial" panose="020B0604020202020204" pitchFamily="34" charset="0"/>
-                <a:cs typeface="Arial" panose="020B0604020202020204" pitchFamily="34" charset="0"/>
-              </a:rPr>
-              <a:t>Subset of lakes</a:t>
-            </a:r>
-          </a:p>
-          <a:p>
-            <a:pPr algn="ctr"/>
-            <a:r>
-              <a:rPr lang="en-US" dirty="0">
-                <a:solidFill>
-                  <a:schemeClr val="bg1"/>
-                </a:solidFill>
-                <a:latin typeface="Arial" panose="020B0604020202020204" pitchFamily="34" charset="0"/>
-                <a:cs typeface="Arial" panose="020B0604020202020204" pitchFamily="34" charset="0"/>
-              </a:rPr>
-              <a:t>n = 2,160</a:t>
-            </a:r>
-          </a:p>
-        </p:txBody>
-      </p:sp>
-      <p:cxnSp>
-        <p:nvCxnSpPr>
-          <p:cNvPr id="30" name="Straight Arrow Connector 29">
-            <a:extLst>
-              <a:ext uri="{FF2B5EF4-FFF2-40B4-BE49-F238E27FC236}">
-                <a16:creationId xmlns:a16="http://schemas.microsoft.com/office/drawing/2014/main" id="{62247B04-E21C-B319-CD17-76B0166868CF}"/>
-              </a:ext>
-            </a:extLst>
-          </p:cNvPr>
-          <p:cNvCxnSpPr>
-            <a:cxnSpLocks/>
-          </p:cNvCxnSpPr>
-          <p:nvPr/>
-        </p:nvCxnSpPr>
-        <p:spPr>
-          <a:xfrm flipH="1">
-            <a:off x="7602811" y="949551"/>
-            <a:ext cx="425115" cy="509338"/>
-          </a:xfrm>
-          <a:prstGeom prst="straightConnector1">
-            <a:avLst/>
-          </a:prstGeom>
-          <a:ln w="76200">
-            <a:solidFill>
-              <a:schemeClr val="tx1"/>
-            </a:solidFill>
-            <a:tailEnd type="triangle"/>
-          </a:ln>
-        </p:spPr>
-        <p:style>
-          <a:lnRef idx="2">
-            <a:schemeClr val="accent1"/>
-          </a:lnRef>
-          <a:fillRef idx="0">
-            <a:schemeClr val="accent1"/>
-          </a:fillRef>
-          <a:effectRef idx="1">
-            <a:schemeClr val="accent1"/>
-          </a:effectRef>
-          <a:fontRef idx="minor">
-            <a:schemeClr val="tx1"/>
-          </a:fontRef>
-        </p:style>
-      </p:cxnSp>
-      <p:cxnSp>
-        <p:nvCxnSpPr>
-          <p:cNvPr id="31" name="Straight Arrow Connector 30">
-            <a:extLst>
-              <a:ext uri="{FF2B5EF4-FFF2-40B4-BE49-F238E27FC236}">
-                <a16:creationId xmlns:a16="http://schemas.microsoft.com/office/drawing/2014/main" id="{881F10B2-7A43-ADC8-B71E-1071EBF13E2A}"/>
-              </a:ext>
-            </a:extLst>
-          </p:cNvPr>
-          <p:cNvCxnSpPr>
-            <a:cxnSpLocks/>
-          </p:cNvCxnSpPr>
-          <p:nvPr/>
-        </p:nvCxnSpPr>
-        <p:spPr>
-          <a:xfrm>
-            <a:off x="9896369" y="949551"/>
-            <a:ext cx="420624" cy="512064"/>
-          </a:xfrm>
-          <a:prstGeom prst="straightConnector1">
-            <a:avLst/>
-          </a:prstGeom>
-          <a:ln w="76200">
-            <a:solidFill>
-              <a:schemeClr val="tx1"/>
-            </a:solidFill>
-            <a:tailEnd type="triangle"/>
-          </a:ln>
-        </p:spPr>
-        <p:style>
-          <a:lnRef idx="2">
-            <a:schemeClr val="accent1"/>
-          </a:lnRef>
-          <a:fillRef idx="0">
-            <a:schemeClr val="accent1"/>
-          </a:fillRef>
-          <a:effectRef idx="1">
-            <a:schemeClr val="accent1"/>
-          </a:effectRef>
-          <a:fontRef idx="minor">
-            <a:schemeClr val="tx1"/>
-          </a:fontRef>
-        </p:style>
-      </p:cxnSp>
-      <p:sp>
-        <p:nvSpPr>
-          <p:cNvPr id="33" name="Rounded Rectangle 32">
-            <a:extLst>
-              <a:ext uri="{FF2B5EF4-FFF2-40B4-BE49-F238E27FC236}">
-                <a16:creationId xmlns:a16="http://schemas.microsoft.com/office/drawing/2014/main" id="{060E6BDB-3C5B-22FA-58BA-86F3DB4B243F}"/>
-              </a:ext>
-            </a:extLst>
-          </p:cNvPr>
-          <p:cNvSpPr/>
-          <p:nvPr/>
-        </p:nvSpPr>
-        <p:spPr>
-          <a:xfrm>
-            <a:off x="5925285" y="1567186"/>
-            <a:ext cx="1938528" cy="1471861"/>
-          </a:xfrm>
-          <a:prstGeom prst="roundRect">
-            <a:avLst/>
-          </a:prstGeom>
-          <a:solidFill>
-            <a:srgbClr val="75AEDB">
-              <a:alpha val="78824"/>
-            </a:srgbClr>
-          </a:solidFill>
-          <a:ln w="28575">
-            <a:solidFill>
-              <a:schemeClr val="tx1"/>
-            </a:solidFill>
-          </a:ln>
-        </p:spPr>
-        <p:style>
-          <a:lnRef idx="2">
-            <a:schemeClr val="accent1">
-              <a:shade val="15000"/>
-            </a:schemeClr>
-          </a:lnRef>
-          <a:fillRef idx="1">
-            <a:schemeClr val="accent1"/>
-          </a:fillRef>
-          <a:effectRef idx="0">
-            <a:schemeClr val="accent1"/>
-          </a:effectRef>
-          <a:fontRef idx="minor">
-            <a:schemeClr val="lt1"/>
-          </a:fontRef>
-        </p:style>
-        <p:txBody>
-          <a:bodyPr rtlCol="0" anchor="ctr"/>
-          <a:lstStyle/>
-          <a:p>
-            <a:pPr algn="ctr"/>
-            <a:r>
-              <a:rPr lang="en-US" b="1" dirty="0">
-                <a:solidFill>
-                  <a:schemeClr val="tx1"/>
-                </a:solidFill>
-                <a:latin typeface="Arial" panose="020B0604020202020204" pitchFamily="34" charset="0"/>
-                <a:cs typeface="Arial" panose="020B0604020202020204" pitchFamily="34" charset="0"/>
-              </a:rPr>
-              <a:t>Trending blue</a:t>
-            </a:r>
-          </a:p>
-          <a:p>
-            <a:pPr algn="ctr"/>
-            <a:r>
-              <a:rPr lang="en-US" sz="1600" i="1" dirty="0">
-                <a:solidFill>
-                  <a:schemeClr val="tx1"/>
-                </a:solidFill>
-                <a:latin typeface="Arial" panose="020B0604020202020204" pitchFamily="34" charset="0"/>
-                <a:cs typeface="Arial" panose="020B0604020202020204" pitchFamily="34" charset="0"/>
-              </a:rPr>
-              <a:t>P </a:t>
-            </a:r>
-            <a:r>
-              <a:rPr lang="en-US" sz="1600" dirty="0">
-                <a:solidFill>
-                  <a:schemeClr val="tx1"/>
-                </a:solidFill>
-                <a:latin typeface="Arial" panose="020B0604020202020204" pitchFamily="34" charset="0"/>
-                <a:cs typeface="Arial" panose="020B0604020202020204" pitchFamily="34" charset="0"/>
-              </a:rPr>
-              <a:t>≤ 0.05</a:t>
-            </a:r>
-          </a:p>
-          <a:p>
-            <a:pPr algn="ctr"/>
-            <a:r>
-              <a:rPr lang="en-US" sz="1600" dirty="0">
-                <a:solidFill>
-                  <a:schemeClr val="tx1"/>
-                </a:solidFill>
-                <a:latin typeface="Arial" panose="020B0604020202020204" pitchFamily="34" charset="0"/>
-                <a:cs typeface="Arial" panose="020B0604020202020204" pitchFamily="34" charset="0"/>
-              </a:rPr>
-              <a:t>slope coef. &lt; -0.4</a:t>
-            </a:r>
-          </a:p>
-          <a:p>
-            <a:pPr algn="ctr"/>
-            <a:r>
-              <a:rPr lang="en-US" sz="1600" b="1" dirty="0">
-                <a:solidFill>
-                  <a:schemeClr val="tx1"/>
-                </a:solidFill>
-                <a:latin typeface="Arial" panose="020B0604020202020204" pitchFamily="34" charset="0"/>
-                <a:cs typeface="Arial" panose="020B0604020202020204" pitchFamily="34" charset="0"/>
-              </a:rPr>
-              <a:t>54.5%</a:t>
-            </a:r>
-            <a:r>
-              <a:rPr lang="en-US" sz="1600" dirty="0">
-                <a:solidFill>
-                  <a:schemeClr val="tx1"/>
-                </a:solidFill>
-                <a:latin typeface="Arial" panose="020B0604020202020204" pitchFamily="34" charset="0"/>
-                <a:cs typeface="Arial" panose="020B0604020202020204" pitchFamily="34" charset="0"/>
-              </a:rPr>
-              <a:t> correct classifications</a:t>
-            </a:r>
-          </a:p>
-        </p:txBody>
-      </p:sp>
-      <p:cxnSp>
-        <p:nvCxnSpPr>
-          <p:cNvPr id="35" name="Straight Arrow Connector 34">
-            <a:extLst>
-              <a:ext uri="{FF2B5EF4-FFF2-40B4-BE49-F238E27FC236}">
-                <a16:creationId xmlns:a16="http://schemas.microsoft.com/office/drawing/2014/main" id="{4617868F-C8EF-79E7-4BF6-CF93AAF808A6}"/>
-              </a:ext>
-            </a:extLst>
-          </p:cNvPr>
-          <p:cNvCxnSpPr>
-            <a:cxnSpLocks/>
-          </p:cNvCxnSpPr>
-          <p:nvPr/>
-        </p:nvCxnSpPr>
-        <p:spPr>
-          <a:xfrm>
-            <a:off x="8963825" y="973631"/>
-            <a:ext cx="12893" cy="561473"/>
-          </a:xfrm>
-          <a:prstGeom prst="straightConnector1">
-            <a:avLst/>
-          </a:prstGeom>
-          <a:ln w="76200">
-            <a:solidFill>
-              <a:schemeClr val="tx1"/>
-            </a:solidFill>
-            <a:tailEnd type="triangle"/>
-          </a:ln>
-        </p:spPr>
-        <p:style>
-          <a:lnRef idx="2">
-            <a:schemeClr val="accent1"/>
-          </a:lnRef>
-          <a:fillRef idx="0">
-            <a:schemeClr val="accent1"/>
-          </a:fillRef>
-          <a:effectRef idx="1">
-            <a:schemeClr val="accent1"/>
-          </a:effectRef>
-          <a:fontRef idx="minor">
-            <a:schemeClr val="tx1"/>
-          </a:fontRef>
-        </p:style>
-      </p:cxnSp>
-      <p:sp>
-        <p:nvSpPr>
-          <p:cNvPr id="37" name="Rounded Rectangle 36">
-            <a:extLst>
-              <a:ext uri="{FF2B5EF4-FFF2-40B4-BE49-F238E27FC236}">
-                <a16:creationId xmlns:a16="http://schemas.microsoft.com/office/drawing/2014/main" id="{6F8DB553-6284-1F6D-66C7-EF4809D63209}"/>
-              </a:ext>
-            </a:extLst>
-          </p:cNvPr>
-          <p:cNvSpPr/>
-          <p:nvPr/>
-        </p:nvSpPr>
-        <p:spPr>
-          <a:xfrm>
-            <a:off x="8045672" y="1563179"/>
-            <a:ext cx="1938528" cy="1471861"/>
-          </a:xfrm>
-          <a:prstGeom prst="roundRect">
-            <a:avLst/>
-          </a:prstGeom>
-          <a:solidFill>
-            <a:schemeClr val="bg1">
-              <a:lumMod val="85000"/>
-            </a:schemeClr>
-          </a:solidFill>
-          <a:ln w="28575">
-            <a:solidFill>
-              <a:schemeClr val="tx1"/>
-            </a:solidFill>
-          </a:ln>
-        </p:spPr>
-        <p:style>
-          <a:lnRef idx="2">
-            <a:schemeClr val="accent1">
-              <a:shade val="15000"/>
-            </a:schemeClr>
-          </a:lnRef>
-          <a:fillRef idx="1">
-            <a:schemeClr val="accent1"/>
-          </a:fillRef>
-          <a:effectRef idx="0">
-            <a:schemeClr val="accent1"/>
-          </a:effectRef>
-          <a:fontRef idx="minor">
-            <a:schemeClr val="lt1"/>
-          </a:fontRef>
-        </p:style>
-        <p:txBody>
-          <a:bodyPr rtlCol="0" anchor="ctr"/>
-          <a:lstStyle/>
-          <a:p>
-            <a:pPr algn="ctr"/>
-            <a:r>
-              <a:rPr lang="en-US" b="1" dirty="0">
-                <a:solidFill>
-                  <a:schemeClr val="tx1"/>
-                </a:solidFill>
-                <a:latin typeface="Arial" panose="020B0604020202020204" pitchFamily="34" charset="0"/>
-                <a:cs typeface="Arial" panose="020B0604020202020204" pitchFamily="34" charset="0"/>
-              </a:rPr>
-              <a:t>No trend</a:t>
-            </a:r>
-          </a:p>
-          <a:p>
-            <a:pPr algn="ctr"/>
-            <a:r>
-              <a:rPr lang="en-US" sz="1600" i="1" dirty="0">
-                <a:solidFill>
-                  <a:schemeClr val="tx1"/>
-                </a:solidFill>
-                <a:latin typeface="Arial" panose="020B0604020202020204" pitchFamily="34" charset="0"/>
-                <a:cs typeface="Arial" panose="020B0604020202020204" pitchFamily="34" charset="0"/>
-              </a:rPr>
-              <a:t>P &gt;</a:t>
-            </a:r>
-            <a:r>
-              <a:rPr lang="en-US" sz="1600" dirty="0">
-                <a:solidFill>
-                  <a:schemeClr val="tx1"/>
-                </a:solidFill>
-                <a:latin typeface="Arial" panose="020B0604020202020204" pitchFamily="34" charset="0"/>
-                <a:cs typeface="Arial" panose="020B0604020202020204" pitchFamily="34" charset="0"/>
-              </a:rPr>
-              <a:t> 0.05</a:t>
-            </a:r>
-          </a:p>
-          <a:p>
-            <a:pPr algn="ctr"/>
-            <a:r>
-              <a:rPr lang="en-US" sz="1600" b="1" dirty="0">
-                <a:solidFill>
-                  <a:schemeClr val="tx1"/>
-                </a:solidFill>
-                <a:latin typeface="Arial" panose="020B0604020202020204" pitchFamily="34" charset="0"/>
-                <a:cs typeface="Arial" panose="020B0604020202020204" pitchFamily="34" charset="0"/>
-              </a:rPr>
-              <a:t>44.7%</a:t>
-            </a:r>
-            <a:r>
-              <a:rPr lang="en-US" sz="1600" dirty="0">
-                <a:solidFill>
-                  <a:schemeClr val="tx1"/>
-                </a:solidFill>
-                <a:latin typeface="Arial" panose="020B0604020202020204" pitchFamily="34" charset="0"/>
-                <a:cs typeface="Arial" panose="020B0604020202020204" pitchFamily="34" charset="0"/>
-              </a:rPr>
-              <a:t> correct classifications </a:t>
-            </a:r>
-          </a:p>
-        </p:txBody>
-      </p:sp>
-      <p:sp>
-        <p:nvSpPr>
-          <p:cNvPr id="38" name="Rounded Rectangle 37">
-            <a:extLst>
-              <a:ext uri="{FF2B5EF4-FFF2-40B4-BE49-F238E27FC236}">
-                <a16:creationId xmlns:a16="http://schemas.microsoft.com/office/drawing/2014/main" id="{1F8FE1C2-EC1E-D8E2-7527-E8A10C482607}"/>
-              </a:ext>
-            </a:extLst>
-          </p:cNvPr>
-          <p:cNvSpPr/>
-          <p:nvPr/>
-        </p:nvSpPr>
-        <p:spPr>
-          <a:xfrm>
-            <a:off x="10166058" y="1563178"/>
-            <a:ext cx="1984248" cy="1471861"/>
-          </a:xfrm>
-          <a:prstGeom prst="roundRect">
-            <a:avLst/>
-          </a:prstGeom>
-          <a:solidFill>
-            <a:srgbClr val="93C47D"/>
-          </a:solidFill>
-          <a:ln w="28575">
-            <a:solidFill>
-              <a:schemeClr val="tx1"/>
-            </a:solidFill>
-          </a:ln>
-        </p:spPr>
-        <p:style>
-          <a:lnRef idx="2">
-            <a:schemeClr val="accent1">
-              <a:shade val="15000"/>
-            </a:schemeClr>
-          </a:lnRef>
-          <a:fillRef idx="1">
-            <a:schemeClr val="accent1"/>
-          </a:fillRef>
-          <a:effectRef idx="0">
-            <a:schemeClr val="accent1"/>
-          </a:effectRef>
-          <a:fontRef idx="minor">
-            <a:schemeClr val="lt1"/>
-          </a:fontRef>
-        </p:style>
-        <p:txBody>
-          <a:bodyPr rtlCol="0" anchor="ctr"/>
-          <a:lstStyle/>
-          <a:p>
-            <a:pPr algn="ctr"/>
-            <a:r>
-              <a:rPr lang="en-US" b="1" dirty="0">
-                <a:solidFill>
-                  <a:schemeClr val="tx1"/>
-                </a:solidFill>
-                <a:latin typeface="Arial" panose="020B0604020202020204" pitchFamily="34" charset="0"/>
-                <a:cs typeface="Arial" panose="020B0604020202020204" pitchFamily="34" charset="0"/>
-              </a:rPr>
-              <a:t>Trending green</a:t>
-            </a:r>
-          </a:p>
-          <a:p>
-            <a:pPr algn="ctr"/>
-            <a:r>
-              <a:rPr lang="en-US" sz="1600" i="1" dirty="0">
-                <a:solidFill>
-                  <a:schemeClr val="tx1"/>
-                </a:solidFill>
-                <a:latin typeface="Arial" panose="020B0604020202020204" pitchFamily="34" charset="0"/>
-                <a:cs typeface="Arial" panose="020B0604020202020204" pitchFamily="34" charset="0"/>
-              </a:rPr>
-              <a:t>P </a:t>
-            </a:r>
-            <a:r>
-              <a:rPr lang="en-US" sz="1600" dirty="0">
-                <a:solidFill>
-                  <a:schemeClr val="tx1"/>
-                </a:solidFill>
-                <a:latin typeface="Arial" panose="020B0604020202020204" pitchFamily="34" charset="0"/>
-                <a:cs typeface="Arial" panose="020B0604020202020204" pitchFamily="34" charset="0"/>
-              </a:rPr>
-              <a:t>≤ 0.05</a:t>
-            </a:r>
-          </a:p>
-          <a:p>
-            <a:pPr algn="ctr"/>
-            <a:r>
-              <a:rPr lang="en-US" sz="1600" dirty="0">
-                <a:solidFill>
-                  <a:schemeClr val="tx1"/>
-                </a:solidFill>
-                <a:latin typeface="Arial" panose="020B0604020202020204" pitchFamily="34" charset="0"/>
-                <a:cs typeface="Arial" panose="020B0604020202020204" pitchFamily="34" charset="0"/>
-              </a:rPr>
-              <a:t>slope coef. &gt; 0.4</a:t>
-            </a:r>
-          </a:p>
-          <a:p>
-            <a:pPr algn="ctr"/>
-            <a:r>
-              <a:rPr lang="en-US" sz="1600" b="1" dirty="0">
-                <a:solidFill>
-                  <a:schemeClr val="tx1"/>
-                </a:solidFill>
-                <a:latin typeface="Arial" panose="020B0604020202020204" pitchFamily="34" charset="0"/>
-                <a:cs typeface="Arial" panose="020B0604020202020204" pitchFamily="34" charset="0"/>
-              </a:rPr>
-              <a:t>52.9%</a:t>
-            </a:r>
-            <a:r>
-              <a:rPr lang="en-US" sz="1600" dirty="0">
-                <a:solidFill>
-                  <a:schemeClr val="tx1"/>
-                </a:solidFill>
-                <a:latin typeface="Arial" panose="020B0604020202020204" pitchFamily="34" charset="0"/>
-                <a:cs typeface="Arial" panose="020B0604020202020204" pitchFamily="34" charset="0"/>
-              </a:rPr>
-              <a:t> correct classifications</a:t>
-            </a:r>
-          </a:p>
-        </p:txBody>
-      </p:sp>
-      <p:pic>
-        <p:nvPicPr>
-          <p:cNvPr id="13" name="Picture 12">
-            <a:extLst>
-              <a:ext uri="{FF2B5EF4-FFF2-40B4-BE49-F238E27FC236}">
-                <a16:creationId xmlns:a16="http://schemas.microsoft.com/office/drawing/2014/main" id="{427DB2B6-71E3-ADED-A37E-DFB486D1BCBF}"/>
-              </a:ext>
-            </a:extLst>
-          </p:cNvPr>
-          <p:cNvPicPr>
-            <a:picLocks noChangeAspect="1"/>
-          </p:cNvPicPr>
-          <p:nvPr/>
-        </p:nvPicPr>
-        <p:blipFill>
-          <a:blip r:embed="rId3"/>
-          <a:srcRect/>
-          <a:stretch/>
-        </p:blipFill>
-        <p:spPr>
-          <a:xfrm>
-            <a:off x="377054" y="6106182"/>
-            <a:ext cx="4123546" cy="2790369"/>
-          </a:xfrm>
-          <a:prstGeom prst="rect">
-            <a:avLst/>
-          </a:prstGeom>
-        </p:spPr>
-      </p:pic>
-      <p:pic>
-        <p:nvPicPr>
-          <p:cNvPr id="18" name="Picture 17">
-            <a:extLst>
-              <a:ext uri="{FF2B5EF4-FFF2-40B4-BE49-F238E27FC236}">
-                <a16:creationId xmlns:a16="http://schemas.microsoft.com/office/drawing/2014/main" id="{F1EEECF4-994B-C75E-EA18-EB89078D259B}"/>
-              </a:ext>
-            </a:extLst>
-          </p:cNvPr>
-          <p:cNvPicPr>
-            <a:picLocks noChangeAspect="1"/>
-          </p:cNvPicPr>
-          <p:nvPr/>
-        </p:nvPicPr>
-        <p:blipFill>
-          <a:blip r:embed="rId4"/>
-          <a:srcRect/>
-          <a:stretch/>
-        </p:blipFill>
-        <p:spPr>
-          <a:xfrm>
-            <a:off x="5440716" y="6106182"/>
-            <a:ext cx="6696888" cy="2790370"/>
-          </a:xfrm>
-          <a:prstGeom prst="rect">
-            <a:avLst/>
-          </a:prstGeom>
-        </p:spPr>
-      </p:pic>
-      <p:pic>
-        <p:nvPicPr>
-          <p:cNvPr id="6" name="Picture 5">
-            <a:extLst>
-              <a:ext uri="{FF2B5EF4-FFF2-40B4-BE49-F238E27FC236}">
-                <a16:creationId xmlns:a16="http://schemas.microsoft.com/office/drawing/2014/main" id="{48D846B6-0538-C1F4-6BAF-11DA2B3E73C1}"/>
-              </a:ext>
-            </a:extLst>
-          </p:cNvPr>
-          <p:cNvPicPr>
-            <a:picLocks noChangeAspect="1"/>
-          </p:cNvPicPr>
-          <p:nvPr/>
-        </p:nvPicPr>
-        <p:blipFill>
-          <a:blip r:embed="rId5"/>
-          <a:srcRect/>
-          <a:stretch/>
-        </p:blipFill>
-        <p:spPr>
-          <a:xfrm>
-            <a:off x="6024667" y="3206523"/>
-            <a:ext cx="6299200" cy="2743200"/>
-          </a:xfrm>
-          <a:prstGeom prst="rect">
-            <a:avLst/>
-          </a:prstGeom>
-        </p:spPr>
-      </p:pic>
-      <p:pic>
-        <p:nvPicPr>
-          <p:cNvPr id="3" name="Picture 2">
-            <a:extLst>
-              <a:ext uri="{FF2B5EF4-FFF2-40B4-BE49-F238E27FC236}">
-                <a16:creationId xmlns:a16="http://schemas.microsoft.com/office/drawing/2014/main" id="{FEE8720A-F8A5-38FF-412C-E461D2DF4B23}"/>
-              </a:ext>
-            </a:extLst>
-          </p:cNvPr>
-          <p:cNvPicPr>
-            <a:picLocks noChangeAspect="1"/>
-          </p:cNvPicPr>
-          <p:nvPr/>
-        </p:nvPicPr>
-        <p:blipFill>
-          <a:blip r:embed="rId6"/>
-          <a:srcRect/>
-          <a:stretch/>
-        </p:blipFill>
-        <p:spPr>
-          <a:xfrm>
-            <a:off x="145271" y="3210842"/>
-            <a:ext cx="6121400" cy="2743200"/>
-          </a:xfrm>
-          <a:prstGeom prst="rect">
-            <a:avLst/>
-          </a:prstGeom>
-        </p:spPr>
-      </p:pic>
-      <p:pic>
-        <p:nvPicPr>
-          <p:cNvPr id="104" name="Picture 103" descr="A chart with text and numbers&#10;&#10;Description automatically generated with medium confidence">
-            <a:extLst>
-              <a:ext uri="{FF2B5EF4-FFF2-40B4-BE49-F238E27FC236}">
-                <a16:creationId xmlns:a16="http://schemas.microsoft.com/office/drawing/2014/main" id="{EFCFFA97-C9C9-FBA7-BCA4-3B52E8861545}"/>
-              </a:ext>
-            </a:extLst>
-          </p:cNvPr>
-          <p:cNvPicPr>
-            <a:picLocks noChangeAspect="1"/>
-          </p:cNvPicPr>
-          <p:nvPr/>
-        </p:nvPicPr>
-        <p:blipFill rotWithShape="1">
-          <a:blip r:embed="rId7"/>
-          <a:srcRect t="38975" r="95435" b="45096"/>
-          <a:stretch/>
-        </p:blipFill>
-        <p:spPr>
-          <a:xfrm>
-            <a:off x="110061" y="3632023"/>
-            <a:ext cx="279400" cy="1165225"/>
-          </a:xfrm>
-          <a:prstGeom prst="rect">
-            <a:avLst/>
-          </a:prstGeom>
-        </p:spPr>
-      </p:pic>
-    </p:spTree>
-    <p:extLst>
-      <p:ext uri="{BB962C8B-B14F-4D97-AF65-F5344CB8AC3E}">
-        <p14:creationId xmlns:p14="http://schemas.microsoft.com/office/powerpoint/2010/main" val="181068942"/>
       </p:ext>
     </p:extLst>
   </p:cSld>

</xml_diff>